<commit_message>
Major changes to image headers
</commit_message>
<xml_diff>
--- a/Lectures/ppts/Lecture 1.pptx
+++ b/Lectures/ppts/Lecture 1.pptx
@@ -7,13 +7,13 @@
   <p:sldIdLst>
     <p:sldId id="256" r:id="rId2"/>
     <p:sldId id="257" r:id="rId3"/>
-    <p:sldId id="258" r:id="rId4"/>
+    <p:sldId id="269" r:id="rId4"/>
     <p:sldId id="259" r:id="rId5"/>
     <p:sldId id="260" r:id="rId6"/>
-    <p:sldId id="261" r:id="rId7"/>
-    <p:sldId id="262" r:id="rId8"/>
+    <p:sldId id="270" r:id="rId7"/>
+    <p:sldId id="271" r:id="rId8"/>
     <p:sldId id="263" r:id="rId9"/>
-    <p:sldId id="264" r:id="rId10"/>
+    <p:sldId id="272" r:id="rId10"/>
     <p:sldId id="265" r:id="rId11"/>
     <p:sldId id="267" r:id="rId12"/>
     <p:sldId id="266" r:id="rId13"/>
@@ -129,6 +129,7 @@
   <p1510:revLst>
     <p1510:client id="{172E45A2-F847-4168-B85D-2A6E15CA05F9}" v="937" dt="2021-03-18T11:25:37.716"/>
     <p1510:client id="{4DF9E816-8842-4C54-9538-EB279F492630}" v="1100" dt="2021-03-18T09:50:27.738"/>
+    <p1510:client id="{7AA2D569-56AE-4B47-8103-3BBF1A9DE3DB}" v="174" dt="2021-03-21T22:19:54.194"/>
   </p1510:revLst>
 </p1510:revInfo>
 </file>
@@ -262,7 +263,7 @@
           <a:p>
             <a:fld id="{7EADE604-6095-4678-BC07-E2D82692C32E}" type="datetimeFigureOut">
               <a:rPr lang="en-US" smtClean="0"/>
-              <a:t>3/18/2021</a:t>
+              <a:t>3/21/2021</a:t>
             </a:fld>
             <a:endParaRPr lang="en-US"/>
           </a:p>
@@ -442,7 +443,7 @@
           <a:p>
             <a:fld id="{7EADE604-6095-4678-BC07-E2D82692C32E}" type="datetimeFigureOut">
               <a:rPr lang="en-US" smtClean="0"/>
-              <a:t>3/18/2021</a:t>
+              <a:t>3/21/2021</a:t>
             </a:fld>
             <a:endParaRPr lang="en-US"/>
           </a:p>
@@ -632,7 +633,7 @@
           <a:p>
             <a:fld id="{7EADE604-6095-4678-BC07-E2D82692C32E}" type="datetimeFigureOut">
               <a:rPr lang="en-US" smtClean="0"/>
-              <a:t>3/18/2021</a:t>
+              <a:t>3/21/2021</a:t>
             </a:fld>
             <a:endParaRPr lang="en-US"/>
           </a:p>
@@ -812,7 +813,7 @@
           <a:p>
             <a:fld id="{7EADE604-6095-4678-BC07-E2D82692C32E}" type="datetimeFigureOut">
               <a:rPr lang="en-US" smtClean="0"/>
-              <a:t>3/18/2021</a:t>
+              <a:t>3/21/2021</a:t>
             </a:fld>
             <a:endParaRPr lang="en-US"/>
           </a:p>
@@ -1069,7 +1070,7 @@
           <a:p>
             <a:fld id="{7EADE604-6095-4678-BC07-E2D82692C32E}" type="datetimeFigureOut">
               <a:rPr lang="en-US" smtClean="0"/>
-              <a:t>3/18/2021</a:t>
+              <a:t>3/21/2021</a:t>
             </a:fld>
             <a:endParaRPr lang="en-US"/>
           </a:p>
@@ -1310,7 +1311,7 @@
           <a:p>
             <a:fld id="{7EADE604-6095-4678-BC07-E2D82692C32E}" type="datetimeFigureOut">
               <a:rPr lang="en-US" smtClean="0"/>
-              <a:t>3/18/2021</a:t>
+              <a:t>3/21/2021</a:t>
             </a:fld>
             <a:endParaRPr lang="en-US"/>
           </a:p>
@@ -1686,7 +1687,7 @@
           <a:p>
             <a:fld id="{7EADE604-6095-4678-BC07-E2D82692C32E}" type="datetimeFigureOut">
               <a:rPr lang="en-US" smtClean="0"/>
-              <a:t>3/18/2021</a:t>
+              <a:t>3/21/2021</a:t>
             </a:fld>
             <a:endParaRPr lang="en-US"/>
           </a:p>
@@ -1815,7 +1816,7 @@
           <a:p>
             <a:fld id="{7EADE604-6095-4678-BC07-E2D82692C32E}" type="datetimeFigureOut">
               <a:rPr lang="en-US" smtClean="0"/>
-              <a:t>3/18/2021</a:t>
+              <a:t>3/21/2021</a:t>
             </a:fld>
             <a:endParaRPr lang="en-US"/>
           </a:p>
@@ -1922,7 +1923,7 @@
           <a:p>
             <a:fld id="{7EADE604-6095-4678-BC07-E2D82692C32E}" type="datetimeFigureOut">
               <a:rPr lang="en-US" smtClean="0"/>
-              <a:t>3/18/2021</a:t>
+              <a:t>3/21/2021</a:t>
             </a:fld>
             <a:endParaRPr lang="en-US"/>
           </a:p>
@@ -2209,7 +2210,7 @@
           <a:p>
             <a:fld id="{7EADE604-6095-4678-BC07-E2D82692C32E}" type="datetimeFigureOut">
               <a:rPr lang="en-US" smtClean="0"/>
-              <a:t>3/18/2021</a:t>
+              <a:t>3/21/2021</a:t>
             </a:fld>
             <a:endParaRPr lang="en-US"/>
           </a:p>
@@ -2473,7 +2474,7 @@
           <a:p>
             <a:fld id="{7EADE604-6095-4678-BC07-E2D82692C32E}" type="datetimeFigureOut">
               <a:rPr lang="en-US" smtClean="0"/>
-              <a:t>3/18/2021</a:t>
+              <a:t>3/21/2021</a:t>
             </a:fld>
             <a:endParaRPr lang="en-US"/>
           </a:p>
@@ -2696,7 +2697,7 @@
           <a:p>
             <a:fld id="{7EADE604-6095-4678-BC07-E2D82692C32E}" type="datetimeFigureOut">
               <a:rPr lang="en-US" smtClean="0"/>
-              <a:t>3/18/2021</a:t>
+              <a:t>3/21/2021</a:t>
             </a:fld>
             <a:endParaRPr lang="en-US"/>
           </a:p>
@@ -4014,12 +4015,48 @@
           <a:chExt cx="0" cy="0"/>
         </a:xfrm>
       </p:grpSpPr>
+      <p:sp>
+        <p:nvSpPr>
+          <p:cNvPr id="2" name="Title 1">
+            <a:extLst>
+              <a:ext uri="{FF2B5EF4-FFF2-40B4-BE49-F238E27FC236}">
+                <a16:creationId xmlns:a16="http://schemas.microsoft.com/office/drawing/2014/main" id="{1B6AB029-ADB7-471A-A70D-EF78E8EE034D}"/>
+              </a:ext>
+            </a:extLst>
+          </p:cNvPr>
+          <p:cNvSpPr>
+            <a:spLocks noGrp="1"/>
+          </p:cNvSpPr>
+          <p:nvPr>
+            <p:ph type="title"/>
+          </p:nvPr>
+        </p:nvSpPr>
+        <p:spPr>
+          <a:xfrm>
+            <a:off x="838200" y="1401647"/>
+            <a:ext cx="10515600" cy="971778"/>
+          </a:xfrm>
+        </p:spPr>
+        <p:txBody>
+          <a:bodyPr/>
+          <a:lstStyle/>
+          <a:p>
+            <a:pPr algn="ctr"/>
+            <a:r>
+              <a:rPr lang="en-US" b="1" dirty="0">
+                <a:cs typeface="Calibri Light"/>
+              </a:rPr>
+              <a:t>Arduino UNO board</a:t>
+            </a:r>
+          </a:p>
+        </p:txBody>
+      </p:sp>
       <p:pic>
         <p:nvPicPr>
-          <p:cNvPr id="4" name="Picture 4" descr="A picture containing text, electronics&#10;&#10;Description automatically generated">
+          <p:cNvPr id="4" name="Picture 4" descr="A picture containing electronics&#10;&#10;Description automatically generated">
             <a:extLst>
               <a:ext uri="{FF2B5EF4-FFF2-40B4-BE49-F238E27FC236}">
-                <a16:creationId xmlns:a16="http://schemas.microsoft.com/office/drawing/2014/main" id="{C0FEAF83-5555-4FBA-B393-D2526011A1AB}"/>
+                <a16:creationId xmlns:a16="http://schemas.microsoft.com/office/drawing/2014/main" id="{E32F84D7-EC0E-4291-A2FF-136C99E50D62}"/>
               </a:ext>
             </a:extLst>
           </p:cNvPr>
@@ -4036,8 +4073,8 @@
         </p:blipFill>
         <p:spPr>
           <a:xfrm>
-            <a:off x="2833008" y="1635579"/>
-            <a:ext cx="5995308" cy="4403270"/>
+            <a:off x="3404507" y="2495303"/>
+            <a:ext cx="5369378" cy="3745180"/>
           </a:xfrm>
           <a:prstGeom prst="rect">
             <a:avLst/>
@@ -4047,7 +4084,7 @@
     </p:spTree>
     <p:extLst>
       <p:ext uri="{BB962C8B-B14F-4D97-AF65-F5344CB8AC3E}">
-        <p14:creationId xmlns:p14="http://schemas.microsoft.com/office/powerpoint/2010/main" val="776806907"/>
+        <p14:creationId xmlns:p14="http://schemas.microsoft.com/office/powerpoint/2010/main" val="1203945341"/>
       </p:ext>
     </p:extLst>
   </p:cSld>
@@ -4391,14 +4428,6 @@
 <file path=ppt/slides/slide6.xml><?xml version="1.0" encoding="utf-8"?>
 <p:sld xmlns:a="http://schemas.openxmlformats.org/drawingml/2006/main" xmlns:r="http://schemas.openxmlformats.org/officeDocument/2006/relationships" xmlns:p="http://schemas.openxmlformats.org/presentationml/2006/main">
   <p:cSld>
-    <p:bg>
-      <p:bgPr>
-        <a:solidFill>
-          <a:schemeClr val="bg1"/>
-        </a:solidFill>
-        <a:effectLst/>
-      </p:bgPr>
-    </p:bg>
     <p:spTree>
       <p:nvGrpSpPr>
         <p:cNvPr id="1" name=""/>
@@ -4413,12 +4442,48 @@
           <a:chExt cx="0" cy="0"/>
         </a:xfrm>
       </p:grpSpPr>
+      <p:sp>
+        <p:nvSpPr>
+          <p:cNvPr id="2" name="Title 1">
+            <a:extLst>
+              <a:ext uri="{FF2B5EF4-FFF2-40B4-BE49-F238E27FC236}">
+                <a16:creationId xmlns:a16="http://schemas.microsoft.com/office/drawing/2014/main" id="{ACB708D4-78D7-44C0-9167-B57E1F13D382}"/>
+              </a:ext>
+            </a:extLst>
+          </p:cNvPr>
+          <p:cNvSpPr>
+            <a:spLocks noGrp="1"/>
+          </p:cNvSpPr>
+          <p:nvPr>
+            <p:ph type="title"/>
+          </p:nvPr>
+        </p:nvSpPr>
+        <p:spPr>
+          <a:xfrm>
+            <a:off x="838200" y="1401647"/>
+            <a:ext cx="10515600" cy="958171"/>
+          </a:xfrm>
+        </p:spPr>
+        <p:txBody>
+          <a:bodyPr/>
+          <a:lstStyle/>
+          <a:p>
+            <a:pPr algn="ctr"/>
+            <a:r>
+              <a:rPr lang="en-US" b="1" dirty="0">
+                <a:cs typeface="Calibri Light"/>
+              </a:rPr>
+              <a:t>Harvard Architecture</a:t>
+            </a:r>
+          </a:p>
+        </p:txBody>
+      </p:sp>
       <p:pic>
         <p:nvPicPr>
-          <p:cNvPr id="4" name="Picture 4" descr="Diagram&#10;&#10;Description automatically generated">
+          <p:cNvPr id="4" name="Picture 4" descr="Diagram, schematic&#10;&#10;Description automatically generated">
             <a:extLst>
               <a:ext uri="{FF2B5EF4-FFF2-40B4-BE49-F238E27FC236}">
-                <a16:creationId xmlns:a16="http://schemas.microsoft.com/office/drawing/2014/main" id="{33D1CB31-3FDC-4598-A56B-CFB18522B055}"/>
+                <a16:creationId xmlns:a16="http://schemas.microsoft.com/office/drawing/2014/main" id="{302C8E11-442B-4A79-98DC-65CC3D09D0D2}"/>
               </a:ext>
             </a:extLst>
           </p:cNvPr>
@@ -4435,8 +4500,8 @@
         </p:blipFill>
         <p:spPr>
           <a:xfrm>
-            <a:off x="1594314" y="1462975"/>
-            <a:ext cx="8773333" cy="5398539"/>
+            <a:off x="2492829" y="2265410"/>
+            <a:ext cx="7206342" cy="4218571"/>
           </a:xfrm>
           <a:prstGeom prst="rect">
             <a:avLst/>
@@ -4446,7 +4511,7 @@
     </p:spTree>
     <p:extLst>
       <p:ext uri="{BB962C8B-B14F-4D97-AF65-F5344CB8AC3E}">
-        <p14:creationId xmlns:p14="http://schemas.microsoft.com/office/powerpoint/2010/main" val="2194383025"/>
+        <p14:creationId xmlns:p14="http://schemas.microsoft.com/office/powerpoint/2010/main" val="3267371105"/>
       </p:ext>
     </p:extLst>
   </p:cSld>
@@ -4487,10 +4552,46 @@
       </p:grpSpPr>
       <p:sp>
         <p:nvSpPr>
+          <p:cNvPr id="2" name="Title 1">
+            <a:extLst>
+              <a:ext uri="{FF2B5EF4-FFF2-40B4-BE49-F238E27FC236}">
+                <a16:creationId xmlns:a16="http://schemas.microsoft.com/office/drawing/2014/main" id="{BB4928AA-6E37-4B58-B24B-5A4EFA526ADB}"/>
+              </a:ext>
+            </a:extLst>
+          </p:cNvPr>
+          <p:cNvSpPr>
+            <a:spLocks noGrp="1"/>
+          </p:cNvSpPr>
+          <p:nvPr>
+            <p:ph type="title"/>
+          </p:nvPr>
+        </p:nvSpPr>
+        <p:spPr>
+          <a:xfrm>
+            <a:off x="838200" y="1401647"/>
+            <a:ext cx="10515600" cy="849313"/>
+          </a:xfrm>
+        </p:spPr>
+        <p:txBody>
+          <a:bodyPr/>
+          <a:lstStyle/>
+          <a:p>
+            <a:pPr algn="ctr"/>
+            <a:r>
+              <a:rPr lang="en-US" b="1" dirty="0">
+                <a:cs typeface="Calibri Light"/>
+              </a:rPr>
+              <a:t>Harvard Architecture block diagram</a:t>
+            </a:r>
+          </a:p>
+        </p:txBody>
+      </p:sp>
+      <p:sp>
+        <p:nvSpPr>
           <p:cNvPr id="4" name="Rectangle 3">
             <a:extLst>
               <a:ext uri="{FF2B5EF4-FFF2-40B4-BE49-F238E27FC236}">
-                <a16:creationId xmlns:a16="http://schemas.microsoft.com/office/drawing/2014/main" id="{6278F13C-AD14-47FA-8675-B2B06AB28F00}"/>
+                <a16:creationId xmlns:a16="http://schemas.microsoft.com/office/drawing/2014/main" id="{22241A58-33ED-4AFF-AC1C-B2DA37C74FA8}"/>
               </a:ext>
             </a:extLst>
           </p:cNvPr>
@@ -4527,7 +4628,101 @@
         </p:style>
         <p:txBody>
           <a:bodyPr rtlCol="0" anchor="ctr"/>
-          <a:lstStyle/>
+          <a:lstStyle>
+            <a:defPPr>
+              <a:defRPr lang="en-US"/>
+            </a:defPPr>
+            <a:lvl1pPr marL="0" algn="l" defTabSz="914400" rtl="0" eaLnBrk="1" latinLnBrk="0" hangingPunct="1">
+              <a:defRPr sz="1800" kern="1200">
+                <a:solidFill>
+                  <a:schemeClr val="lt1"/>
+                </a:solidFill>
+                <a:latin typeface="+mn-lt"/>
+                <a:ea typeface="+mn-ea"/>
+                <a:cs typeface="+mn-cs"/>
+              </a:defRPr>
+            </a:lvl1pPr>
+            <a:lvl2pPr marL="457200" algn="l" defTabSz="914400" rtl="0" eaLnBrk="1" latinLnBrk="0" hangingPunct="1">
+              <a:defRPr sz="1800" kern="1200">
+                <a:solidFill>
+                  <a:schemeClr val="lt1"/>
+                </a:solidFill>
+                <a:latin typeface="+mn-lt"/>
+                <a:ea typeface="+mn-ea"/>
+                <a:cs typeface="+mn-cs"/>
+              </a:defRPr>
+            </a:lvl2pPr>
+            <a:lvl3pPr marL="914400" algn="l" defTabSz="914400" rtl="0" eaLnBrk="1" latinLnBrk="0" hangingPunct="1">
+              <a:defRPr sz="1800" kern="1200">
+                <a:solidFill>
+                  <a:schemeClr val="lt1"/>
+                </a:solidFill>
+                <a:latin typeface="+mn-lt"/>
+                <a:ea typeface="+mn-ea"/>
+                <a:cs typeface="+mn-cs"/>
+              </a:defRPr>
+            </a:lvl3pPr>
+            <a:lvl4pPr marL="1371600" algn="l" defTabSz="914400" rtl="0" eaLnBrk="1" latinLnBrk="0" hangingPunct="1">
+              <a:defRPr sz="1800" kern="1200">
+                <a:solidFill>
+                  <a:schemeClr val="lt1"/>
+                </a:solidFill>
+                <a:latin typeface="+mn-lt"/>
+                <a:ea typeface="+mn-ea"/>
+                <a:cs typeface="+mn-cs"/>
+              </a:defRPr>
+            </a:lvl4pPr>
+            <a:lvl5pPr marL="1828800" algn="l" defTabSz="914400" rtl="0" eaLnBrk="1" latinLnBrk="0" hangingPunct="1">
+              <a:defRPr sz="1800" kern="1200">
+                <a:solidFill>
+                  <a:schemeClr val="lt1"/>
+                </a:solidFill>
+                <a:latin typeface="+mn-lt"/>
+                <a:ea typeface="+mn-ea"/>
+                <a:cs typeface="+mn-cs"/>
+              </a:defRPr>
+            </a:lvl5pPr>
+            <a:lvl6pPr marL="2286000" algn="l" defTabSz="914400" rtl="0" eaLnBrk="1" latinLnBrk="0" hangingPunct="1">
+              <a:defRPr sz="1800" kern="1200">
+                <a:solidFill>
+                  <a:schemeClr val="lt1"/>
+                </a:solidFill>
+                <a:latin typeface="+mn-lt"/>
+                <a:ea typeface="+mn-ea"/>
+                <a:cs typeface="+mn-cs"/>
+              </a:defRPr>
+            </a:lvl6pPr>
+            <a:lvl7pPr marL="2743200" algn="l" defTabSz="914400" rtl="0" eaLnBrk="1" latinLnBrk="0" hangingPunct="1">
+              <a:defRPr sz="1800" kern="1200">
+                <a:solidFill>
+                  <a:schemeClr val="lt1"/>
+                </a:solidFill>
+                <a:latin typeface="+mn-lt"/>
+                <a:ea typeface="+mn-ea"/>
+                <a:cs typeface="+mn-cs"/>
+              </a:defRPr>
+            </a:lvl7pPr>
+            <a:lvl8pPr marL="3200400" algn="l" defTabSz="914400" rtl="0" eaLnBrk="1" latinLnBrk="0" hangingPunct="1">
+              <a:defRPr sz="1800" kern="1200">
+                <a:solidFill>
+                  <a:schemeClr val="lt1"/>
+                </a:solidFill>
+                <a:latin typeface="+mn-lt"/>
+                <a:ea typeface="+mn-ea"/>
+                <a:cs typeface="+mn-cs"/>
+              </a:defRPr>
+            </a:lvl8pPr>
+            <a:lvl9pPr marL="3657600" algn="l" defTabSz="914400" rtl="0" eaLnBrk="1" latinLnBrk="0" hangingPunct="1">
+              <a:defRPr sz="1800" kern="1200">
+                <a:solidFill>
+                  <a:schemeClr val="lt1"/>
+                </a:solidFill>
+                <a:latin typeface="+mn-lt"/>
+                <a:ea typeface="+mn-ea"/>
+                <a:cs typeface="+mn-cs"/>
+              </a:defRPr>
+            </a:lvl9pPr>
+          </a:lstStyle>
           <a:p>
             <a:pPr algn="ctr"/>
             <a:r>
@@ -4545,7 +4740,7 @@
           <p:cNvPr id="5" name="Rectangle 4">
             <a:extLst>
               <a:ext uri="{FF2B5EF4-FFF2-40B4-BE49-F238E27FC236}">
-                <a16:creationId xmlns:a16="http://schemas.microsoft.com/office/drawing/2014/main" id="{7A5177D5-24B7-4AC9-B2A0-88B8A5FF7A5C}"/>
+                <a16:creationId xmlns:a16="http://schemas.microsoft.com/office/drawing/2014/main" id="{2C494090-093A-44FC-B6D1-28B2911A41D3}"/>
               </a:ext>
             </a:extLst>
           </p:cNvPr>
@@ -4584,7 +4779,101 @@
         </p:style>
         <p:txBody>
           <a:bodyPr lIns="91440" tIns="45720" rIns="91440" bIns="45720" rtlCol="0" anchor="ctr"/>
-          <a:lstStyle/>
+          <a:lstStyle>
+            <a:defPPr>
+              <a:defRPr lang="en-US"/>
+            </a:defPPr>
+            <a:lvl1pPr marL="0" algn="l" defTabSz="914400" rtl="0" eaLnBrk="1" latinLnBrk="0" hangingPunct="1">
+              <a:defRPr sz="1800" kern="1200">
+                <a:solidFill>
+                  <a:schemeClr val="lt1"/>
+                </a:solidFill>
+                <a:latin typeface="+mn-lt"/>
+                <a:ea typeface="+mn-ea"/>
+                <a:cs typeface="+mn-cs"/>
+              </a:defRPr>
+            </a:lvl1pPr>
+            <a:lvl2pPr marL="457200" algn="l" defTabSz="914400" rtl="0" eaLnBrk="1" latinLnBrk="0" hangingPunct="1">
+              <a:defRPr sz="1800" kern="1200">
+                <a:solidFill>
+                  <a:schemeClr val="lt1"/>
+                </a:solidFill>
+                <a:latin typeface="+mn-lt"/>
+                <a:ea typeface="+mn-ea"/>
+                <a:cs typeface="+mn-cs"/>
+              </a:defRPr>
+            </a:lvl2pPr>
+            <a:lvl3pPr marL="914400" algn="l" defTabSz="914400" rtl="0" eaLnBrk="1" latinLnBrk="0" hangingPunct="1">
+              <a:defRPr sz="1800" kern="1200">
+                <a:solidFill>
+                  <a:schemeClr val="lt1"/>
+                </a:solidFill>
+                <a:latin typeface="+mn-lt"/>
+                <a:ea typeface="+mn-ea"/>
+                <a:cs typeface="+mn-cs"/>
+              </a:defRPr>
+            </a:lvl3pPr>
+            <a:lvl4pPr marL="1371600" algn="l" defTabSz="914400" rtl="0" eaLnBrk="1" latinLnBrk="0" hangingPunct="1">
+              <a:defRPr sz="1800" kern="1200">
+                <a:solidFill>
+                  <a:schemeClr val="lt1"/>
+                </a:solidFill>
+                <a:latin typeface="+mn-lt"/>
+                <a:ea typeface="+mn-ea"/>
+                <a:cs typeface="+mn-cs"/>
+              </a:defRPr>
+            </a:lvl4pPr>
+            <a:lvl5pPr marL="1828800" algn="l" defTabSz="914400" rtl="0" eaLnBrk="1" latinLnBrk="0" hangingPunct="1">
+              <a:defRPr sz="1800" kern="1200">
+                <a:solidFill>
+                  <a:schemeClr val="lt1"/>
+                </a:solidFill>
+                <a:latin typeface="+mn-lt"/>
+                <a:ea typeface="+mn-ea"/>
+                <a:cs typeface="+mn-cs"/>
+              </a:defRPr>
+            </a:lvl5pPr>
+            <a:lvl6pPr marL="2286000" algn="l" defTabSz="914400" rtl="0" eaLnBrk="1" latinLnBrk="0" hangingPunct="1">
+              <a:defRPr sz="1800" kern="1200">
+                <a:solidFill>
+                  <a:schemeClr val="lt1"/>
+                </a:solidFill>
+                <a:latin typeface="+mn-lt"/>
+                <a:ea typeface="+mn-ea"/>
+                <a:cs typeface="+mn-cs"/>
+              </a:defRPr>
+            </a:lvl6pPr>
+            <a:lvl7pPr marL="2743200" algn="l" defTabSz="914400" rtl="0" eaLnBrk="1" latinLnBrk="0" hangingPunct="1">
+              <a:defRPr sz="1800" kern="1200">
+                <a:solidFill>
+                  <a:schemeClr val="lt1"/>
+                </a:solidFill>
+                <a:latin typeface="+mn-lt"/>
+                <a:ea typeface="+mn-ea"/>
+                <a:cs typeface="+mn-cs"/>
+              </a:defRPr>
+            </a:lvl7pPr>
+            <a:lvl8pPr marL="3200400" algn="l" defTabSz="914400" rtl="0" eaLnBrk="1" latinLnBrk="0" hangingPunct="1">
+              <a:defRPr sz="1800" kern="1200">
+                <a:solidFill>
+                  <a:schemeClr val="lt1"/>
+                </a:solidFill>
+                <a:latin typeface="+mn-lt"/>
+                <a:ea typeface="+mn-ea"/>
+                <a:cs typeface="+mn-cs"/>
+              </a:defRPr>
+            </a:lvl8pPr>
+            <a:lvl9pPr marL="3657600" algn="l" defTabSz="914400" rtl="0" eaLnBrk="1" latinLnBrk="0" hangingPunct="1">
+              <a:defRPr sz="1800" kern="1200">
+                <a:solidFill>
+                  <a:schemeClr val="lt1"/>
+                </a:solidFill>
+                <a:latin typeface="+mn-lt"/>
+                <a:ea typeface="+mn-ea"/>
+                <a:cs typeface="+mn-cs"/>
+              </a:defRPr>
+            </a:lvl9pPr>
+          </a:lstStyle>
           <a:p>
             <a:pPr algn="ctr"/>
             <a:r>
@@ -4602,7 +4891,7 @@
           <p:cNvPr id="6" name="Rectangle 5">
             <a:extLst>
               <a:ext uri="{FF2B5EF4-FFF2-40B4-BE49-F238E27FC236}">
-                <a16:creationId xmlns:a16="http://schemas.microsoft.com/office/drawing/2014/main" id="{74951CFE-496E-435F-A4A4-7D04B6A23DAE}"/>
+                <a16:creationId xmlns:a16="http://schemas.microsoft.com/office/drawing/2014/main" id="{34BEDB2D-55D6-4C4F-A350-0001776D7C42}"/>
               </a:ext>
             </a:extLst>
           </p:cNvPr>
@@ -4641,7 +4930,101 @@
         </p:style>
         <p:txBody>
           <a:bodyPr lIns="91440" tIns="45720" rIns="91440" bIns="45720" rtlCol="0" anchor="ctr"/>
-          <a:lstStyle/>
+          <a:lstStyle>
+            <a:defPPr>
+              <a:defRPr lang="en-US"/>
+            </a:defPPr>
+            <a:lvl1pPr marL="0" algn="l" defTabSz="914400" rtl="0" eaLnBrk="1" latinLnBrk="0" hangingPunct="1">
+              <a:defRPr sz="1800" kern="1200">
+                <a:solidFill>
+                  <a:schemeClr val="lt1"/>
+                </a:solidFill>
+                <a:latin typeface="+mn-lt"/>
+                <a:ea typeface="+mn-ea"/>
+                <a:cs typeface="+mn-cs"/>
+              </a:defRPr>
+            </a:lvl1pPr>
+            <a:lvl2pPr marL="457200" algn="l" defTabSz="914400" rtl="0" eaLnBrk="1" latinLnBrk="0" hangingPunct="1">
+              <a:defRPr sz="1800" kern="1200">
+                <a:solidFill>
+                  <a:schemeClr val="lt1"/>
+                </a:solidFill>
+                <a:latin typeface="+mn-lt"/>
+                <a:ea typeface="+mn-ea"/>
+                <a:cs typeface="+mn-cs"/>
+              </a:defRPr>
+            </a:lvl2pPr>
+            <a:lvl3pPr marL="914400" algn="l" defTabSz="914400" rtl="0" eaLnBrk="1" latinLnBrk="0" hangingPunct="1">
+              <a:defRPr sz="1800" kern="1200">
+                <a:solidFill>
+                  <a:schemeClr val="lt1"/>
+                </a:solidFill>
+                <a:latin typeface="+mn-lt"/>
+                <a:ea typeface="+mn-ea"/>
+                <a:cs typeface="+mn-cs"/>
+              </a:defRPr>
+            </a:lvl3pPr>
+            <a:lvl4pPr marL="1371600" algn="l" defTabSz="914400" rtl="0" eaLnBrk="1" latinLnBrk="0" hangingPunct="1">
+              <a:defRPr sz="1800" kern="1200">
+                <a:solidFill>
+                  <a:schemeClr val="lt1"/>
+                </a:solidFill>
+                <a:latin typeface="+mn-lt"/>
+                <a:ea typeface="+mn-ea"/>
+                <a:cs typeface="+mn-cs"/>
+              </a:defRPr>
+            </a:lvl4pPr>
+            <a:lvl5pPr marL="1828800" algn="l" defTabSz="914400" rtl="0" eaLnBrk="1" latinLnBrk="0" hangingPunct="1">
+              <a:defRPr sz="1800" kern="1200">
+                <a:solidFill>
+                  <a:schemeClr val="lt1"/>
+                </a:solidFill>
+                <a:latin typeface="+mn-lt"/>
+                <a:ea typeface="+mn-ea"/>
+                <a:cs typeface="+mn-cs"/>
+              </a:defRPr>
+            </a:lvl5pPr>
+            <a:lvl6pPr marL="2286000" algn="l" defTabSz="914400" rtl="0" eaLnBrk="1" latinLnBrk="0" hangingPunct="1">
+              <a:defRPr sz="1800" kern="1200">
+                <a:solidFill>
+                  <a:schemeClr val="lt1"/>
+                </a:solidFill>
+                <a:latin typeface="+mn-lt"/>
+                <a:ea typeface="+mn-ea"/>
+                <a:cs typeface="+mn-cs"/>
+              </a:defRPr>
+            </a:lvl6pPr>
+            <a:lvl7pPr marL="2743200" algn="l" defTabSz="914400" rtl="0" eaLnBrk="1" latinLnBrk="0" hangingPunct="1">
+              <a:defRPr sz="1800" kern="1200">
+                <a:solidFill>
+                  <a:schemeClr val="lt1"/>
+                </a:solidFill>
+                <a:latin typeface="+mn-lt"/>
+                <a:ea typeface="+mn-ea"/>
+                <a:cs typeface="+mn-cs"/>
+              </a:defRPr>
+            </a:lvl7pPr>
+            <a:lvl8pPr marL="3200400" algn="l" defTabSz="914400" rtl="0" eaLnBrk="1" latinLnBrk="0" hangingPunct="1">
+              <a:defRPr sz="1800" kern="1200">
+                <a:solidFill>
+                  <a:schemeClr val="lt1"/>
+                </a:solidFill>
+                <a:latin typeface="+mn-lt"/>
+                <a:ea typeface="+mn-ea"/>
+                <a:cs typeface="+mn-cs"/>
+              </a:defRPr>
+            </a:lvl8pPr>
+            <a:lvl9pPr marL="3657600" algn="l" defTabSz="914400" rtl="0" eaLnBrk="1" latinLnBrk="0" hangingPunct="1">
+              <a:defRPr sz="1800" kern="1200">
+                <a:solidFill>
+                  <a:schemeClr val="lt1"/>
+                </a:solidFill>
+                <a:latin typeface="+mn-lt"/>
+                <a:ea typeface="+mn-ea"/>
+                <a:cs typeface="+mn-cs"/>
+              </a:defRPr>
+            </a:lvl9pPr>
+          </a:lstStyle>
           <a:p>
             <a:pPr algn="ctr"/>
             <a:r>
@@ -4658,7 +5041,7 @@
           <p:cNvPr id="7" name="Arrow: Left 6">
             <a:extLst>
               <a:ext uri="{FF2B5EF4-FFF2-40B4-BE49-F238E27FC236}">
-                <a16:creationId xmlns:a16="http://schemas.microsoft.com/office/drawing/2014/main" id="{AA4AC25D-6655-48AA-B94A-DA05B07D1214}"/>
+                <a16:creationId xmlns:a16="http://schemas.microsoft.com/office/drawing/2014/main" id="{4F857FD2-3722-4E5A-AD96-48C7A154C5A7}"/>
               </a:ext>
             </a:extLst>
           </p:cNvPr>
@@ -4692,7 +5075,101 @@
         </p:style>
         <p:txBody>
           <a:bodyPr rtlCol="0" anchor="ctr"/>
-          <a:lstStyle/>
+          <a:lstStyle>
+            <a:defPPr>
+              <a:defRPr lang="en-US"/>
+            </a:defPPr>
+            <a:lvl1pPr marL="0" algn="l" defTabSz="914400" rtl="0" eaLnBrk="1" latinLnBrk="0" hangingPunct="1">
+              <a:defRPr sz="1800" kern="1200">
+                <a:solidFill>
+                  <a:schemeClr val="lt1"/>
+                </a:solidFill>
+                <a:latin typeface="+mn-lt"/>
+                <a:ea typeface="+mn-ea"/>
+                <a:cs typeface="+mn-cs"/>
+              </a:defRPr>
+            </a:lvl1pPr>
+            <a:lvl2pPr marL="457200" algn="l" defTabSz="914400" rtl="0" eaLnBrk="1" latinLnBrk="0" hangingPunct="1">
+              <a:defRPr sz="1800" kern="1200">
+                <a:solidFill>
+                  <a:schemeClr val="lt1"/>
+                </a:solidFill>
+                <a:latin typeface="+mn-lt"/>
+                <a:ea typeface="+mn-ea"/>
+                <a:cs typeface="+mn-cs"/>
+              </a:defRPr>
+            </a:lvl2pPr>
+            <a:lvl3pPr marL="914400" algn="l" defTabSz="914400" rtl="0" eaLnBrk="1" latinLnBrk="0" hangingPunct="1">
+              <a:defRPr sz="1800" kern="1200">
+                <a:solidFill>
+                  <a:schemeClr val="lt1"/>
+                </a:solidFill>
+                <a:latin typeface="+mn-lt"/>
+                <a:ea typeface="+mn-ea"/>
+                <a:cs typeface="+mn-cs"/>
+              </a:defRPr>
+            </a:lvl3pPr>
+            <a:lvl4pPr marL="1371600" algn="l" defTabSz="914400" rtl="0" eaLnBrk="1" latinLnBrk="0" hangingPunct="1">
+              <a:defRPr sz="1800" kern="1200">
+                <a:solidFill>
+                  <a:schemeClr val="lt1"/>
+                </a:solidFill>
+                <a:latin typeface="+mn-lt"/>
+                <a:ea typeface="+mn-ea"/>
+                <a:cs typeface="+mn-cs"/>
+              </a:defRPr>
+            </a:lvl4pPr>
+            <a:lvl5pPr marL="1828800" algn="l" defTabSz="914400" rtl="0" eaLnBrk="1" latinLnBrk="0" hangingPunct="1">
+              <a:defRPr sz="1800" kern="1200">
+                <a:solidFill>
+                  <a:schemeClr val="lt1"/>
+                </a:solidFill>
+                <a:latin typeface="+mn-lt"/>
+                <a:ea typeface="+mn-ea"/>
+                <a:cs typeface="+mn-cs"/>
+              </a:defRPr>
+            </a:lvl5pPr>
+            <a:lvl6pPr marL="2286000" algn="l" defTabSz="914400" rtl="0" eaLnBrk="1" latinLnBrk="0" hangingPunct="1">
+              <a:defRPr sz="1800" kern="1200">
+                <a:solidFill>
+                  <a:schemeClr val="lt1"/>
+                </a:solidFill>
+                <a:latin typeface="+mn-lt"/>
+                <a:ea typeface="+mn-ea"/>
+                <a:cs typeface="+mn-cs"/>
+              </a:defRPr>
+            </a:lvl6pPr>
+            <a:lvl7pPr marL="2743200" algn="l" defTabSz="914400" rtl="0" eaLnBrk="1" latinLnBrk="0" hangingPunct="1">
+              <a:defRPr sz="1800" kern="1200">
+                <a:solidFill>
+                  <a:schemeClr val="lt1"/>
+                </a:solidFill>
+                <a:latin typeface="+mn-lt"/>
+                <a:ea typeface="+mn-ea"/>
+                <a:cs typeface="+mn-cs"/>
+              </a:defRPr>
+            </a:lvl7pPr>
+            <a:lvl8pPr marL="3200400" algn="l" defTabSz="914400" rtl="0" eaLnBrk="1" latinLnBrk="0" hangingPunct="1">
+              <a:defRPr sz="1800" kern="1200">
+                <a:solidFill>
+                  <a:schemeClr val="lt1"/>
+                </a:solidFill>
+                <a:latin typeface="+mn-lt"/>
+                <a:ea typeface="+mn-ea"/>
+                <a:cs typeface="+mn-cs"/>
+              </a:defRPr>
+            </a:lvl8pPr>
+            <a:lvl9pPr marL="3657600" algn="l" defTabSz="914400" rtl="0" eaLnBrk="1" latinLnBrk="0" hangingPunct="1">
+              <a:defRPr sz="1800" kern="1200">
+                <a:solidFill>
+                  <a:schemeClr val="lt1"/>
+                </a:solidFill>
+                <a:latin typeface="+mn-lt"/>
+                <a:ea typeface="+mn-ea"/>
+                <a:cs typeface="+mn-cs"/>
+              </a:defRPr>
+            </a:lvl9pPr>
+          </a:lstStyle>
           <a:p>
             <a:pPr algn="ctr"/>
             <a:r>
@@ -4707,10 +5184,10 @@
       </p:sp>
       <p:sp>
         <p:nvSpPr>
-          <p:cNvPr id="9" name="Arrow: Right 8">
+          <p:cNvPr id="8" name="Arrow: Right 7">
             <a:extLst>
               <a:ext uri="{FF2B5EF4-FFF2-40B4-BE49-F238E27FC236}">
-                <a16:creationId xmlns:a16="http://schemas.microsoft.com/office/drawing/2014/main" id="{16AD8F25-388A-4552-B908-94909158E937}"/>
+                <a16:creationId xmlns:a16="http://schemas.microsoft.com/office/drawing/2014/main" id="{CE1DE7CC-43C4-43F4-A88A-839A2E2B04BD}"/>
               </a:ext>
             </a:extLst>
           </p:cNvPr>
@@ -4744,7 +5221,101 @@
         </p:style>
         <p:txBody>
           <a:bodyPr rtlCol="0" anchor="ctr"/>
-          <a:lstStyle/>
+          <a:lstStyle>
+            <a:defPPr>
+              <a:defRPr lang="en-US"/>
+            </a:defPPr>
+            <a:lvl1pPr marL="0" algn="l" defTabSz="914400" rtl="0" eaLnBrk="1" latinLnBrk="0" hangingPunct="1">
+              <a:defRPr sz="1800" kern="1200">
+                <a:solidFill>
+                  <a:schemeClr val="lt1"/>
+                </a:solidFill>
+                <a:latin typeface="+mn-lt"/>
+                <a:ea typeface="+mn-ea"/>
+                <a:cs typeface="+mn-cs"/>
+              </a:defRPr>
+            </a:lvl1pPr>
+            <a:lvl2pPr marL="457200" algn="l" defTabSz="914400" rtl="0" eaLnBrk="1" latinLnBrk="0" hangingPunct="1">
+              <a:defRPr sz="1800" kern="1200">
+                <a:solidFill>
+                  <a:schemeClr val="lt1"/>
+                </a:solidFill>
+                <a:latin typeface="+mn-lt"/>
+                <a:ea typeface="+mn-ea"/>
+                <a:cs typeface="+mn-cs"/>
+              </a:defRPr>
+            </a:lvl2pPr>
+            <a:lvl3pPr marL="914400" algn="l" defTabSz="914400" rtl="0" eaLnBrk="1" latinLnBrk="0" hangingPunct="1">
+              <a:defRPr sz="1800" kern="1200">
+                <a:solidFill>
+                  <a:schemeClr val="lt1"/>
+                </a:solidFill>
+                <a:latin typeface="+mn-lt"/>
+                <a:ea typeface="+mn-ea"/>
+                <a:cs typeface="+mn-cs"/>
+              </a:defRPr>
+            </a:lvl3pPr>
+            <a:lvl4pPr marL="1371600" algn="l" defTabSz="914400" rtl="0" eaLnBrk="1" latinLnBrk="0" hangingPunct="1">
+              <a:defRPr sz="1800" kern="1200">
+                <a:solidFill>
+                  <a:schemeClr val="lt1"/>
+                </a:solidFill>
+                <a:latin typeface="+mn-lt"/>
+                <a:ea typeface="+mn-ea"/>
+                <a:cs typeface="+mn-cs"/>
+              </a:defRPr>
+            </a:lvl4pPr>
+            <a:lvl5pPr marL="1828800" algn="l" defTabSz="914400" rtl="0" eaLnBrk="1" latinLnBrk="0" hangingPunct="1">
+              <a:defRPr sz="1800" kern="1200">
+                <a:solidFill>
+                  <a:schemeClr val="lt1"/>
+                </a:solidFill>
+                <a:latin typeface="+mn-lt"/>
+                <a:ea typeface="+mn-ea"/>
+                <a:cs typeface="+mn-cs"/>
+              </a:defRPr>
+            </a:lvl5pPr>
+            <a:lvl6pPr marL="2286000" algn="l" defTabSz="914400" rtl="0" eaLnBrk="1" latinLnBrk="0" hangingPunct="1">
+              <a:defRPr sz="1800" kern="1200">
+                <a:solidFill>
+                  <a:schemeClr val="lt1"/>
+                </a:solidFill>
+                <a:latin typeface="+mn-lt"/>
+                <a:ea typeface="+mn-ea"/>
+                <a:cs typeface="+mn-cs"/>
+              </a:defRPr>
+            </a:lvl6pPr>
+            <a:lvl7pPr marL="2743200" algn="l" defTabSz="914400" rtl="0" eaLnBrk="1" latinLnBrk="0" hangingPunct="1">
+              <a:defRPr sz="1800" kern="1200">
+                <a:solidFill>
+                  <a:schemeClr val="lt1"/>
+                </a:solidFill>
+                <a:latin typeface="+mn-lt"/>
+                <a:ea typeface="+mn-ea"/>
+                <a:cs typeface="+mn-cs"/>
+              </a:defRPr>
+            </a:lvl7pPr>
+            <a:lvl8pPr marL="3200400" algn="l" defTabSz="914400" rtl="0" eaLnBrk="1" latinLnBrk="0" hangingPunct="1">
+              <a:defRPr sz="1800" kern="1200">
+                <a:solidFill>
+                  <a:schemeClr val="lt1"/>
+                </a:solidFill>
+                <a:latin typeface="+mn-lt"/>
+                <a:ea typeface="+mn-ea"/>
+                <a:cs typeface="+mn-cs"/>
+              </a:defRPr>
+            </a:lvl8pPr>
+            <a:lvl9pPr marL="3657600" algn="l" defTabSz="914400" rtl="0" eaLnBrk="1" latinLnBrk="0" hangingPunct="1">
+              <a:defRPr sz="1800" kern="1200">
+                <a:solidFill>
+                  <a:schemeClr val="lt1"/>
+                </a:solidFill>
+                <a:latin typeface="+mn-lt"/>
+                <a:ea typeface="+mn-ea"/>
+                <a:cs typeface="+mn-cs"/>
+              </a:defRPr>
+            </a:lvl9pPr>
+          </a:lstStyle>
           <a:p>
             <a:pPr algn="ctr"/>
             <a:r>
@@ -4761,10 +5332,10 @@
       </p:sp>
       <p:sp>
         <p:nvSpPr>
-          <p:cNvPr id="10" name="Arrow: Left-Right 9">
+          <p:cNvPr id="9" name="Arrow: Left-Right 8">
             <a:extLst>
               <a:ext uri="{FF2B5EF4-FFF2-40B4-BE49-F238E27FC236}">
-                <a16:creationId xmlns:a16="http://schemas.microsoft.com/office/drawing/2014/main" id="{4DDAFE3E-77B0-48F1-8771-1860BEAD3C23}"/>
+                <a16:creationId xmlns:a16="http://schemas.microsoft.com/office/drawing/2014/main" id="{FCEF11F2-F29D-495D-B7E6-216139B5CEF5}"/>
               </a:ext>
             </a:extLst>
           </p:cNvPr>
@@ -4798,7 +5369,101 @@
         </p:style>
         <p:txBody>
           <a:bodyPr rtlCol="0" anchor="ctr"/>
-          <a:lstStyle/>
+          <a:lstStyle>
+            <a:defPPr>
+              <a:defRPr lang="en-US"/>
+            </a:defPPr>
+            <a:lvl1pPr marL="0" algn="l" defTabSz="914400" rtl="0" eaLnBrk="1" latinLnBrk="0" hangingPunct="1">
+              <a:defRPr sz="1800" kern="1200">
+                <a:solidFill>
+                  <a:schemeClr val="lt1"/>
+                </a:solidFill>
+                <a:latin typeface="+mn-lt"/>
+                <a:ea typeface="+mn-ea"/>
+                <a:cs typeface="+mn-cs"/>
+              </a:defRPr>
+            </a:lvl1pPr>
+            <a:lvl2pPr marL="457200" algn="l" defTabSz="914400" rtl="0" eaLnBrk="1" latinLnBrk="0" hangingPunct="1">
+              <a:defRPr sz="1800" kern="1200">
+                <a:solidFill>
+                  <a:schemeClr val="lt1"/>
+                </a:solidFill>
+                <a:latin typeface="+mn-lt"/>
+                <a:ea typeface="+mn-ea"/>
+                <a:cs typeface="+mn-cs"/>
+              </a:defRPr>
+            </a:lvl2pPr>
+            <a:lvl3pPr marL="914400" algn="l" defTabSz="914400" rtl="0" eaLnBrk="1" latinLnBrk="0" hangingPunct="1">
+              <a:defRPr sz="1800" kern="1200">
+                <a:solidFill>
+                  <a:schemeClr val="lt1"/>
+                </a:solidFill>
+                <a:latin typeface="+mn-lt"/>
+                <a:ea typeface="+mn-ea"/>
+                <a:cs typeface="+mn-cs"/>
+              </a:defRPr>
+            </a:lvl3pPr>
+            <a:lvl4pPr marL="1371600" algn="l" defTabSz="914400" rtl="0" eaLnBrk="1" latinLnBrk="0" hangingPunct="1">
+              <a:defRPr sz="1800" kern="1200">
+                <a:solidFill>
+                  <a:schemeClr val="lt1"/>
+                </a:solidFill>
+                <a:latin typeface="+mn-lt"/>
+                <a:ea typeface="+mn-ea"/>
+                <a:cs typeface="+mn-cs"/>
+              </a:defRPr>
+            </a:lvl4pPr>
+            <a:lvl5pPr marL="1828800" algn="l" defTabSz="914400" rtl="0" eaLnBrk="1" latinLnBrk="0" hangingPunct="1">
+              <a:defRPr sz="1800" kern="1200">
+                <a:solidFill>
+                  <a:schemeClr val="lt1"/>
+                </a:solidFill>
+                <a:latin typeface="+mn-lt"/>
+                <a:ea typeface="+mn-ea"/>
+                <a:cs typeface="+mn-cs"/>
+              </a:defRPr>
+            </a:lvl5pPr>
+            <a:lvl6pPr marL="2286000" algn="l" defTabSz="914400" rtl="0" eaLnBrk="1" latinLnBrk="0" hangingPunct="1">
+              <a:defRPr sz="1800" kern="1200">
+                <a:solidFill>
+                  <a:schemeClr val="lt1"/>
+                </a:solidFill>
+                <a:latin typeface="+mn-lt"/>
+                <a:ea typeface="+mn-ea"/>
+                <a:cs typeface="+mn-cs"/>
+              </a:defRPr>
+            </a:lvl6pPr>
+            <a:lvl7pPr marL="2743200" algn="l" defTabSz="914400" rtl="0" eaLnBrk="1" latinLnBrk="0" hangingPunct="1">
+              <a:defRPr sz="1800" kern="1200">
+                <a:solidFill>
+                  <a:schemeClr val="lt1"/>
+                </a:solidFill>
+                <a:latin typeface="+mn-lt"/>
+                <a:ea typeface="+mn-ea"/>
+                <a:cs typeface="+mn-cs"/>
+              </a:defRPr>
+            </a:lvl7pPr>
+            <a:lvl8pPr marL="3200400" algn="l" defTabSz="914400" rtl="0" eaLnBrk="1" latinLnBrk="0" hangingPunct="1">
+              <a:defRPr sz="1800" kern="1200">
+                <a:solidFill>
+                  <a:schemeClr val="lt1"/>
+                </a:solidFill>
+                <a:latin typeface="+mn-lt"/>
+                <a:ea typeface="+mn-ea"/>
+                <a:cs typeface="+mn-cs"/>
+              </a:defRPr>
+            </a:lvl8pPr>
+            <a:lvl9pPr marL="3657600" algn="l" defTabSz="914400" rtl="0" eaLnBrk="1" latinLnBrk="0" hangingPunct="1">
+              <a:defRPr sz="1800" kern="1200">
+                <a:solidFill>
+                  <a:schemeClr val="lt1"/>
+                </a:solidFill>
+                <a:latin typeface="+mn-lt"/>
+                <a:ea typeface="+mn-ea"/>
+                <a:cs typeface="+mn-cs"/>
+              </a:defRPr>
+            </a:lvl9pPr>
+          </a:lstStyle>
           <a:p>
             <a:pPr algn="ctr"/>
             <a:r>
@@ -4813,10 +5478,10 @@
       </p:sp>
       <p:sp>
         <p:nvSpPr>
-          <p:cNvPr id="11" name="Arrow: Left-Right 10">
+          <p:cNvPr id="10" name="Arrow: Left-Right 9">
             <a:extLst>
               <a:ext uri="{FF2B5EF4-FFF2-40B4-BE49-F238E27FC236}">
-                <a16:creationId xmlns:a16="http://schemas.microsoft.com/office/drawing/2014/main" id="{24BF4FBC-03DF-424B-A0E3-F329FE83343D}"/>
+                <a16:creationId xmlns:a16="http://schemas.microsoft.com/office/drawing/2014/main" id="{148CFDEB-B550-48BB-A10C-97488ABC0D6E}"/>
               </a:ext>
             </a:extLst>
           </p:cNvPr>
@@ -4850,7 +5515,101 @@
         </p:style>
         <p:txBody>
           <a:bodyPr lIns="91440" tIns="45720" rIns="91440" bIns="45720" rtlCol="0" anchor="ctr"/>
-          <a:lstStyle/>
+          <a:lstStyle>
+            <a:defPPr>
+              <a:defRPr lang="en-US"/>
+            </a:defPPr>
+            <a:lvl1pPr marL="0" algn="l" defTabSz="914400" rtl="0" eaLnBrk="1" latinLnBrk="0" hangingPunct="1">
+              <a:defRPr sz="1800" kern="1200">
+                <a:solidFill>
+                  <a:schemeClr val="lt1"/>
+                </a:solidFill>
+                <a:latin typeface="+mn-lt"/>
+                <a:ea typeface="+mn-ea"/>
+                <a:cs typeface="+mn-cs"/>
+              </a:defRPr>
+            </a:lvl1pPr>
+            <a:lvl2pPr marL="457200" algn="l" defTabSz="914400" rtl="0" eaLnBrk="1" latinLnBrk="0" hangingPunct="1">
+              <a:defRPr sz="1800" kern="1200">
+                <a:solidFill>
+                  <a:schemeClr val="lt1"/>
+                </a:solidFill>
+                <a:latin typeface="+mn-lt"/>
+                <a:ea typeface="+mn-ea"/>
+                <a:cs typeface="+mn-cs"/>
+              </a:defRPr>
+            </a:lvl2pPr>
+            <a:lvl3pPr marL="914400" algn="l" defTabSz="914400" rtl="0" eaLnBrk="1" latinLnBrk="0" hangingPunct="1">
+              <a:defRPr sz="1800" kern="1200">
+                <a:solidFill>
+                  <a:schemeClr val="lt1"/>
+                </a:solidFill>
+                <a:latin typeface="+mn-lt"/>
+                <a:ea typeface="+mn-ea"/>
+                <a:cs typeface="+mn-cs"/>
+              </a:defRPr>
+            </a:lvl3pPr>
+            <a:lvl4pPr marL="1371600" algn="l" defTabSz="914400" rtl="0" eaLnBrk="1" latinLnBrk="0" hangingPunct="1">
+              <a:defRPr sz="1800" kern="1200">
+                <a:solidFill>
+                  <a:schemeClr val="lt1"/>
+                </a:solidFill>
+                <a:latin typeface="+mn-lt"/>
+                <a:ea typeface="+mn-ea"/>
+                <a:cs typeface="+mn-cs"/>
+              </a:defRPr>
+            </a:lvl4pPr>
+            <a:lvl5pPr marL="1828800" algn="l" defTabSz="914400" rtl="0" eaLnBrk="1" latinLnBrk="0" hangingPunct="1">
+              <a:defRPr sz="1800" kern="1200">
+                <a:solidFill>
+                  <a:schemeClr val="lt1"/>
+                </a:solidFill>
+                <a:latin typeface="+mn-lt"/>
+                <a:ea typeface="+mn-ea"/>
+                <a:cs typeface="+mn-cs"/>
+              </a:defRPr>
+            </a:lvl5pPr>
+            <a:lvl6pPr marL="2286000" algn="l" defTabSz="914400" rtl="0" eaLnBrk="1" latinLnBrk="0" hangingPunct="1">
+              <a:defRPr sz="1800" kern="1200">
+                <a:solidFill>
+                  <a:schemeClr val="lt1"/>
+                </a:solidFill>
+                <a:latin typeface="+mn-lt"/>
+                <a:ea typeface="+mn-ea"/>
+                <a:cs typeface="+mn-cs"/>
+              </a:defRPr>
+            </a:lvl6pPr>
+            <a:lvl7pPr marL="2743200" algn="l" defTabSz="914400" rtl="0" eaLnBrk="1" latinLnBrk="0" hangingPunct="1">
+              <a:defRPr sz="1800" kern="1200">
+                <a:solidFill>
+                  <a:schemeClr val="lt1"/>
+                </a:solidFill>
+                <a:latin typeface="+mn-lt"/>
+                <a:ea typeface="+mn-ea"/>
+                <a:cs typeface="+mn-cs"/>
+              </a:defRPr>
+            </a:lvl7pPr>
+            <a:lvl8pPr marL="3200400" algn="l" defTabSz="914400" rtl="0" eaLnBrk="1" latinLnBrk="0" hangingPunct="1">
+              <a:defRPr sz="1800" kern="1200">
+                <a:solidFill>
+                  <a:schemeClr val="lt1"/>
+                </a:solidFill>
+                <a:latin typeface="+mn-lt"/>
+                <a:ea typeface="+mn-ea"/>
+                <a:cs typeface="+mn-cs"/>
+              </a:defRPr>
+            </a:lvl8pPr>
+            <a:lvl9pPr marL="3657600" algn="l" defTabSz="914400" rtl="0" eaLnBrk="1" latinLnBrk="0" hangingPunct="1">
+              <a:defRPr sz="1800" kern="1200">
+                <a:solidFill>
+                  <a:schemeClr val="lt1"/>
+                </a:solidFill>
+                <a:latin typeface="+mn-lt"/>
+                <a:ea typeface="+mn-ea"/>
+                <a:cs typeface="+mn-cs"/>
+              </a:defRPr>
+            </a:lvl9pPr>
+          </a:lstStyle>
           <a:p>
             <a:pPr algn="ctr"/>
             <a:r>
@@ -4866,7 +5625,7 @@
     </p:spTree>
     <p:extLst>
       <p:ext uri="{BB962C8B-B14F-4D97-AF65-F5344CB8AC3E}">
-        <p14:creationId xmlns:p14="http://schemas.microsoft.com/office/powerpoint/2010/main" val="1432507359"/>
+        <p14:creationId xmlns:p14="http://schemas.microsoft.com/office/powerpoint/2010/main" val="1879048696"/>
       </p:ext>
     </p:extLst>
   </p:cSld>
@@ -5116,12 +5875,53 @@
           <a:chExt cx="0" cy="0"/>
         </a:xfrm>
       </p:grpSpPr>
+      <p:sp>
+        <p:nvSpPr>
+          <p:cNvPr id="2" name="Title 1">
+            <a:extLst>
+              <a:ext uri="{FF2B5EF4-FFF2-40B4-BE49-F238E27FC236}">
+                <a16:creationId xmlns:a16="http://schemas.microsoft.com/office/drawing/2014/main" id="{9FAB3E64-09AE-468F-8DAE-E32D1D77160A}"/>
+              </a:ext>
+            </a:extLst>
+          </p:cNvPr>
+          <p:cNvSpPr>
+            <a:spLocks noGrp="1"/>
+          </p:cNvSpPr>
+          <p:nvPr>
+            <p:ph type="title"/>
+          </p:nvPr>
+        </p:nvSpPr>
+        <p:spPr>
+          <a:xfrm>
+            <a:off x="838200" y="1401647"/>
+            <a:ext cx="10515600" cy="672421"/>
+          </a:xfrm>
+        </p:spPr>
+        <p:txBody>
+          <a:bodyPr>
+            <a:normAutofit fontScale="90000"/>
+          </a:bodyPr>
+          <a:lstStyle/>
+          <a:p>
+            <a:pPr algn="ctr"/>
+            <a:r>
+              <a:rPr lang="en-US" b="1" dirty="0">
+                <a:cs typeface="Calibri Light"/>
+              </a:rPr>
+              <a:t>Arduino Components</a:t>
+            </a:r>
+            <a:endParaRPr lang="en-US">
+              <a:cs typeface="Calibri Light"/>
+            </a:endParaRPr>
+          </a:p>
+        </p:txBody>
+      </p:sp>
       <p:pic>
         <p:nvPicPr>
-          <p:cNvPr id="4" name="Picture 4">
+          <p:cNvPr id="5" name="Picture 4" descr="A picture containing text, electronics, circuit&#10;&#10;Description automatically generated">
             <a:extLst>
               <a:ext uri="{FF2B5EF4-FFF2-40B4-BE49-F238E27FC236}">
-                <a16:creationId xmlns:a16="http://schemas.microsoft.com/office/drawing/2014/main" id="{BDBACF47-108C-4487-9A9E-6121AF3F47A9}"/>
+                <a16:creationId xmlns:a16="http://schemas.microsoft.com/office/drawing/2014/main" id="{956DBD88-B644-4781-A7BC-406DEDE47509}"/>
               </a:ext>
             </a:extLst>
           </p:cNvPr>
@@ -5138,8 +5938,8 @@
         </p:blipFill>
         <p:spPr>
           <a:xfrm>
-            <a:off x="2237117" y="1566413"/>
-            <a:ext cx="7113916" cy="4932870"/>
+            <a:off x="2237117" y="2219556"/>
+            <a:ext cx="7889523" cy="4497441"/>
           </a:xfrm>
           <a:prstGeom prst="rect">
             <a:avLst/>
@@ -5149,7 +5949,7 @@
     </p:spTree>
     <p:extLst>
       <p:ext uri="{BB962C8B-B14F-4D97-AF65-F5344CB8AC3E}">
-        <p14:creationId xmlns:p14="http://schemas.microsoft.com/office/powerpoint/2010/main" val="178190900"/>
+        <p14:creationId xmlns:p14="http://schemas.microsoft.com/office/powerpoint/2010/main" val="782883573"/>
       </p:ext>
     </p:extLst>
   </p:cSld>

</xml_diff>

<commit_message>
Major changes to lecture 1 content, removed the architecture, added physical structure
</commit_message>
<xml_diff>
--- a/Lectures/ppts/Lecture 1.pptx
+++ b/Lectures/ppts/Lecture 1.pptx
@@ -9,15 +9,14 @@
     <p:sldId id="257" r:id="rId3"/>
     <p:sldId id="269" r:id="rId4"/>
     <p:sldId id="259" r:id="rId5"/>
-    <p:sldId id="260" r:id="rId6"/>
-    <p:sldId id="270" r:id="rId7"/>
-    <p:sldId id="271" r:id="rId8"/>
-    <p:sldId id="263" r:id="rId9"/>
-    <p:sldId id="272" r:id="rId10"/>
-    <p:sldId id="265" r:id="rId11"/>
-    <p:sldId id="267" r:id="rId12"/>
-    <p:sldId id="266" r:id="rId13"/>
-    <p:sldId id="268" r:id="rId14"/>
+    <p:sldId id="273" r:id="rId6"/>
+    <p:sldId id="263" r:id="rId7"/>
+    <p:sldId id="272" r:id="rId8"/>
+    <p:sldId id="274" r:id="rId9"/>
+    <p:sldId id="265" r:id="rId10"/>
+    <p:sldId id="267" r:id="rId11"/>
+    <p:sldId id="266" r:id="rId12"/>
+    <p:sldId id="268" r:id="rId13"/>
   </p:sldIdLst>
   <p:sldSz cx="12192000" cy="6858000"/>
   <p:notesSz cx="6858000" cy="9144000"/>
@@ -130,6 +129,7 @@
     <p1510:client id="{172E45A2-F847-4168-B85D-2A6E15CA05F9}" v="937" dt="2021-03-18T11:25:37.716"/>
     <p1510:client id="{4DF9E816-8842-4C54-9538-EB279F492630}" v="1100" dt="2021-03-18T09:50:27.738"/>
     <p1510:client id="{7AA2D569-56AE-4B47-8103-3BBF1A9DE3DB}" v="174" dt="2021-03-21T22:19:54.194"/>
+    <p1510:client id="{884114CD-C0FF-4257-806A-E47D5DC99721}" v="333" dt="2021-03-22T16:25:52.501"/>
   </p1510:revLst>
 </p1510:revInfo>
 </file>
@@ -263,7 +263,7 @@
           <a:p>
             <a:fld id="{7EADE604-6095-4678-BC07-E2D82692C32E}" type="datetimeFigureOut">
               <a:rPr lang="en-US" smtClean="0"/>
-              <a:t>3/21/2021</a:t>
+              <a:t>3/22/2021</a:t>
             </a:fld>
             <a:endParaRPr lang="en-US"/>
           </a:p>
@@ -443,7 +443,7 @@
           <a:p>
             <a:fld id="{7EADE604-6095-4678-BC07-E2D82692C32E}" type="datetimeFigureOut">
               <a:rPr lang="en-US" smtClean="0"/>
-              <a:t>3/21/2021</a:t>
+              <a:t>3/22/2021</a:t>
             </a:fld>
             <a:endParaRPr lang="en-US"/>
           </a:p>
@@ -633,7 +633,7 @@
           <a:p>
             <a:fld id="{7EADE604-6095-4678-BC07-E2D82692C32E}" type="datetimeFigureOut">
               <a:rPr lang="en-US" smtClean="0"/>
-              <a:t>3/21/2021</a:t>
+              <a:t>3/22/2021</a:t>
             </a:fld>
             <a:endParaRPr lang="en-US"/>
           </a:p>
@@ -813,7 +813,7 @@
           <a:p>
             <a:fld id="{7EADE604-6095-4678-BC07-E2D82692C32E}" type="datetimeFigureOut">
               <a:rPr lang="en-US" smtClean="0"/>
-              <a:t>3/21/2021</a:t>
+              <a:t>3/22/2021</a:t>
             </a:fld>
             <a:endParaRPr lang="en-US"/>
           </a:p>
@@ -1070,7 +1070,7 @@
           <a:p>
             <a:fld id="{7EADE604-6095-4678-BC07-E2D82692C32E}" type="datetimeFigureOut">
               <a:rPr lang="en-US" smtClean="0"/>
-              <a:t>3/21/2021</a:t>
+              <a:t>3/22/2021</a:t>
             </a:fld>
             <a:endParaRPr lang="en-US"/>
           </a:p>
@@ -1311,7 +1311,7 @@
           <a:p>
             <a:fld id="{7EADE604-6095-4678-BC07-E2D82692C32E}" type="datetimeFigureOut">
               <a:rPr lang="en-US" smtClean="0"/>
-              <a:t>3/21/2021</a:t>
+              <a:t>3/22/2021</a:t>
             </a:fld>
             <a:endParaRPr lang="en-US"/>
           </a:p>
@@ -1687,7 +1687,7 @@
           <a:p>
             <a:fld id="{7EADE604-6095-4678-BC07-E2D82692C32E}" type="datetimeFigureOut">
               <a:rPr lang="en-US" smtClean="0"/>
-              <a:t>3/21/2021</a:t>
+              <a:t>3/22/2021</a:t>
             </a:fld>
             <a:endParaRPr lang="en-US"/>
           </a:p>
@@ -1816,7 +1816,7 @@
           <a:p>
             <a:fld id="{7EADE604-6095-4678-BC07-E2D82692C32E}" type="datetimeFigureOut">
               <a:rPr lang="en-US" smtClean="0"/>
-              <a:t>3/21/2021</a:t>
+              <a:t>3/22/2021</a:t>
             </a:fld>
             <a:endParaRPr lang="en-US"/>
           </a:p>
@@ -1923,7 +1923,7 @@
           <a:p>
             <a:fld id="{7EADE604-6095-4678-BC07-E2D82692C32E}" type="datetimeFigureOut">
               <a:rPr lang="en-US" smtClean="0"/>
-              <a:t>3/21/2021</a:t>
+              <a:t>3/22/2021</a:t>
             </a:fld>
             <a:endParaRPr lang="en-US"/>
           </a:p>
@@ -2210,7 +2210,7 @@
           <a:p>
             <a:fld id="{7EADE604-6095-4678-BC07-E2D82692C32E}" type="datetimeFigureOut">
               <a:rPr lang="en-US" smtClean="0"/>
-              <a:t>3/21/2021</a:t>
+              <a:t>3/22/2021</a:t>
             </a:fld>
             <a:endParaRPr lang="en-US"/>
           </a:p>
@@ -2474,7 +2474,7 @@
           <a:p>
             <a:fld id="{7EADE604-6095-4678-BC07-E2D82692C32E}" type="datetimeFigureOut">
               <a:rPr lang="en-US" smtClean="0"/>
-              <a:t>3/21/2021</a:t>
+              <a:t>3/22/2021</a:t>
             </a:fld>
             <a:endParaRPr lang="en-US"/>
           </a:p>
@@ -2697,7 +2697,7 @@
           <a:p>
             <a:fld id="{7EADE604-6095-4678-BC07-E2D82692C32E}" type="datetimeFigureOut">
               <a:rPr lang="en-US" smtClean="0"/>
-              <a:t>3/21/2021</a:t>
+              <a:t>3/22/2021</a:t>
             </a:fld>
             <a:endParaRPr lang="en-US"/>
           </a:p>
@@ -3279,7 +3279,7 @@
                 <a:latin typeface="Times New Roman"/>
                 <a:cs typeface="Calibri Light"/>
               </a:rPr>
-              <a:t>Architecture, Components and real-world applications of Arduino</a:t>
+              <a:t>Physical Structure, Components and real-world applications of Arduino</a:t>
             </a:r>
             <a:endParaRPr lang="en-US" b="1" dirty="0">
               <a:latin typeface="Times New Roman"/>
@@ -3334,7 +3334,7 @@
           <p:cNvPr id="2" name="Title 1">
             <a:extLst>
               <a:ext uri="{FF2B5EF4-FFF2-40B4-BE49-F238E27FC236}">
-                <a16:creationId xmlns:a16="http://schemas.microsoft.com/office/drawing/2014/main" id="{66017C41-FB68-41B3-9319-E44E527F4C0B}"/>
+                <a16:creationId xmlns:a16="http://schemas.microsoft.com/office/drawing/2014/main" id="{A59AEBF3-1A28-4904-8626-7D8AFAB400A5}"/>
               </a:ext>
             </a:extLst>
           </p:cNvPr>
@@ -3345,12 +3345,7 @@
             <p:ph type="title"/>
           </p:nvPr>
         </p:nvSpPr>
-        <p:spPr>
-          <a:xfrm>
-            <a:off x="838200" y="1401647"/>
-            <a:ext cx="10515600" cy="937375"/>
-          </a:xfrm>
-        </p:spPr>
+        <p:spPr/>
         <p:txBody>
           <a:bodyPr/>
           <a:lstStyle/>
@@ -3360,11 +3355,8 @@
               <a:rPr lang="en-US" b="1" dirty="0">
                 <a:cs typeface="Calibri Light"/>
               </a:rPr>
-              <a:t>Real-world Applications of Arduino</a:t>
-            </a:r>
-            <a:endParaRPr lang="en-US" dirty="0">
-              <a:cs typeface="Calibri Light"/>
-            </a:endParaRPr>
+              <a:t>Must-have Tools ….</a:t>
+            </a:r>
           </a:p>
         </p:txBody>
       </p:sp>
@@ -3373,7 +3365,7 @@
           <p:cNvPr id="3" name="Content Placeholder 2">
             <a:extLst>
               <a:ext uri="{FF2B5EF4-FFF2-40B4-BE49-F238E27FC236}">
-                <a16:creationId xmlns:a16="http://schemas.microsoft.com/office/drawing/2014/main" id="{3EA8C052-30A4-42B4-9F7F-41B2B8F70681}"/>
+                <a16:creationId xmlns:a16="http://schemas.microsoft.com/office/drawing/2014/main" id="{67A02BCE-7241-4F42-BB56-2A8B71CE1657}"/>
               </a:ext>
             </a:extLst>
           </p:cNvPr>
@@ -3384,15 +3376,10 @@
             <p:ph idx="1"/>
           </p:nvPr>
         </p:nvSpPr>
-        <p:spPr>
-          <a:xfrm>
-            <a:off x="838200" y="2353338"/>
-            <a:ext cx="10515600" cy="3823624"/>
-          </a:xfrm>
-        </p:spPr>
+        <p:spPr/>
         <p:txBody>
           <a:bodyPr vert="horz" lIns="91440" tIns="45720" rIns="91440" bIns="45720" rtlCol="0" anchor="t">
-            <a:normAutofit fontScale="92500"/>
+            <a:normAutofit/>
           </a:bodyPr>
           <a:lstStyle/>
           <a:p>
@@ -3400,39 +3387,69 @@
               <a:rPr lang="en-US" dirty="0">
                 <a:cs typeface="Calibri"/>
               </a:rPr>
-              <a:t>With the Arduino board we can control the Home, Office and Industrial activities with the control systems such as motion sensors, outlet control, temperature sensors, blower control, garage door control, air flow control and many others.</a:t>
-            </a:r>
-          </a:p>
-          <a:p>
+              <a:t>Simulation </a:t>
+            </a:r>
+            <a:r>
+              <a:rPr lang="en-US">
+                <a:cs typeface="Calibri"/>
+              </a:rPr>
+              <a:t>software</a:t>
+            </a:r>
             <a:r>
               <a:rPr lang="en-US" dirty="0">
                 <a:cs typeface="Calibri"/>
               </a:rPr>
-              <a:t>Arduino can be used in many industrial control and automation systems.</a:t>
-            </a:r>
-          </a:p>
-          <a:p>
+              <a:t> (</a:t>
+            </a:r>
+            <a:r>
+              <a:rPr lang="en-US" err="1">
+                <a:cs typeface="Calibri"/>
+              </a:rPr>
+              <a:t>e.g</a:t>
+            </a:r>
             <a:r>
               <a:rPr lang="en-US" dirty="0">
                 <a:cs typeface="Calibri"/>
               </a:rPr>
-              <a:t>Using different top technologies like AI, ML, IoT and many others, we can interface an Arduino board to produce more and more intelligent devices and systems.</a:t>
-            </a:r>
+              <a:t> Proteus, Fritzing)</a:t>
+            </a:r>
+          </a:p>
+          <a:p>
+            <a:r>
+              <a:rPr lang="en-US">
+                <a:cs typeface="Calibri"/>
+              </a:rPr>
+              <a:t>Circuit designing tools (e.g Fritzing, Proteus, LibrePCB)</a:t>
+            </a:r>
+            <a:endParaRPr lang="en-US" dirty="0">
+              <a:cs typeface="Calibri"/>
+            </a:endParaRPr>
           </a:p>
           <a:p>
             <a:r>
               <a:rPr lang="en-US" dirty="0">
                 <a:cs typeface="Calibri"/>
               </a:rPr>
-              <a:t>Arduino is an open-source, it is just an electronics prototyping board.</a:t>
-            </a:r>
+              <a:t>Arduino IDE (very important)</a:t>
+            </a:r>
+          </a:p>
+          <a:p>
+            <a:r>
+              <a:rPr lang="en-US">
+                <a:cs typeface="Calibri"/>
+              </a:rPr>
+              <a:t>Arduino Kit</a:t>
+            </a:r>
+            <a:endParaRPr lang="en-US" dirty="0">
+              <a:cs typeface="Calibri"/>
+            </a:endParaRPr>
           </a:p>
         </p:txBody>
       </p:sp>
     </p:spTree>
     <p:extLst>
       <p:ext uri="{BB962C8B-B14F-4D97-AF65-F5344CB8AC3E}">
-        <p14:creationId xmlns:p14="http://schemas.microsoft.com/office/powerpoint/2010/main" val="1219236234"/>
+        <p14:creationId xmlns:p14="http://schemas.microsoft.com/office/powerpoint/2010/main" val="3406205797"/>
       </p:ext>
     </p:extLst>
   </p:cSld>
@@ -3476,165 +3493,6 @@
           <p:cNvPr id="2" name="Title 1">
             <a:extLst>
               <a:ext uri="{FF2B5EF4-FFF2-40B4-BE49-F238E27FC236}">
-                <a16:creationId xmlns:a16="http://schemas.microsoft.com/office/drawing/2014/main" id="{A59AEBF3-1A28-4904-8626-7D8AFAB400A5}"/>
-              </a:ext>
-            </a:extLst>
-          </p:cNvPr>
-          <p:cNvSpPr>
-            <a:spLocks noGrp="1"/>
-          </p:cNvSpPr>
-          <p:nvPr>
-            <p:ph type="title"/>
-          </p:nvPr>
-        </p:nvSpPr>
-        <p:spPr/>
-        <p:txBody>
-          <a:bodyPr/>
-          <a:lstStyle/>
-          <a:p>
-            <a:pPr algn="ctr"/>
-            <a:r>
-              <a:rPr lang="en-US" b="1" dirty="0">
-                <a:cs typeface="Calibri Light"/>
-              </a:rPr>
-              <a:t>Must-have Tools ….</a:t>
-            </a:r>
-          </a:p>
-        </p:txBody>
-      </p:sp>
-      <p:sp>
-        <p:nvSpPr>
-          <p:cNvPr id="3" name="Content Placeholder 2">
-            <a:extLst>
-              <a:ext uri="{FF2B5EF4-FFF2-40B4-BE49-F238E27FC236}">
-                <a16:creationId xmlns:a16="http://schemas.microsoft.com/office/drawing/2014/main" id="{67A02BCE-7241-4F42-BB56-2A8B71CE1657}"/>
-              </a:ext>
-            </a:extLst>
-          </p:cNvPr>
-          <p:cNvSpPr>
-            <a:spLocks noGrp="1"/>
-          </p:cNvSpPr>
-          <p:nvPr>
-            <p:ph idx="1"/>
-          </p:nvPr>
-        </p:nvSpPr>
-        <p:spPr/>
-        <p:txBody>
-          <a:bodyPr vert="horz" lIns="91440" tIns="45720" rIns="91440" bIns="45720" rtlCol="0" anchor="t">
-            <a:normAutofit/>
-          </a:bodyPr>
-          <a:lstStyle/>
-          <a:p>
-            <a:r>
-              <a:rPr lang="en-US" dirty="0">
-                <a:cs typeface="Calibri"/>
-              </a:rPr>
-              <a:t>Simulation </a:t>
-            </a:r>
-            <a:r>
-              <a:rPr lang="en-US">
-                <a:cs typeface="Calibri"/>
-              </a:rPr>
-              <a:t>software</a:t>
-            </a:r>
-            <a:r>
-              <a:rPr lang="en-US" dirty="0">
-                <a:cs typeface="Calibri"/>
-              </a:rPr>
-              <a:t> (</a:t>
-            </a:r>
-            <a:r>
-              <a:rPr lang="en-US" err="1">
-                <a:cs typeface="Calibri"/>
-              </a:rPr>
-              <a:t>e.g</a:t>
-            </a:r>
-            <a:r>
-              <a:rPr lang="en-US" dirty="0">
-                <a:cs typeface="Calibri"/>
-              </a:rPr>
-              <a:t> Proteus, Fritzing)</a:t>
-            </a:r>
-          </a:p>
-          <a:p>
-            <a:r>
-              <a:rPr lang="en-US">
-                <a:cs typeface="Calibri"/>
-              </a:rPr>
-              <a:t>Circuit designing tools (e.g Fritzing, Proteus, LibrePCB)</a:t>
-            </a:r>
-            <a:endParaRPr lang="en-US" dirty="0">
-              <a:cs typeface="Calibri"/>
-            </a:endParaRPr>
-          </a:p>
-          <a:p>
-            <a:r>
-              <a:rPr lang="en-US" dirty="0">
-                <a:cs typeface="Calibri"/>
-              </a:rPr>
-              <a:t>Arduino IDE (very important)</a:t>
-            </a:r>
-          </a:p>
-          <a:p>
-            <a:r>
-              <a:rPr lang="en-US">
-                <a:cs typeface="Calibri"/>
-              </a:rPr>
-              <a:t>Arduino Kit</a:t>
-            </a:r>
-            <a:endParaRPr lang="en-US" dirty="0">
-              <a:cs typeface="Calibri"/>
-            </a:endParaRPr>
-          </a:p>
-        </p:txBody>
-      </p:sp>
-    </p:spTree>
-    <p:extLst>
-      <p:ext uri="{BB962C8B-B14F-4D97-AF65-F5344CB8AC3E}">
-        <p14:creationId xmlns:p14="http://schemas.microsoft.com/office/powerpoint/2010/main" val="3406205797"/>
-      </p:ext>
-    </p:extLst>
-  </p:cSld>
-  <p:clrMapOvr>
-    <a:masterClrMapping/>
-  </p:clrMapOvr>
-  <mc:AlternateContent xmlns:mc="http://schemas.openxmlformats.org/markup-compatibility/2006" xmlns:p14="http://schemas.microsoft.com/office/powerpoint/2010/main">
-    <mc:Choice Requires="p14">
-      <p:transition spd="med" p14:dur="700">
-        <p:fade/>
-      </p:transition>
-    </mc:Choice>
-    <mc:Fallback xmlns="">
-      <p:transition spd="med">
-        <p:fade/>
-      </p:transition>
-    </mc:Fallback>
-  </mc:AlternateContent>
-</p:sld>
-</file>
-
-<file path=ppt/slides/slide12.xml><?xml version="1.0" encoding="utf-8"?>
-<p:sld xmlns:a="http://schemas.openxmlformats.org/drawingml/2006/main" xmlns:r="http://schemas.openxmlformats.org/officeDocument/2006/relationships" xmlns:p="http://schemas.openxmlformats.org/presentationml/2006/main">
-  <p:cSld>
-    <p:spTree>
-      <p:nvGrpSpPr>
-        <p:cNvPr id="1" name=""/>
-        <p:cNvGrpSpPr/>
-        <p:nvPr/>
-      </p:nvGrpSpPr>
-      <p:grpSpPr>
-        <a:xfrm>
-          <a:off x="0" y="0"/>
-          <a:ext cx="0" cy="0"/>
-          <a:chOff x="0" y="0"/>
-          <a:chExt cx="0" cy="0"/>
-        </a:xfrm>
-      </p:grpSpPr>
-      <p:sp>
-        <p:nvSpPr>
-          <p:cNvPr id="2" name="Title 1">
-            <a:extLst>
-              <a:ext uri="{FF2B5EF4-FFF2-40B4-BE49-F238E27FC236}">
                 <a16:creationId xmlns:a16="http://schemas.microsoft.com/office/drawing/2014/main" id="{055B3812-4607-4E23-8DB2-37785B6A1EE1}"/>
               </a:ext>
             </a:extLst>
@@ -3774,7 +3632,7 @@
 </p:sld>
 </file>
 
-<file path=ppt/slides/slide13.xml><?xml version="1.0" encoding="utf-8"?>
+<file path=ppt/slides/slide12.xml><?xml version="1.0" encoding="utf-8"?>
 <p:sld xmlns:a="http://schemas.openxmlformats.org/drawingml/2006/main" xmlns:r="http://schemas.openxmlformats.org/officeDocument/2006/relationships" xmlns:p="http://schemas.openxmlformats.org/presentationml/2006/main">
   <p:cSld>
     <p:spTree>
@@ -4155,92 +4013,41 @@
                 <a:latin typeface="Times New Roman"/>
                 <a:cs typeface="Calibri Light"/>
               </a:rPr>
-              <a:t>Arduino Architecture</a:t>
-            </a:r>
-            <a:endParaRPr lang="en-US">
-              <a:latin typeface="Times New Roman"/>
-            </a:endParaRPr>
-          </a:p>
-        </p:txBody>
-      </p:sp>
-      <p:sp>
-        <p:nvSpPr>
-          <p:cNvPr id="3" name="Content Placeholder 2">
+              <a:t>Different types of Arduino Boards</a:t>
+            </a:r>
+          </a:p>
+        </p:txBody>
+      </p:sp>
+      <p:pic>
+        <p:nvPicPr>
+          <p:cNvPr id="7" name="Picture 7" descr="A picture containing text, electronics, circuit&#10;&#10;Description automatically generated">
             <a:extLst>
               <a:ext uri="{FF2B5EF4-FFF2-40B4-BE49-F238E27FC236}">
-                <a16:creationId xmlns:a16="http://schemas.microsoft.com/office/drawing/2014/main" id="{34C672AA-2A87-4807-A18D-AFB348166407}"/>
+                <a16:creationId xmlns:a16="http://schemas.microsoft.com/office/drawing/2014/main" id="{1D672FE7-905A-4DB3-8A3B-C8A199593DFE}"/>
               </a:ext>
             </a:extLst>
           </p:cNvPr>
-          <p:cNvSpPr>
-            <a:spLocks noGrp="1"/>
-          </p:cNvSpPr>
-          <p:nvPr>
-            <p:ph idx="1"/>
-          </p:nvPr>
-        </p:nvSpPr>
+          <p:cNvPicPr>
+            <a:picLocks noChangeAspect="1"/>
+          </p:cNvPicPr>
+          <p:nvPr/>
+        </p:nvPicPr>
+        <p:blipFill>
+          <a:blip r:embed="rId2"/>
+          <a:stretch>
+            <a:fillRect/>
+          </a:stretch>
+        </p:blipFill>
         <p:spPr>
           <a:xfrm>
-            <a:off x="838200" y="2390309"/>
-            <a:ext cx="10515600" cy="3786653"/>
+            <a:off x="2914650" y="2169802"/>
+            <a:ext cx="6335485" cy="4110431"/>
           </a:xfrm>
+          <a:prstGeom prst="rect">
+            <a:avLst/>
+          </a:prstGeom>
         </p:spPr>
-        <p:txBody>
-          <a:bodyPr vert="horz" lIns="91440" tIns="45720" rIns="91440" bIns="45720" rtlCol="0" anchor="t">
-            <a:normAutofit/>
-          </a:bodyPr>
-          <a:lstStyle/>
-          <a:p>
-            <a:r>
-              <a:rPr lang="en-US" dirty="0">
-                <a:cs typeface="Calibri"/>
-              </a:rPr>
-              <a:t>Simply, Arduino's processor uses the Harvard architecture where the program code and program data have separate memory.</a:t>
-            </a:r>
-          </a:p>
-          <a:p>
-            <a:r>
-              <a:rPr lang="en-US" dirty="0">
-                <a:cs typeface="Calibri"/>
-              </a:rPr>
-              <a:t>It consists of two memory namely Program memory and Data memory.</a:t>
-            </a:r>
-          </a:p>
-          <a:p>
-            <a:r>
-              <a:rPr lang="en-US" dirty="0">
-                <a:cs typeface="Calibri"/>
-              </a:rPr>
-              <a:t>The code is stored in the flash memory, whereas the data is stored in the data memory.</a:t>
-            </a:r>
-          </a:p>
-          <a:p>
-            <a:r>
-              <a:rPr lang="en-US" dirty="0">
-                <a:cs typeface="Calibri"/>
-              </a:rPr>
-              <a:t>The Harvard architecture allows more </a:t>
-            </a:r>
-            <a:r>
-              <a:rPr lang="en-US" dirty="0" err="1">
-                <a:cs typeface="Calibri"/>
-              </a:rPr>
-              <a:t>that</a:t>
-            </a:r>
-            <a:r>
-              <a:rPr lang="en-US" dirty="0">
-                <a:cs typeface="Calibri"/>
-              </a:rPr>
-              <a:t> one memory transaction simultaneously through the use of two memory spaces.</a:t>
-            </a:r>
-          </a:p>
-          <a:p>
-            <a:endParaRPr lang="en-US" dirty="0">
-              <a:cs typeface="Calibri"/>
-            </a:endParaRPr>
-          </a:p>
-        </p:txBody>
-      </p:sp>
+      </p:pic>
     </p:spTree>
     <p:extLst>
       <p:ext uri="{BB962C8B-B14F-4D97-AF65-F5344CB8AC3E}">
@@ -4288,7 +4095,7 @@
           <p:cNvPr id="2" name="Title 1">
             <a:extLst>
               <a:ext uri="{FF2B5EF4-FFF2-40B4-BE49-F238E27FC236}">
-                <a16:creationId xmlns:a16="http://schemas.microsoft.com/office/drawing/2014/main" id="{6D15113C-D4FA-456D-A98C-74F1F7691ED7}"/>
+                <a16:creationId xmlns:a16="http://schemas.microsoft.com/office/drawing/2014/main" id="{1F5CFA65-0625-4D69-AA04-0E328B6B895B}"/>
               </a:ext>
             </a:extLst>
           </p:cNvPr>
@@ -4302,7 +4109,7 @@
         <p:spPr>
           <a:xfrm>
             <a:off x="838200" y="1401647"/>
-            <a:ext cx="10515600" cy="1107849"/>
+            <a:ext cx="10515600" cy="754063"/>
           </a:xfrm>
         </p:spPr>
         <p:txBody>
@@ -4314,96 +4121,1191 @@
               <a:rPr lang="en-US" b="1" dirty="0">
                 <a:cs typeface="Calibri Light"/>
               </a:rPr>
-              <a:t>Arduino Architecture </a:t>
-            </a:r>
-            <a:r>
-              <a:rPr lang="en-US" b="1" dirty="0" err="1">
-                <a:cs typeface="Calibri Light"/>
-              </a:rPr>
-              <a:t>Cont</a:t>
-            </a:r>
-            <a:r>
-              <a:rPr lang="en-US" b="1" dirty="0">
-                <a:cs typeface="Calibri Light"/>
-              </a:rPr>
-              <a:t> ...</a:t>
-            </a:r>
-          </a:p>
-        </p:txBody>
-      </p:sp>
-      <p:sp>
-        <p:nvSpPr>
-          <p:cNvPr id="3" name="Content Placeholder 2">
+              <a:t>Differences of the Arduino Boards</a:t>
+            </a:r>
+          </a:p>
+        </p:txBody>
+      </p:sp>
+      <p:graphicFrame>
+        <p:nvGraphicFramePr>
+          <p:cNvPr id="5" name="Table 4">
             <a:extLst>
               <a:ext uri="{FF2B5EF4-FFF2-40B4-BE49-F238E27FC236}">
-                <a16:creationId xmlns:a16="http://schemas.microsoft.com/office/drawing/2014/main" id="{46EB9C78-9B4C-4FD5-ABA4-229B858B5EB0}"/>
+                <a16:creationId xmlns:a16="http://schemas.microsoft.com/office/drawing/2014/main" id="{69A47D6E-495F-4FCA-9014-76A72612F09F}"/>
               </a:ext>
             </a:extLst>
           </p:cNvPr>
-          <p:cNvSpPr>
-            <a:spLocks noGrp="1"/>
-          </p:cNvSpPr>
-          <p:nvPr>
-            <p:ph idx="1"/>
-          </p:nvPr>
-        </p:nvSpPr>
-        <p:spPr>
-          <a:xfrm>
-            <a:off x="838200" y="2444737"/>
-            <a:ext cx="10515600" cy="3732225"/>
-          </a:xfrm>
-        </p:spPr>
-        <p:txBody>
-          <a:bodyPr vert="horz" lIns="91440" tIns="45720" rIns="91440" bIns="45720" rtlCol="0" anchor="t">
-            <a:normAutofit fontScale="92500" lnSpcReduction="20000"/>
-          </a:bodyPr>
-          <a:lstStyle/>
-          <a:p>
-            <a:r>
-              <a:rPr lang="en-US" dirty="0">
-                <a:cs typeface="Calibri"/>
-              </a:rPr>
-              <a:t>In the Harvard architecture the un-occupied data memory cannot be used by instructions and the free instructions cannot be used by data.</a:t>
-            </a:r>
-          </a:p>
-          <a:p>
-            <a:r>
-              <a:rPr lang="en-US" dirty="0">
-                <a:cs typeface="Calibri"/>
-              </a:rPr>
-              <a:t>Memory dedicated to each unit has to be balanced carefully.</a:t>
-            </a:r>
-          </a:p>
-          <a:p>
-            <a:r>
-              <a:rPr lang="en-US" dirty="0">
-                <a:cs typeface="Calibri"/>
-              </a:rPr>
-              <a:t>Harvard architecture is primarily for small embedded systems and signal processing.</a:t>
-            </a:r>
-          </a:p>
-          <a:p>
-            <a:r>
-              <a:rPr lang="en-US" dirty="0">
-                <a:cs typeface="Calibri"/>
-              </a:rPr>
-              <a:t>A Harvard architecture system can be thus faster for a given circuit complexity because instruction fetches and data access do not contend for a single memory pathway.</a:t>
-            </a:r>
-          </a:p>
-          <a:p>
-            <a:r>
-              <a:rPr lang="en-US" dirty="0">
-                <a:cs typeface="Calibri"/>
-              </a:rPr>
-              <a:t>Also the Harvard architecture has distinct code and data address spaces meaning address zero is not the same as data address zero.</a:t>
-            </a:r>
-          </a:p>
-        </p:txBody>
-      </p:sp>
+          <p:cNvGraphicFramePr>
+            <a:graphicFrameLocks noGrp="1"/>
+          </p:cNvGraphicFramePr>
+          <p:nvPr>
+            <p:extLst>
+              <p:ext uri="{D42A27DB-BD31-4B8C-83A1-F6EECF244321}">
+                <p14:modId xmlns:p14="http://schemas.microsoft.com/office/powerpoint/2010/main" val="1868156549"/>
+              </p:ext>
+            </p:extLst>
+          </p:nvPr>
+        </p:nvGraphicFramePr>
+        <p:xfrm>
+          <a:off x="979714" y="2122714"/>
+          <a:ext cx="9948319" cy="4517570"/>
+        </p:xfrm>
+        <a:graphic>
+          <a:graphicData uri="http://schemas.openxmlformats.org/drawingml/2006/table">
+            <a:tbl>
+              <a:tblPr firstRow="1" bandRow="1">
+                <a:tableStyleId>{5C22544A-7EE6-4342-B048-85BDC9FD1C3A}</a:tableStyleId>
+              </a:tblPr>
+              <a:tblGrid>
+                <a:gridCol w="1757252">
+                  <a:extLst>
+                    <a:ext uri="{9D8B030D-6E8A-4147-A177-3AD203B41FA5}">
+                      <a16:colId xmlns:a16="http://schemas.microsoft.com/office/drawing/2014/main" val="2854702907"/>
+                    </a:ext>
+                  </a:extLst>
+                </a:gridCol>
+                <a:gridCol w="1842281">
+                  <a:extLst>
+                    <a:ext uri="{9D8B030D-6E8A-4147-A177-3AD203B41FA5}">
+                      <a16:colId xmlns:a16="http://schemas.microsoft.com/office/drawing/2014/main" val="1656693118"/>
+                    </a:ext>
+                  </a:extLst>
+                </a:gridCol>
+                <a:gridCol w="2919309">
+                  <a:extLst>
+                    <a:ext uri="{9D8B030D-6E8A-4147-A177-3AD203B41FA5}">
+                      <a16:colId xmlns:a16="http://schemas.microsoft.com/office/drawing/2014/main" val="2049595652"/>
+                    </a:ext>
+                  </a:extLst>
+                </a:gridCol>
+                <a:gridCol w="1564821">
+                  <a:extLst>
+                    <a:ext uri="{9D8B030D-6E8A-4147-A177-3AD203B41FA5}">
+                      <a16:colId xmlns:a16="http://schemas.microsoft.com/office/drawing/2014/main" val="1740149665"/>
+                    </a:ext>
+                  </a:extLst>
+                </a:gridCol>
+                <a:gridCol w="1864656">
+                  <a:extLst>
+                    <a:ext uri="{9D8B030D-6E8A-4147-A177-3AD203B41FA5}">
+                      <a16:colId xmlns:a16="http://schemas.microsoft.com/office/drawing/2014/main" val="1422245641"/>
+                    </a:ext>
+                  </a:extLst>
+                </a:gridCol>
+              </a:tblGrid>
+              <a:tr h="691753">
+                <a:tc>
+                  <a:txBody>
+                    <a:bodyPr/>
+                    <a:lstStyle/>
+                    <a:p>
+                      <a:pPr algn="ctr" fontAlgn="ctr"/>
+                      <a:r>
+                        <a:rPr lang="en-US">
+                          <a:effectLst/>
+                        </a:rPr>
+                        <a:t>Arduino Board</a:t>
+                      </a:r>
+                    </a:p>
+                  </a:txBody>
+                  <a:tcPr marL="0" marR="0" marT="0" marB="0" anchor="ctr">
+                    <a:lnL w="12700">
+                      <a:solidFill>
+                        <a:schemeClr val="tx1"/>
+                      </a:solidFill>
+                    </a:lnL>
+                    <a:lnR w="12700">
+                      <a:solidFill>
+                        <a:schemeClr val="tx1"/>
+                      </a:solidFill>
+                    </a:lnR>
+                    <a:lnT w="12700">
+                      <a:solidFill>
+                        <a:schemeClr val="tx1"/>
+                      </a:solidFill>
+                    </a:lnT>
+                    <a:lnB w="12700">
+                      <a:solidFill>
+                        <a:schemeClr val="tx1"/>
+                      </a:solidFill>
+                    </a:lnB>
+                    <a:solidFill>
+                      <a:schemeClr val="accent2">
+                        <a:lumMod val="75000"/>
+                      </a:schemeClr>
+                    </a:solidFill>
+                  </a:tcPr>
+                </a:tc>
+                <a:tc>
+                  <a:txBody>
+                    <a:bodyPr/>
+                    <a:lstStyle/>
+                    <a:p>
+                      <a:pPr algn="ctr" fontAlgn="ctr"/>
+                      <a:r>
+                        <a:rPr lang="en-US">
+                          <a:effectLst/>
+                        </a:rPr>
+                        <a:t>Core Unit</a:t>
+                      </a:r>
+                    </a:p>
+                  </a:txBody>
+                  <a:tcPr marL="0" marR="0" marT="0" marB="0" anchor="ctr">
+                    <a:lnL w="12700">
+                      <a:solidFill>
+                        <a:schemeClr val="tx1"/>
+                      </a:solidFill>
+                    </a:lnL>
+                    <a:lnR w="12700">
+                      <a:solidFill>
+                        <a:schemeClr val="tx1"/>
+                      </a:solidFill>
+                    </a:lnR>
+                    <a:lnT w="12700">
+                      <a:solidFill>
+                        <a:schemeClr val="tx1"/>
+                      </a:solidFill>
+                    </a:lnT>
+                    <a:lnB w="12700">
+                      <a:solidFill>
+                        <a:schemeClr val="tx1"/>
+                      </a:solidFill>
+                    </a:lnB>
+                    <a:solidFill>
+                      <a:schemeClr val="accent2">
+                        <a:lumMod val="75000"/>
+                      </a:schemeClr>
+                    </a:solidFill>
+                  </a:tcPr>
+                </a:tc>
+                <a:tc>
+                  <a:txBody>
+                    <a:bodyPr/>
+                    <a:lstStyle/>
+                    <a:p>
+                      <a:pPr algn="ctr" fontAlgn="ctr"/>
+                      <a:r>
+                        <a:rPr lang="en-US">
+                          <a:effectLst/>
+                        </a:rPr>
+                        <a:t>Memory, SRAM, EEPROM</a:t>
+                      </a:r>
+                    </a:p>
+                  </a:txBody>
+                  <a:tcPr marL="0" marR="0" marT="0" marB="0" anchor="ctr">
+                    <a:lnL w="12700">
+                      <a:solidFill>
+                        <a:schemeClr val="tx1"/>
+                      </a:solidFill>
+                    </a:lnL>
+                    <a:lnR w="12700">
+                      <a:solidFill>
+                        <a:schemeClr val="tx1"/>
+                      </a:solidFill>
+                    </a:lnR>
+                    <a:lnT w="12700">
+                      <a:solidFill>
+                        <a:schemeClr val="tx1"/>
+                      </a:solidFill>
+                    </a:lnT>
+                    <a:lnB w="12700">
+                      <a:solidFill>
+                        <a:schemeClr val="tx1"/>
+                      </a:solidFill>
+                    </a:lnB>
+                    <a:solidFill>
+                      <a:schemeClr val="accent2">
+                        <a:lumMod val="75000"/>
+                      </a:schemeClr>
+                    </a:solidFill>
+                  </a:tcPr>
+                </a:tc>
+                <a:tc>
+                  <a:txBody>
+                    <a:bodyPr/>
+                    <a:lstStyle/>
+                    <a:p>
+                      <a:pPr algn="ctr" fontAlgn="ctr"/>
+                      <a:r>
+                        <a:rPr lang="en-US">
+                          <a:effectLst/>
+                        </a:rPr>
+                        <a:t>Digital I/O</a:t>
+                      </a:r>
+                    </a:p>
+                  </a:txBody>
+                  <a:tcPr marL="0" marR="0" marT="0" marB="0" anchor="ctr">
+                    <a:lnL w="12700">
+                      <a:solidFill>
+                        <a:schemeClr val="tx1"/>
+                      </a:solidFill>
+                    </a:lnL>
+                    <a:lnR w="12700">
+                      <a:solidFill>
+                        <a:schemeClr val="tx1"/>
+                      </a:solidFill>
+                    </a:lnR>
+                    <a:lnT w="12700">
+                      <a:solidFill>
+                        <a:schemeClr val="tx1"/>
+                      </a:solidFill>
+                    </a:lnT>
+                    <a:lnB w="12700">
+                      <a:solidFill>
+                        <a:schemeClr val="tx1"/>
+                      </a:solidFill>
+                    </a:lnB>
+                    <a:solidFill>
+                      <a:schemeClr val="accent2">
+                        <a:lumMod val="75000"/>
+                      </a:schemeClr>
+                    </a:solidFill>
+                  </a:tcPr>
+                </a:tc>
+                <a:tc>
+                  <a:txBody>
+                    <a:bodyPr/>
+                    <a:lstStyle/>
+                    <a:p>
+                      <a:pPr algn="ctr" fontAlgn="ctr"/>
+                      <a:r>
+                        <a:rPr lang="en-US">
+                          <a:effectLst/>
+                        </a:rPr>
+                        <a:t>Analog I/O</a:t>
+                      </a:r>
+                    </a:p>
+                  </a:txBody>
+                  <a:tcPr marL="0" marR="0" marT="0" marB="0" anchor="ctr">
+                    <a:lnL w="12700">
+                      <a:solidFill>
+                        <a:schemeClr val="tx1"/>
+                      </a:solidFill>
+                    </a:lnL>
+                    <a:lnR w="12700">
+                      <a:solidFill>
+                        <a:schemeClr val="tx1"/>
+                      </a:solidFill>
+                    </a:lnR>
+                    <a:lnT w="12700">
+                      <a:solidFill>
+                        <a:schemeClr val="tx1"/>
+                      </a:solidFill>
+                    </a:lnT>
+                    <a:lnB w="12700">
+                      <a:solidFill>
+                        <a:schemeClr val="tx1"/>
+                      </a:solidFill>
+                    </a:lnB>
+                    <a:solidFill>
+                      <a:schemeClr val="accent2">
+                        <a:lumMod val="75000"/>
+                      </a:schemeClr>
+                    </a:solidFill>
+                  </a:tcPr>
+                </a:tc>
+                <a:extLst>
+                  <a:ext uri="{0D108BD9-81ED-4DB2-BD59-A6C34878D82A}">
+                    <a16:rowId xmlns:a16="http://schemas.microsoft.com/office/drawing/2014/main" val="818921644"/>
+                  </a:ext>
+                </a:extLst>
+              </a:tr>
+              <a:tr h="691753">
+                <a:tc>
+                  <a:txBody>
+                    <a:bodyPr/>
+                    <a:lstStyle/>
+                    <a:p>
+                      <a:pPr algn="ctr" fontAlgn="ctr"/>
+                      <a:r>
+                        <a:rPr lang="en-US">
+                          <a:effectLst/>
+                        </a:rPr>
+                        <a:t>Arduino UNO</a:t>
+                      </a:r>
+                    </a:p>
+                  </a:txBody>
+                  <a:tcPr marL="0" marR="0" marT="0" marB="0" anchor="ctr">
+                    <a:lnL w="12700">
+                      <a:solidFill>
+                        <a:schemeClr val="tx1"/>
+                      </a:solidFill>
+                    </a:lnL>
+                    <a:lnR w="12700">
+                      <a:solidFill>
+                        <a:schemeClr val="tx1"/>
+                      </a:solidFill>
+                    </a:lnR>
+                    <a:lnT w="12700">
+                      <a:solidFill>
+                        <a:schemeClr val="tx1"/>
+                      </a:solidFill>
+                    </a:lnT>
+                    <a:lnB w="12700">
+                      <a:solidFill>
+                        <a:schemeClr val="tx1"/>
+                      </a:solidFill>
+                    </a:lnB>
+                    <a:solidFill>
+                      <a:schemeClr val="accent6">
+                        <a:lumMod val="60000"/>
+                        <a:lumOff val="40000"/>
+                      </a:schemeClr>
+                    </a:solidFill>
+                  </a:tcPr>
+                </a:tc>
+                <a:tc>
+                  <a:txBody>
+                    <a:bodyPr/>
+                    <a:lstStyle/>
+                    <a:p>
+                      <a:pPr algn="ctr" fontAlgn="b"/>
+                      <a:r>
+                        <a:rPr lang="en-US">
+                          <a:effectLst/>
+                        </a:rPr>
+                        <a:t>16MHz, ATmega328</a:t>
+                      </a:r>
+                    </a:p>
+                  </a:txBody>
+                  <a:tcPr marL="0" marR="0" marT="0" marB="0" anchor="b">
+                    <a:lnL w="12700">
+                      <a:solidFill>
+                        <a:schemeClr val="tx1"/>
+                      </a:solidFill>
+                    </a:lnL>
+                    <a:lnR w="12700">
+                      <a:solidFill>
+                        <a:schemeClr val="tx1"/>
+                      </a:solidFill>
+                    </a:lnR>
+                    <a:lnT w="12700">
+                      <a:solidFill>
+                        <a:schemeClr val="tx1"/>
+                      </a:solidFill>
+                    </a:lnT>
+                    <a:lnB w="12700">
+                      <a:solidFill>
+                        <a:schemeClr val="tx1"/>
+                      </a:solidFill>
+                    </a:lnB>
+                    <a:solidFill>
+                      <a:schemeClr val="accent6">
+                        <a:lumMod val="60000"/>
+                        <a:lumOff val="40000"/>
+                      </a:schemeClr>
+                    </a:solidFill>
+                  </a:tcPr>
+                </a:tc>
+                <a:tc>
+                  <a:txBody>
+                    <a:bodyPr/>
+                    <a:lstStyle/>
+                    <a:p>
+                      <a:pPr algn="ctr" fontAlgn="ctr"/>
+                      <a:r>
+                        <a:rPr lang="en-US">
+                          <a:effectLst/>
+                        </a:rPr>
+                        <a:t>2KB SRAM, 1KB EEPROM, 32KB Flash</a:t>
+                      </a:r>
+                    </a:p>
+                  </a:txBody>
+                  <a:tcPr marL="0" marR="0" marT="0" marB="0" anchor="ctr">
+                    <a:lnL w="12700">
+                      <a:solidFill>
+                        <a:schemeClr val="tx1"/>
+                      </a:solidFill>
+                    </a:lnL>
+                    <a:lnR w="12700">
+                      <a:solidFill>
+                        <a:schemeClr val="tx1"/>
+                      </a:solidFill>
+                    </a:lnR>
+                    <a:lnT w="12700">
+                      <a:solidFill>
+                        <a:schemeClr val="tx1"/>
+                      </a:solidFill>
+                    </a:lnT>
+                    <a:lnB w="12700">
+                      <a:solidFill>
+                        <a:schemeClr val="tx1"/>
+                      </a:solidFill>
+                    </a:lnB>
+                    <a:solidFill>
+                      <a:schemeClr val="accent6">
+                        <a:lumMod val="60000"/>
+                        <a:lumOff val="40000"/>
+                      </a:schemeClr>
+                    </a:solidFill>
+                  </a:tcPr>
+                </a:tc>
+                <a:tc>
+                  <a:txBody>
+                    <a:bodyPr/>
+                    <a:lstStyle/>
+                    <a:p>
+                      <a:pPr algn="ctr" fontAlgn="ctr"/>
+                      <a:r>
+                        <a:rPr lang="en-US">
+                          <a:effectLst/>
+                        </a:rPr>
+                        <a:t>14</a:t>
+                      </a:r>
+                    </a:p>
+                  </a:txBody>
+                  <a:tcPr marL="0" marR="0" marT="0" marB="0" anchor="ctr">
+                    <a:lnL w="12700">
+                      <a:solidFill>
+                        <a:schemeClr val="tx1"/>
+                      </a:solidFill>
+                    </a:lnL>
+                    <a:lnR w="12700">
+                      <a:solidFill>
+                        <a:schemeClr val="tx1"/>
+                      </a:solidFill>
+                    </a:lnR>
+                    <a:lnT w="12700">
+                      <a:solidFill>
+                        <a:schemeClr val="tx1"/>
+                      </a:solidFill>
+                    </a:lnT>
+                    <a:lnB w="12700">
+                      <a:solidFill>
+                        <a:schemeClr val="tx1"/>
+                      </a:solidFill>
+                    </a:lnB>
+                    <a:solidFill>
+                      <a:schemeClr val="accent6">
+                        <a:lumMod val="60000"/>
+                        <a:lumOff val="40000"/>
+                      </a:schemeClr>
+                    </a:solidFill>
+                  </a:tcPr>
+                </a:tc>
+                <a:tc>
+                  <a:txBody>
+                    <a:bodyPr/>
+                    <a:lstStyle/>
+                    <a:p>
+                      <a:pPr algn="ctr" fontAlgn="ctr"/>
+                      <a:r>
+                        <a:rPr lang="en-US">
+                          <a:effectLst/>
+                        </a:rPr>
+                        <a:t>6 inputs, 0 output</a:t>
+                      </a:r>
+                    </a:p>
+                  </a:txBody>
+                  <a:tcPr marL="0" marR="0" marT="0" marB="0" anchor="ctr">
+                    <a:lnL w="12700">
+                      <a:solidFill>
+                        <a:schemeClr val="tx1"/>
+                      </a:solidFill>
+                    </a:lnL>
+                    <a:lnR w="12700">
+                      <a:solidFill>
+                        <a:schemeClr val="tx1"/>
+                      </a:solidFill>
+                    </a:lnR>
+                    <a:lnT w="12700">
+                      <a:solidFill>
+                        <a:schemeClr val="tx1"/>
+                      </a:solidFill>
+                    </a:lnT>
+                    <a:lnB w="12700">
+                      <a:solidFill>
+                        <a:schemeClr val="tx1"/>
+                      </a:solidFill>
+                    </a:lnB>
+                    <a:solidFill>
+                      <a:schemeClr val="accent6">
+                        <a:lumMod val="60000"/>
+                        <a:lumOff val="40000"/>
+                      </a:schemeClr>
+                    </a:solidFill>
+                  </a:tcPr>
+                </a:tc>
+                <a:extLst>
+                  <a:ext uri="{0D108BD9-81ED-4DB2-BD59-A6C34878D82A}">
+                    <a16:rowId xmlns:a16="http://schemas.microsoft.com/office/drawing/2014/main" val="3604266271"/>
+                  </a:ext>
+                </a:extLst>
+              </a:tr>
+              <a:tr h="1044688">
+                <a:tc>
+                  <a:txBody>
+                    <a:bodyPr/>
+                    <a:lstStyle/>
+                    <a:p>
+                      <a:pPr algn="ctr" fontAlgn="ctr"/>
+                      <a:r>
+                        <a:rPr lang="en-US">
+                          <a:effectLst/>
+                        </a:rPr>
+                        <a:t>Arduino DUE</a:t>
+                      </a:r>
+                    </a:p>
+                  </a:txBody>
+                  <a:tcPr marL="0" marR="0" marT="0" marB="0" anchor="ctr">
+                    <a:lnL w="12700">
+                      <a:solidFill>
+                        <a:schemeClr val="tx1"/>
+                      </a:solidFill>
+                    </a:lnL>
+                    <a:lnR w="12700">
+                      <a:solidFill>
+                        <a:schemeClr val="tx1"/>
+                      </a:solidFill>
+                    </a:lnR>
+                    <a:lnT w="12700">
+                      <a:solidFill>
+                        <a:schemeClr val="tx1"/>
+                      </a:solidFill>
+                    </a:lnT>
+                    <a:lnB w="12700">
+                      <a:solidFill>
+                        <a:schemeClr val="tx1"/>
+                      </a:solidFill>
+                    </a:lnB>
+                    <a:solidFill>
+                      <a:schemeClr val="accent4">
+                        <a:lumMod val="40000"/>
+                        <a:lumOff val="60000"/>
+                      </a:schemeClr>
+                    </a:solidFill>
+                  </a:tcPr>
+                </a:tc>
+                <a:tc>
+                  <a:txBody>
+                    <a:bodyPr/>
+                    <a:lstStyle/>
+                    <a:p>
+                      <a:pPr algn="ctr" fontAlgn="b"/>
+                      <a:r>
+                        <a:rPr lang="en-US">
+                          <a:effectLst/>
+                        </a:rPr>
+                        <a:t>84MHz, AT91SAM3X8E</a:t>
+                      </a:r>
+                    </a:p>
+                  </a:txBody>
+                  <a:tcPr marL="0" marR="0" marT="0" marB="0" anchor="b">
+                    <a:lnL w="12700">
+                      <a:solidFill>
+                        <a:schemeClr val="tx1"/>
+                      </a:solidFill>
+                    </a:lnL>
+                    <a:lnR w="12700">
+                      <a:solidFill>
+                        <a:schemeClr val="tx1"/>
+                      </a:solidFill>
+                    </a:lnR>
+                    <a:lnT w="12700">
+                      <a:solidFill>
+                        <a:schemeClr val="tx1"/>
+                      </a:solidFill>
+                    </a:lnT>
+                    <a:lnB w="12700">
+                      <a:solidFill>
+                        <a:schemeClr val="tx1"/>
+                      </a:solidFill>
+                    </a:lnB>
+                    <a:solidFill>
+                      <a:schemeClr val="accent4">
+                        <a:lumMod val="40000"/>
+                        <a:lumOff val="60000"/>
+                      </a:schemeClr>
+                    </a:solidFill>
+                  </a:tcPr>
+                </a:tc>
+                <a:tc>
+                  <a:txBody>
+                    <a:bodyPr/>
+                    <a:lstStyle/>
+                    <a:p>
+                      <a:pPr algn="ctr" fontAlgn="ctr"/>
+                      <a:r>
+                        <a:rPr lang="en-US">
+                          <a:effectLst/>
+                        </a:rPr>
+                        <a:t>96KB SRAM, 512KB Flash</a:t>
+                      </a:r>
+                    </a:p>
+                  </a:txBody>
+                  <a:tcPr marL="0" marR="0" marT="0" marB="0" anchor="ctr">
+                    <a:lnL w="12700">
+                      <a:solidFill>
+                        <a:schemeClr val="tx1"/>
+                      </a:solidFill>
+                    </a:lnL>
+                    <a:lnR w="12700">
+                      <a:solidFill>
+                        <a:schemeClr val="tx1"/>
+                      </a:solidFill>
+                    </a:lnR>
+                    <a:lnT w="12700">
+                      <a:solidFill>
+                        <a:schemeClr val="tx1"/>
+                      </a:solidFill>
+                    </a:lnT>
+                    <a:lnB w="12700">
+                      <a:solidFill>
+                        <a:schemeClr val="tx1"/>
+                      </a:solidFill>
+                    </a:lnB>
+                    <a:solidFill>
+                      <a:schemeClr val="accent4">
+                        <a:lumMod val="40000"/>
+                        <a:lumOff val="60000"/>
+                      </a:schemeClr>
+                    </a:solidFill>
+                  </a:tcPr>
+                </a:tc>
+                <a:tc>
+                  <a:txBody>
+                    <a:bodyPr/>
+                    <a:lstStyle/>
+                    <a:p>
+                      <a:pPr algn="ctr" fontAlgn="ctr"/>
+                      <a:r>
+                        <a:rPr lang="en-US">
+                          <a:effectLst/>
+                        </a:rPr>
+                        <a:t>54</a:t>
+                      </a:r>
+                    </a:p>
+                  </a:txBody>
+                  <a:tcPr marL="0" marR="0" marT="0" marB="0" anchor="ctr">
+                    <a:lnL w="12700">
+                      <a:solidFill>
+                        <a:schemeClr val="tx1"/>
+                      </a:solidFill>
+                    </a:lnL>
+                    <a:lnR w="12700">
+                      <a:solidFill>
+                        <a:schemeClr val="tx1"/>
+                      </a:solidFill>
+                    </a:lnR>
+                    <a:lnT w="12700">
+                      <a:solidFill>
+                        <a:schemeClr val="tx1"/>
+                      </a:solidFill>
+                    </a:lnT>
+                    <a:lnB w="12700">
+                      <a:solidFill>
+                        <a:schemeClr val="tx1"/>
+                      </a:solidFill>
+                    </a:lnB>
+                    <a:solidFill>
+                      <a:schemeClr val="accent4">
+                        <a:lumMod val="40000"/>
+                        <a:lumOff val="60000"/>
+                      </a:schemeClr>
+                    </a:solidFill>
+                  </a:tcPr>
+                </a:tc>
+                <a:tc>
+                  <a:txBody>
+                    <a:bodyPr/>
+                    <a:lstStyle/>
+                    <a:p>
+                      <a:pPr algn="ctr" fontAlgn="b"/>
+                      <a:r>
+                        <a:rPr lang="en-US">
+                          <a:effectLst/>
+                        </a:rPr>
+                        <a:t>12 inputs, 2 outputs</a:t>
+                      </a:r>
+                    </a:p>
+                  </a:txBody>
+                  <a:tcPr marL="0" marR="0" marT="0" marB="0" anchor="b">
+                    <a:lnL w="12700">
+                      <a:solidFill>
+                        <a:schemeClr val="tx1"/>
+                      </a:solidFill>
+                    </a:lnL>
+                    <a:lnR w="12700">
+                      <a:solidFill>
+                        <a:schemeClr val="tx1"/>
+                      </a:solidFill>
+                    </a:lnR>
+                    <a:lnT w="12700">
+                      <a:solidFill>
+                        <a:schemeClr val="tx1"/>
+                      </a:solidFill>
+                    </a:lnT>
+                    <a:lnB w="12700">
+                      <a:solidFill>
+                        <a:schemeClr val="tx1"/>
+                      </a:solidFill>
+                    </a:lnB>
+                    <a:solidFill>
+                      <a:schemeClr val="accent4">
+                        <a:lumMod val="40000"/>
+                        <a:lumOff val="60000"/>
+                      </a:schemeClr>
+                    </a:solidFill>
+                  </a:tcPr>
+                </a:tc>
+                <a:extLst>
+                  <a:ext uri="{0D108BD9-81ED-4DB2-BD59-A6C34878D82A}">
+                    <a16:rowId xmlns:a16="http://schemas.microsoft.com/office/drawing/2014/main" val="1403657581"/>
+                  </a:ext>
+                </a:extLst>
+              </a:tr>
+              <a:tr h="1044688">
+                <a:tc>
+                  <a:txBody>
+                    <a:bodyPr/>
+                    <a:lstStyle/>
+                    <a:p>
+                      <a:pPr algn="ctr" fontAlgn="ctr"/>
+                      <a:r>
+                        <a:rPr lang="en-US">
+                          <a:effectLst/>
+                        </a:rPr>
+                        <a:t>Arduino Mega</a:t>
+                      </a:r>
+                    </a:p>
+                  </a:txBody>
+                  <a:tcPr marL="0" marR="0" marT="0" marB="0" anchor="ctr">
+                    <a:lnL w="12700">
+                      <a:solidFill>
+                        <a:schemeClr val="tx1"/>
+                      </a:solidFill>
+                    </a:lnL>
+                    <a:lnR w="12700">
+                      <a:solidFill>
+                        <a:schemeClr val="tx1"/>
+                      </a:solidFill>
+                    </a:lnR>
+                    <a:lnT w="12700">
+                      <a:solidFill>
+                        <a:schemeClr val="tx1"/>
+                      </a:solidFill>
+                    </a:lnT>
+                    <a:lnB w="12700">
+                      <a:solidFill>
+                        <a:schemeClr val="tx1"/>
+                      </a:solidFill>
+                    </a:lnB>
+                    <a:solidFill>
+                      <a:schemeClr val="accent2">
+                        <a:lumMod val="40000"/>
+                        <a:lumOff val="60000"/>
+                      </a:schemeClr>
+                    </a:solidFill>
+                  </a:tcPr>
+                </a:tc>
+                <a:tc>
+                  <a:txBody>
+                    <a:bodyPr/>
+                    <a:lstStyle/>
+                    <a:p>
+                      <a:pPr algn="ctr" fontAlgn="b"/>
+                      <a:r>
+                        <a:rPr lang="en-US">
+                          <a:effectLst/>
+                        </a:rPr>
+                        <a:t>16MHz,ATMEGA2560</a:t>
+                      </a:r>
+                    </a:p>
+                  </a:txBody>
+                  <a:tcPr marL="0" marR="0" marT="0" marB="0" anchor="b">
+                    <a:lnL w="12700">
+                      <a:solidFill>
+                        <a:schemeClr val="tx1"/>
+                      </a:solidFill>
+                    </a:lnL>
+                    <a:lnR w="12700">
+                      <a:solidFill>
+                        <a:schemeClr val="tx1"/>
+                      </a:solidFill>
+                    </a:lnR>
+                    <a:lnT w="12700">
+                      <a:solidFill>
+                        <a:schemeClr val="tx1"/>
+                      </a:solidFill>
+                    </a:lnT>
+                    <a:lnB w="12700">
+                      <a:solidFill>
+                        <a:schemeClr val="tx1"/>
+                      </a:solidFill>
+                    </a:lnB>
+                    <a:solidFill>
+                      <a:schemeClr val="accent2">
+                        <a:lumMod val="40000"/>
+                        <a:lumOff val="60000"/>
+                      </a:schemeClr>
+                    </a:solidFill>
+                  </a:tcPr>
+                </a:tc>
+                <a:tc>
+                  <a:txBody>
+                    <a:bodyPr/>
+                    <a:lstStyle/>
+                    <a:p>
+                      <a:pPr algn="ctr" fontAlgn="ctr"/>
+                      <a:r>
+                        <a:rPr lang="en-US">
+                          <a:effectLst/>
+                        </a:rPr>
+                        <a:t>8KB SRAM, 4KB EEPROM, 256KB Flash</a:t>
+                      </a:r>
+                    </a:p>
+                  </a:txBody>
+                  <a:tcPr marL="0" marR="0" marT="0" marB="0" anchor="ctr">
+                    <a:lnL w="12700">
+                      <a:solidFill>
+                        <a:schemeClr val="tx1"/>
+                      </a:solidFill>
+                    </a:lnL>
+                    <a:lnR w="12700">
+                      <a:solidFill>
+                        <a:schemeClr val="tx1"/>
+                      </a:solidFill>
+                    </a:lnR>
+                    <a:lnT w="12700">
+                      <a:solidFill>
+                        <a:schemeClr val="tx1"/>
+                      </a:solidFill>
+                    </a:lnT>
+                    <a:lnB w="12700">
+                      <a:solidFill>
+                        <a:schemeClr val="tx1"/>
+                      </a:solidFill>
+                    </a:lnB>
+                    <a:solidFill>
+                      <a:schemeClr val="accent2">
+                        <a:lumMod val="40000"/>
+                        <a:lumOff val="60000"/>
+                      </a:schemeClr>
+                    </a:solidFill>
+                  </a:tcPr>
+                </a:tc>
+                <a:tc>
+                  <a:txBody>
+                    <a:bodyPr/>
+                    <a:lstStyle/>
+                    <a:p>
+                      <a:pPr algn="ctr" fontAlgn="ctr"/>
+                      <a:r>
+                        <a:rPr lang="en-US">
+                          <a:effectLst/>
+                        </a:rPr>
+                        <a:t>54</a:t>
+                      </a:r>
+                    </a:p>
+                  </a:txBody>
+                  <a:tcPr marL="0" marR="0" marT="0" marB="0" anchor="ctr">
+                    <a:lnL w="12700">
+                      <a:solidFill>
+                        <a:schemeClr val="tx1"/>
+                      </a:solidFill>
+                    </a:lnL>
+                    <a:lnR w="12700">
+                      <a:solidFill>
+                        <a:schemeClr val="tx1"/>
+                      </a:solidFill>
+                    </a:lnR>
+                    <a:lnT w="12700">
+                      <a:solidFill>
+                        <a:schemeClr val="tx1"/>
+                      </a:solidFill>
+                    </a:lnT>
+                    <a:lnB w="12700">
+                      <a:solidFill>
+                        <a:schemeClr val="tx1"/>
+                      </a:solidFill>
+                    </a:lnB>
+                    <a:solidFill>
+                      <a:schemeClr val="accent2">
+                        <a:lumMod val="40000"/>
+                        <a:lumOff val="60000"/>
+                      </a:schemeClr>
+                    </a:solidFill>
+                  </a:tcPr>
+                </a:tc>
+                <a:tc>
+                  <a:txBody>
+                    <a:bodyPr/>
+                    <a:lstStyle/>
+                    <a:p>
+                      <a:pPr algn="ctr" fontAlgn="b"/>
+                      <a:r>
+                        <a:rPr lang="en-US">
+                          <a:effectLst/>
+                        </a:rPr>
+                        <a:t>16 inputs, 0 output</a:t>
+                      </a:r>
+                    </a:p>
+                  </a:txBody>
+                  <a:tcPr marL="0" marR="0" marT="0" marB="0" anchor="b">
+                    <a:lnL w="12700">
+                      <a:solidFill>
+                        <a:schemeClr val="tx1"/>
+                      </a:solidFill>
+                    </a:lnL>
+                    <a:lnR w="12700">
+                      <a:solidFill>
+                        <a:schemeClr val="tx1"/>
+                      </a:solidFill>
+                    </a:lnR>
+                    <a:lnT w="12700">
+                      <a:solidFill>
+                        <a:schemeClr val="tx1"/>
+                      </a:solidFill>
+                    </a:lnT>
+                    <a:lnB w="12700">
+                      <a:solidFill>
+                        <a:schemeClr val="tx1"/>
+                      </a:solidFill>
+                    </a:lnB>
+                    <a:solidFill>
+                      <a:schemeClr val="accent2">
+                        <a:lumMod val="40000"/>
+                        <a:lumOff val="60000"/>
+                      </a:schemeClr>
+                    </a:solidFill>
+                  </a:tcPr>
+                </a:tc>
+                <a:extLst>
+                  <a:ext uri="{0D108BD9-81ED-4DB2-BD59-A6C34878D82A}">
+                    <a16:rowId xmlns:a16="http://schemas.microsoft.com/office/drawing/2014/main" val="2197873524"/>
+                  </a:ext>
+                </a:extLst>
+              </a:tr>
+              <a:tr h="1044688">
+                <a:tc>
+                  <a:txBody>
+                    <a:bodyPr/>
+                    <a:lstStyle/>
+                    <a:p>
+                      <a:pPr algn="ctr" fontAlgn="ctr"/>
+                      <a:r>
+                        <a:rPr lang="en-US">
+                          <a:effectLst/>
+                        </a:rPr>
+                        <a:t>Arduino Leaonardo</a:t>
+                      </a:r>
+                    </a:p>
+                  </a:txBody>
+                  <a:tcPr marL="0" marR="0" marT="0" marB="0" anchor="ctr">
+                    <a:lnL w="12700">
+                      <a:solidFill>
+                        <a:schemeClr val="tx1"/>
+                      </a:solidFill>
+                    </a:lnL>
+                    <a:lnR w="12700">
+                      <a:solidFill>
+                        <a:schemeClr val="tx1"/>
+                      </a:solidFill>
+                    </a:lnR>
+                    <a:lnT w="12700">
+                      <a:solidFill>
+                        <a:schemeClr val="tx1"/>
+                      </a:solidFill>
+                    </a:lnT>
+                    <a:lnB w="12700">
+                      <a:solidFill>
+                        <a:schemeClr val="tx1"/>
+                      </a:solidFill>
+                    </a:lnB>
+                    <a:solidFill>
+                      <a:schemeClr val="accent3">
+                        <a:lumMod val="60000"/>
+                        <a:lumOff val="40000"/>
+                      </a:schemeClr>
+                    </a:solidFill>
+                  </a:tcPr>
+                </a:tc>
+                <a:tc>
+                  <a:txBody>
+                    <a:bodyPr/>
+                    <a:lstStyle/>
+                    <a:p>
+                      <a:pPr algn="ctr" fontAlgn="b"/>
+                      <a:r>
+                        <a:rPr lang="en-US">
+                          <a:effectLst/>
+                        </a:rPr>
+                        <a:t>16MHz, ATMEGA32U4</a:t>
+                      </a:r>
+                    </a:p>
+                  </a:txBody>
+                  <a:tcPr marL="0" marR="0" marT="0" marB="0" anchor="b">
+                    <a:lnL w="12700">
+                      <a:solidFill>
+                        <a:schemeClr val="tx1"/>
+                      </a:solidFill>
+                    </a:lnL>
+                    <a:lnR w="12700">
+                      <a:solidFill>
+                        <a:schemeClr val="tx1"/>
+                      </a:solidFill>
+                    </a:lnR>
+                    <a:lnT w="12700">
+                      <a:solidFill>
+                        <a:schemeClr val="tx1"/>
+                      </a:solidFill>
+                    </a:lnT>
+                    <a:lnB w="12700">
+                      <a:solidFill>
+                        <a:schemeClr val="tx1"/>
+                      </a:solidFill>
+                    </a:lnB>
+                    <a:solidFill>
+                      <a:schemeClr val="accent3">
+                        <a:lumMod val="60000"/>
+                        <a:lumOff val="40000"/>
+                      </a:schemeClr>
+                    </a:solidFill>
+                  </a:tcPr>
+                </a:tc>
+                <a:tc>
+                  <a:txBody>
+                    <a:bodyPr/>
+                    <a:lstStyle/>
+                    <a:p>
+                      <a:pPr algn="ctr" fontAlgn="ctr"/>
+                      <a:r>
+                        <a:rPr lang="en-US">
+                          <a:effectLst/>
+                        </a:rPr>
+                        <a:t>2.5KB SRAM, 1KB EEPROM,32KB Flash</a:t>
+                      </a:r>
+                    </a:p>
+                  </a:txBody>
+                  <a:tcPr marL="0" marR="0" marT="0" marB="0" anchor="ctr">
+                    <a:lnL w="12700">
+                      <a:solidFill>
+                        <a:schemeClr val="tx1"/>
+                      </a:solidFill>
+                    </a:lnL>
+                    <a:lnR w="12700">
+                      <a:solidFill>
+                        <a:schemeClr val="tx1"/>
+                      </a:solidFill>
+                    </a:lnR>
+                    <a:lnT w="12700">
+                      <a:solidFill>
+                        <a:schemeClr val="tx1"/>
+                      </a:solidFill>
+                    </a:lnT>
+                    <a:lnB w="12700">
+                      <a:solidFill>
+                        <a:schemeClr val="tx1"/>
+                      </a:solidFill>
+                    </a:lnB>
+                    <a:solidFill>
+                      <a:schemeClr val="accent3">
+                        <a:lumMod val="60000"/>
+                        <a:lumOff val="40000"/>
+                      </a:schemeClr>
+                    </a:solidFill>
+                  </a:tcPr>
+                </a:tc>
+                <a:tc>
+                  <a:txBody>
+                    <a:bodyPr/>
+                    <a:lstStyle/>
+                    <a:p>
+                      <a:pPr algn="ctr" fontAlgn="ctr"/>
+                      <a:r>
+                        <a:rPr lang="en-US">
+                          <a:effectLst/>
+                        </a:rPr>
+                        <a:t>20</a:t>
+                      </a:r>
+                    </a:p>
+                  </a:txBody>
+                  <a:tcPr marL="0" marR="0" marT="0" marB="0" anchor="ctr">
+                    <a:lnL w="12700">
+                      <a:solidFill>
+                        <a:schemeClr val="tx1"/>
+                      </a:solidFill>
+                    </a:lnL>
+                    <a:lnR w="12700">
+                      <a:solidFill>
+                        <a:schemeClr val="tx1"/>
+                      </a:solidFill>
+                    </a:lnR>
+                    <a:lnT w="12700">
+                      <a:solidFill>
+                        <a:schemeClr val="tx1"/>
+                      </a:solidFill>
+                    </a:lnT>
+                    <a:lnB w="12700">
+                      <a:solidFill>
+                        <a:schemeClr val="tx1"/>
+                      </a:solidFill>
+                    </a:lnB>
+                    <a:solidFill>
+                      <a:schemeClr val="accent3">
+                        <a:lumMod val="60000"/>
+                        <a:lumOff val="40000"/>
+                      </a:schemeClr>
+                    </a:solidFill>
+                  </a:tcPr>
+                </a:tc>
+                <a:tc>
+                  <a:txBody>
+                    <a:bodyPr/>
+                    <a:lstStyle/>
+                    <a:p>
+                      <a:pPr algn="ctr" fontAlgn="b"/>
+                      <a:r>
+                        <a:rPr lang="en-US">
+                          <a:effectLst/>
+                        </a:rPr>
+                        <a:t>12 inputs, 0 output</a:t>
+                      </a:r>
+                    </a:p>
+                  </a:txBody>
+                  <a:tcPr marL="0" marR="0" marT="0" marB="0" anchor="b">
+                    <a:lnL w="12700">
+                      <a:solidFill>
+                        <a:schemeClr val="tx1"/>
+                      </a:solidFill>
+                    </a:lnL>
+                    <a:lnR w="12700">
+                      <a:solidFill>
+                        <a:schemeClr val="tx1"/>
+                      </a:solidFill>
+                    </a:lnR>
+                    <a:lnT w="12700">
+                      <a:solidFill>
+                        <a:schemeClr val="tx1"/>
+                      </a:solidFill>
+                    </a:lnT>
+                    <a:lnB w="12700">
+                      <a:solidFill>
+                        <a:schemeClr val="tx1"/>
+                      </a:solidFill>
+                    </a:lnB>
+                    <a:solidFill>
+                      <a:schemeClr val="accent3">
+                        <a:lumMod val="60000"/>
+                        <a:lumOff val="40000"/>
+                      </a:schemeClr>
+                    </a:solidFill>
+                  </a:tcPr>
+                </a:tc>
+                <a:extLst>
+                  <a:ext uri="{0D108BD9-81ED-4DB2-BD59-A6C34878D82A}">
+                    <a16:rowId xmlns:a16="http://schemas.microsoft.com/office/drawing/2014/main" val="1108502445"/>
+                  </a:ext>
+                </a:extLst>
+              </a:tr>
+            </a:tbl>
+          </a:graphicData>
+        </a:graphic>
+      </p:graphicFrame>
     </p:spTree>
     <p:extLst>
       <p:ext uri="{BB962C8B-B14F-4D97-AF65-F5344CB8AC3E}">
-        <p14:creationId xmlns:p14="http://schemas.microsoft.com/office/powerpoint/2010/main" val="1170506209"/>
+        <p14:creationId xmlns:p14="http://schemas.microsoft.com/office/powerpoint/2010/main" val="240429380"/>
       </p:ext>
     </p:extLst>
   </p:cSld>
@@ -4447,7 +5349,7 @@
           <p:cNvPr id="2" name="Title 1">
             <a:extLst>
               <a:ext uri="{FF2B5EF4-FFF2-40B4-BE49-F238E27FC236}">
-                <a16:creationId xmlns:a16="http://schemas.microsoft.com/office/drawing/2014/main" id="{ACB708D4-78D7-44C0-9167-B57E1F13D382}"/>
+                <a16:creationId xmlns:a16="http://schemas.microsoft.com/office/drawing/2014/main" id="{64A7D1A7-D09D-46C4-96D5-D56A8FCF0795}"/>
               </a:ext>
             </a:extLst>
           </p:cNvPr>
@@ -4461,7 +5363,7 @@
         <p:spPr>
           <a:xfrm>
             <a:off x="838200" y="1401647"/>
-            <a:ext cx="10515600" cy="958171"/>
+            <a:ext cx="10515600" cy="894243"/>
           </a:xfrm>
         </p:spPr>
         <p:txBody>
@@ -4473,45 +5375,148 @@
               <a:rPr lang="en-US" b="1" dirty="0">
                 <a:cs typeface="Calibri Light"/>
               </a:rPr>
-              <a:t>Harvard Architecture</a:t>
-            </a:r>
-          </a:p>
-        </p:txBody>
-      </p:sp>
-      <p:pic>
-        <p:nvPicPr>
-          <p:cNvPr id="4" name="Picture 4" descr="Diagram, schematic&#10;&#10;Description automatically generated">
+              <a:t>Arduino Components</a:t>
+            </a:r>
+          </a:p>
+        </p:txBody>
+      </p:sp>
+      <p:sp>
+        <p:nvSpPr>
+          <p:cNvPr id="3" name="Content Placeholder 2">
             <a:extLst>
               <a:ext uri="{FF2B5EF4-FFF2-40B4-BE49-F238E27FC236}">
-                <a16:creationId xmlns:a16="http://schemas.microsoft.com/office/drawing/2014/main" id="{302C8E11-442B-4A79-98DC-65CC3D09D0D2}"/>
+                <a16:creationId xmlns:a16="http://schemas.microsoft.com/office/drawing/2014/main" id="{8B502495-6848-4FF2-BF28-3B54F55A30D6}"/>
               </a:ext>
             </a:extLst>
           </p:cNvPr>
-          <p:cNvPicPr>
-            <a:picLocks noChangeAspect="1"/>
-          </p:cNvPicPr>
-          <p:nvPr/>
-        </p:nvPicPr>
-        <p:blipFill>
-          <a:blip r:embed="rId2"/>
-          <a:stretch>
-            <a:fillRect/>
-          </a:stretch>
-        </p:blipFill>
+          <p:cNvSpPr>
+            <a:spLocks noGrp="1"/>
+          </p:cNvSpPr>
+          <p:nvPr>
+            <p:ph idx="1"/>
+          </p:nvPr>
+        </p:nvSpPr>
         <p:spPr>
           <a:xfrm>
-            <a:off x="2492829" y="2265410"/>
-            <a:ext cx="7206342" cy="4218571"/>
+            <a:off x="838200" y="2180810"/>
+            <a:ext cx="10515600" cy="4427472"/>
           </a:xfrm>
-          <a:prstGeom prst="rect">
-            <a:avLst/>
-          </a:prstGeom>
         </p:spPr>
-      </p:pic>
+        <p:txBody>
+          <a:bodyPr vert="horz" lIns="91440" tIns="45720" rIns="91440" bIns="45720" rtlCol="0" anchor="t">
+            <a:normAutofit lnSpcReduction="10000"/>
+          </a:bodyPr>
+          <a:lstStyle/>
+          <a:p>
+            <a:r>
+              <a:rPr lang="en-US" dirty="0">
+                <a:cs typeface="Calibri"/>
+              </a:rPr>
+              <a:t>The major components of Arduino UNO board are as follows:</a:t>
+            </a:r>
+          </a:p>
+          <a:p>
+            <a:pPr marL="514350" indent="-514350">
+              <a:buAutoNum type="romanLcPeriod"/>
+            </a:pPr>
+            <a:r>
+              <a:rPr lang="en-US" dirty="0">
+                <a:cs typeface="Calibri"/>
+              </a:rPr>
+              <a:t>USB Connector</a:t>
+            </a:r>
+          </a:p>
+          <a:p>
+            <a:pPr marL="514350" indent="-514350">
+              <a:buAutoNum type="romanLcPeriod"/>
+            </a:pPr>
+            <a:r>
+              <a:rPr lang="en-US" dirty="0">
+                <a:cs typeface="Calibri"/>
+              </a:rPr>
+              <a:t>Power port</a:t>
+            </a:r>
+          </a:p>
+          <a:p>
+            <a:pPr marL="514350" indent="-514350">
+              <a:buAutoNum type="romanLcPeriod"/>
+            </a:pPr>
+            <a:r>
+              <a:rPr lang="en-US" dirty="0">
+                <a:cs typeface="Calibri"/>
+              </a:rPr>
+              <a:t>Microcontroller</a:t>
+            </a:r>
+          </a:p>
+          <a:p>
+            <a:pPr marL="514350" indent="-514350">
+              <a:buAutoNum type="romanLcPeriod"/>
+            </a:pPr>
+            <a:r>
+              <a:rPr lang="en-US" dirty="0">
+                <a:cs typeface="Calibri"/>
+              </a:rPr>
+              <a:t>Analog input and Digital pins</a:t>
+            </a:r>
+          </a:p>
+          <a:p>
+            <a:pPr marL="514350" indent="-514350">
+              <a:buAutoNum type="romanLcPeriod"/>
+            </a:pPr>
+            <a:r>
+              <a:rPr lang="en-US" dirty="0">
+                <a:cs typeface="Calibri"/>
+              </a:rPr>
+              <a:t>Reset switch</a:t>
+            </a:r>
+          </a:p>
+          <a:p>
+            <a:pPr marL="514350" indent="-514350">
+              <a:buAutoNum type="romanLcPeriod"/>
+            </a:pPr>
+            <a:r>
+              <a:rPr lang="en-US" dirty="0">
+                <a:cs typeface="Calibri"/>
+              </a:rPr>
+              <a:t>Crystal oscillator</a:t>
+            </a:r>
+          </a:p>
+          <a:p>
+            <a:pPr marL="514350" indent="-514350">
+              <a:buAutoNum type="romanLcPeriod"/>
+            </a:pPr>
+            <a:r>
+              <a:rPr lang="en-US" dirty="0">
+                <a:cs typeface="Calibri"/>
+              </a:rPr>
+              <a:t>USB interface chip</a:t>
+            </a:r>
+          </a:p>
+          <a:p>
+            <a:pPr marL="514350" indent="-514350">
+              <a:buAutoNum type="romanLcPeriod"/>
+            </a:pPr>
+            <a:r>
+              <a:rPr lang="en-US" dirty="0">
+                <a:cs typeface="Calibri"/>
+              </a:rPr>
+              <a:t>TX RX LEDs</a:t>
+            </a:r>
+          </a:p>
+          <a:p>
+            <a:pPr marL="514350" indent="-514350">
+              <a:buAutoNum type="romanLcPeriod"/>
+            </a:pPr>
+            <a:endParaRPr lang="en-US" dirty="0">
+              <a:cs typeface="Calibri"/>
+            </a:endParaRPr>
+          </a:p>
+        </p:txBody>
+      </p:sp>
     </p:spTree>
     <p:extLst>
       <p:ext uri="{BB962C8B-B14F-4D97-AF65-F5344CB8AC3E}">
-        <p14:creationId xmlns:p14="http://schemas.microsoft.com/office/powerpoint/2010/main" val="3267371105"/>
+        <p14:creationId xmlns:p14="http://schemas.microsoft.com/office/powerpoint/2010/main" val="3483218824"/>
       </p:ext>
     </p:extLst>
   </p:cSld>
@@ -4555,7 +5560,7 @@
           <p:cNvPr id="2" name="Title 1">
             <a:extLst>
               <a:ext uri="{FF2B5EF4-FFF2-40B4-BE49-F238E27FC236}">
-                <a16:creationId xmlns:a16="http://schemas.microsoft.com/office/drawing/2014/main" id="{BB4928AA-6E37-4B58-B24B-5A4EFA526ADB}"/>
+                <a16:creationId xmlns:a16="http://schemas.microsoft.com/office/drawing/2014/main" id="{9FAB3E64-09AE-468F-8DAE-E32D1D77160A}"/>
               </a:ext>
             </a:extLst>
           </p:cNvPr>
@@ -4569,1063 +5574,62 @@
         <p:spPr>
           <a:xfrm>
             <a:off x="838200" y="1401647"/>
-            <a:ext cx="10515600" cy="849313"/>
+            <a:ext cx="10515600" cy="672421"/>
           </a:xfrm>
         </p:spPr>
         <p:txBody>
-          <a:bodyPr/>
+          <a:bodyPr>
+            <a:normAutofit fontScale="90000"/>
+          </a:bodyPr>
           <a:lstStyle/>
           <a:p>
             <a:pPr algn="ctr"/>
             <a:r>
-              <a:rPr lang="en-US" b="1" dirty="0">
+              <a:rPr lang="en-US" b="1">
                 <a:cs typeface="Calibri Light"/>
               </a:rPr>
-              <a:t>Harvard Architecture block diagram</a:t>
-            </a:r>
-          </a:p>
-        </p:txBody>
-      </p:sp>
-      <p:sp>
-        <p:nvSpPr>
-          <p:cNvPr id="4" name="Rectangle 3">
+              <a:t>Arduino UNO pins description</a:t>
+            </a:r>
+            <a:endParaRPr lang="en-US">
+              <a:cs typeface="Calibri Light"/>
+            </a:endParaRPr>
+          </a:p>
+        </p:txBody>
+      </p:sp>
+      <p:pic>
+        <p:nvPicPr>
+          <p:cNvPr id="3" name="Picture 3" descr="Diagram, schematic&#10;&#10;Description automatically generated">
             <a:extLst>
               <a:ext uri="{FF2B5EF4-FFF2-40B4-BE49-F238E27FC236}">
-                <a16:creationId xmlns:a16="http://schemas.microsoft.com/office/drawing/2014/main" id="{22241A58-33ED-4AFF-AC1C-B2DA37C74FA8}"/>
+                <a16:creationId xmlns:a16="http://schemas.microsoft.com/office/drawing/2014/main" id="{00B3CF46-45D7-4098-B366-5CA162D9AE9A}"/>
               </a:ext>
             </a:extLst>
           </p:cNvPr>
-          <p:cNvSpPr/>
+          <p:cNvPicPr>
+            <a:picLocks noChangeAspect="1"/>
+          </p:cNvPicPr>
           <p:nvPr/>
-        </p:nvSpPr>
+        </p:nvPicPr>
+        <p:blipFill>
+          <a:blip r:embed="rId2"/>
+          <a:stretch>
+            <a:fillRect/>
+          </a:stretch>
+        </p:blipFill>
         <p:spPr>
           <a:xfrm>
-            <a:off x="5006196" y="2626743"/>
-            <a:ext cx="2185357" cy="1811545"/>
+            <a:off x="2754702" y="2174475"/>
+            <a:ext cx="7243312" cy="4334974"/>
           </a:xfrm>
           <a:prstGeom prst="rect">
             <a:avLst/>
           </a:prstGeom>
-          <a:solidFill>
-            <a:srgbClr val="FFC000"/>
-          </a:solidFill>
         </p:spPr>
-        <p:style>
-          <a:lnRef idx="2">
-            <a:schemeClr val="accent1">
-              <a:shade val="50000"/>
-            </a:schemeClr>
-          </a:lnRef>
-          <a:fillRef idx="1">
-            <a:schemeClr val="accent1"/>
-          </a:fillRef>
-          <a:effectRef idx="0">
-            <a:schemeClr val="accent1"/>
-          </a:effectRef>
-          <a:fontRef idx="minor">
-            <a:schemeClr val="lt1"/>
-          </a:fontRef>
-        </p:style>
-        <p:txBody>
-          <a:bodyPr rtlCol="0" anchor="ctr"/>
-          <a:lstStyle>
-            <a:defPPr>
-              <a:defRPr lang="en-US"/>
-            </a:defPPr>
-            <a:lvl1pPr marL="0" algn="l" defTabSz="914400" rtl="0" eaLnBrk="1" latinLnBrk="0" hangingPunct="1">
-              <a:defRPr sz="1800" kern="1200">
-                <a:solidFill>
-                  <a:schemeClr val="lt1"/>
-                </a:solidFill>
-                <a:latin typeface="+mn-lt"/>
-                <a:ea typeface="+mn-ea"/>
-                <a:cs typeface="+mn-cs"/>
-              </a:defRPr>
-            </a:lvl1pPr>
-            <a:lvl2pPr marL="457200" algn="l" defTabSz="914400" rtl="0" eaLnBrk="1" latinLnBrk="0" hangingPunct="1">
-              <a:defRPr sz="1800" kern="1200">
-                <a:solidFill>
-                  <a:schemeClr val="lt1"/>
-                </a:solidFill>
-                <a:latin typeface="+mn-lt"/>
-                <a:ea typeface="+mn-ea"/>
-                <a:cs typeface="+mn-cs"/>
-              </a:defRPr>
-            </a:lvl2pPr>
-            <a:lvl3pPr marL="914400" algn="l" defTabSz="914400" rtl="0" eaLnBrk="1" latinLnBrk="0" hangingPunct="1">
-              <a:defRPr sz="1800" kern="1200">
-                <a:solidFill>
-                  <a:schemeClr val="lt1"/>
-                </a:solidFill>
-                <a:latin typeface="+mn-lt"/>
-                <a:ea typeface="+mn-ea"/>
-                <a:cs typeface="+mn-cs"/>
-              </a:defRPr>
-            </a:lvl3pPr>
-            <a:lvl4pPr marL="1371600" algn="l" defTabSz="914400" rtl="0" eaLnBrk="1" latinLnBrk="0" hangingPunct="1">
-              <a:defRPr sz="1800" kern="1200">
-                <a:solidFill>
-                  <a:schemeClr val="lt1"/>
-                </a:solidFill>
-                <a:latin typeface="+mn-lt"/>
-                <a:ea typeface="+mn-ea"/>
-                <a:cs typeface="+mn-cs"/>
-              </a:defRPr>
-            </a:lvl4pPr>
-            <a:lvl5pPr marL="1828800" algn="l" defTabSz="914400" rtl="0" eaLnBrk="1" latinLnBrk="0" hangingPunct="1">
-              <a:defRPr sz="1800" kern="1200">
-                <a:solidFill>
-                  <a:schemeClr val="lt1"/>
-                </a:solidFill>
-                <a:latin typeface="+mn-lt"/>
-                <a:ea typeface="+mn-ea"/>
-                <a:cs typeface="+mn-cs"/>
-              </a:defRPr>
-            </a:lvl5pPr>
-            <a:lvl6pPr marL="2286000" algn="l" defTabSz="914400" rtl="0" eaLnBrk="1" latinLnBrk="0" hangingPunct="1">
-              <a:defRPr sz="1800" kern="1200">
-                <a:solidFill>
-                  <a:schemeClr val="lt1"/>
-                </a:solidFill>
-                <a:latin typeface="+mn-lt"/>
-                <a:ea typeface="+mn-ea"/>
-                <a:cs typeface="+mn-cs"/>
-              </a:defRPr>
-            </a:lvl6pPr>
-            <a:lvl7pPr marL="2743200" algn="l" defTabSz="914400" rtl="0" eaLnBrk="1" latinLnBrk="0" hangingPunct="1">
-              <a:defRPr sz="1800" kern="1200">
-                <a:solidFill>
-                  <a:schemeClr val="lt1"/>
-                </a:solidFill>
-                <a:latin typeface="+mn-lt"/>
-                <a:ea typeface="+mn-ea"/>
-                <a:cs typeface="+mn-cs"/>
-              </a:defRPr>
-            </a:lvl7pPr>
-            <a:lvl8pPr marL="3200400" algn="l" defTabSz="914400" rtl="0" eaLnBrk="1" latinLnBrk="0" hangingPunct="1">
-              <a:defRPr sz="1800" kern="1200">
-                <a:solidFill>
-                  <a:schemeClr val="lt1"/>
-                </a:solidFill>
-                <a:latin typeface="+mn-lt"/>
-                <a:ea typeface="+mn-ea"/>
-                <a:cs typeface="+mn-cs"/>
-              </a:defRPr>
-            </a:lvl8pPr>
-            <a:lvl9pPr marL="3657600" algn="l" defTabSz="914400" rtl="0" eaLnBrk="1" latinLnBrk="0" hangingPunct="1">
-              <a:defRPr sz="1800" kern="1200">
-                <a:solidFill>
-                  <a:schemeClr val="lt1"/>
-                </a:solidFill>
-                <a:latin typeface="+mn-lt"/>
-                <a:ea typeface="+mn-ea"/>
-                <a:cs typeface="+mn-cs"/>
-              </a:defRPr>
-            </a:lvl9pPr>
-          </a:lstStyle>
-          <a:p>
-            <a:pPr algn="ctr"/>
-            <a:r>
-              <a:rPr lang="en-US" sz="2400" b="1" dirty="0">
-                <a:cs typeface="Calibri"/>
-              </a:rPr>
-              <a:t>DSP CORE</a:t>
-            </a:r>
-            <a:endParaRPr lang="en-US" sz="2400" b="1" dirty="0"/>
-          </a:p>
-        </p:txBody>
-      </p:sp>
-      <p:sp>
-        <p:nvSpPr>
-          <p:cNvPr id="5" name="Rectangle 4">
-            <a:extLst>
-              <a:ext uri="{FF2B5EF4-FFF2-40B4-BE49-F238E27FC236}">
-                <a16:creationId xmlns:a16="http://schemas.microsoft.com/office/drawing/2014/main" id="{2C494090-093A-44FC-B6D1-28B2911A41D3}"/>
-              </a:ext>
-            </a:extLst>
-          </p:cNvPr>
-          <p:cNvSpPr/>
-          <p:nvPr/>
-        </p:nvSpPr>
-        <p:spPr>
-          <a:xfrm>
-            <a:off x="9348158" y="2626743"/>
-            <a:ext cx="2185357" cy="1811545"/>
-          </a:xfrm>
-          <a:prstGeom prst="rect">
-            <a:avLst/>
-          </a:prstGeom>
-          <a:solidFill>
-            <a:schemeClr val="accent6">
-              <a:lumMod val="75000"/>
-            </a:schemeClr>
-          </a:solidFill>
-        </p:spPr>
-        <p:style>
-          <a:lnRef idx="2">
-            <a:schemeClr val="accent1">
-              <a:shade val="50000"/>
-            </a:schemeClr>
-          </a:lnRef>
-          <a:fillRef idx="1">
-            <a:schemeClr val="accent1"/>
-          </a:fillRef>
-          <a:effectRef idx="0">
-            <a:schemeClr val="accent1"/>
-          </a:effectRef>
-          <a:fontRef idx="minor">
-            <a:schemeClr val="lt1"/>
-          </a:fontRef>
-        </p:style>
-        <p:txBody>
-          <a:bodyPr lIns="91440" tIns="45720" rIns="91440" bIns="45720" rtlCol="0" anchor="ctr"/>
-          <a:lstStyle>
-            <a:defPPr>
-              <a:defRPr lang="en-US"/>
-            </a:defPPr>
-            <a:lvl1pPr marL="0" algn="l" defTabSz="914400" rtl="0" eaLnBrk="1" latinLnBrk="0" hangingPunct="1">
-              <a:defRPr sz="1800" kern="1200">
-                <a:solidFill>
-                  <a:schemeClr val="lt1"/>
-                </a:solidFill>
-                <a:latin typeface="+mn-lt"/>
-                <a:ea typeface="+mn-ea"/>
-                <a:cs typeface="+mn-cs"/>
-              </a:defRPr>
-            </a:lvl1pPr>
-            <a:lvl2pPr marL="457200" algn="l" defTabSz="914400" rtl="0" eaLnBrk="1" latinLnBrk="0" hangingPunct="1">
-              <a:defRPr sz="1800" kern="1200">
-                <a:solidFill>
-                  <a:schemeClr val="lt1"/>
-                </a:solidFill>
-                <a:latin typeface="+mn-lt"/>
-                <a:ea typeface="+mn-ea"/>
-                <a:cs typeface="+mn-cs"/>
-              </a:defRPr>
-            </a:lvl2pPr>
-            <a:lvl3pPr marL="914400" algn="l" defTabSz="914400" rtl="0" eaLnBrk="1" latinLnBrk="0" hangingPunct="1">
-              <a:defRPr sz="1800" kern="1200">
-                <a:solidFill>
-                  <a:schemeClr val="lt1"/>
-                </a:solidFill>
-                <a:latin typeface="+mn-lt"/>
-                <a:ea typeface="+mn-ea"/>
-                <a:cs typeface="+mn-cs"/>
-              </a:defRPr>
-            </a:lvl3pPr>
-            <a:lvl4pPr marL="1371600" algn="l" defTabSz="914400" rtl="0" eaLnBrk="1" latinLnBrk="0" hangingPunct="1">
-              <a:defRPr sz="1800" kern="1200">
-                <a:solidFill>
-                  <a:schemeClr val="lt1"/>
-                </a:solidFill>
-                <a:latin typeface="+mn-lt"/>
-                <a:ea typeface="+mn-ea"/>
-                <a:cs typeface="+mn-cs"/>
-              </a:defRPr>
-            </a:lvl4pPr>
-            <a:lvl5pPr marL="1828800" algn="l" defTabSz="914400" rtl="0" eaLnBrk="1" latinLnBrk="0" hangingPunct="1">
-              <a:defRPr sz="1800" kern="1200">
-                <a:solidFill>
-                  <a:schemeClr val="lt1"/>
-                </a:solidFill>
-                <a:latin typeface="+mn-lt"/>
-                <a:ea typeface="+mn-ea"/>
-                <a:cs typeface="+mn-cs"/>
-              </a:defRPr>
-            </a:lvl5pPr>
-            <a:lvl6pPr marL="2286000" algn="l" defTabSz="914400" rtl="0" eaLnBrk="1" latinLnBrk="0" hangingPunct="1">
-              <a:defRPr sz="1800" kern="1200">
-                <a:solidFill>
-                  <a:schemeClr val="lt1"/>
-                </a:solidFill>
-                <a:latin typeface="+mn-lt"/>
-                <a:ea typeface="+mn-ea"/>
-                <a:cs typeface="+mn-cs"/>
-              </a:defRPr>
-            </a:lvl6pPr>
-            <a:lvl7pPr marL="2743200" algn="l" defTabSz="914400" rtl="0" eaLnBrk="1" latinLnBrk="0" hangingPunct="1">
-              <a:defRPr sz="1800" kern="1200">
-                <a:solidFill>
-                  <a:schemeClr val="lt1"/>
-                </a:solidFill>
-                <a:latin typeface="+mn-lt"/>
-                <a:ea typeface="+mn-ea"/>
-                <a:cs typeface="+mn-cs"/>
-              </a:defRPr>
-            </a:lvl7pPr>
-            <a:lvl8pPr marL="3200400" algn="l" defTabSz="914400" rtl="0" eaLnBrk="1" latinLnBrk="0" hangingPunct="1">
-              <a:defRPr sz="1800" kern="1200">
-                <a:solidFill>
-                  <a:schemeClr val="lt1"/>
-                </a:solidFill>
-                <a:latin typeface="+mn-lt"/>
-                <a:ea typeface="+mn-ea"/>
-                <a:cs typeface="+mn-cs"/>
-              </a:defRPr>
-            </a:lvl8pPr>
-            <a:lvl9pPr marL="3657600" algn="l" defTabSz="914400" rtl="0" eaLnBrk="1" latinLnBrk="0" hangingPunct="1">
-              <a:defRPr sz="1800" kern="1200">
-                <a:solidFill>
-                  <a:schemeClr val="lt1"/>
-                </a:solidFill>
-                <a:latin typeface="+mn-lt"/>
-                <a:ea typeface="+mn-ea"/>
-                <a:cs typeface="+mn-cs"/>
-              </a:defRPr>
-            </a:lvl9pPr>
-          </a:lstStyle>
-          <a:p>
-            <a:pPr algn="ctr"/>
-            <a:r>
-              <a:rPr lang="en-US" sz="2400" b="1" dirty="0">
-                <a:cs typeface="Calibri"/>
-              </a:rPr>
-              <a:t>DATA MEMORY</a:t>
-            </a:r>
-            <a:endParaRPr lang="en-US" sz="2400" b="1" dirty="0"/>
-          </a:p>
-        </p:txBody>
-      </p:sp>
-      <p:sp>
-        <p:nvSpPr>
-          <p:cNvPr id="6" name="Rectangle 5">
-            <a:extLst>
-              <a:ext uri="{FF2B5EF4-FFF2-40B4-BE49-F238E27FC236}">
-                <a16:creationId xmlns:a16="http://schemas.microsoft.com/office/drawing/2014/main" id="{34BEDB2D-55D6-4C4F-A350-0001776D7C42}"/>
-              </a:ext>
-            </a:extLst>
-          </p:cNvPr>
-          <p:cNvSpPr/>
-          <p:nvPr/>
-        </p:nvSpPr>
-        <p:spPr>
-          <a:xfrm>
-            <a:off x="664234" y="2626743"/>
-            <a:ext cx="2185357" cy="1811545"/>
-          </a:xfrm>
-          <a:prstGeom prst="rect">
-            <a:avLst/>
-          </a:prstGeom>
-          <a:solidFill>
-            <a:schemeClr val="accent3">
-              <a:lumMod val="75000"/>
-            </a:schemeClr>
-          </a:solidFill>
-        </p:spPr>
-        <p:style>
-          <a:lnRef idx="2">
-            <a:schemeClr val="accent1">
-              <a:shade val="50000"/>
-            </a:schemeClr>
-          </a:lnRef>
-          <a:fillRef idx="1">
-            <a:schemeClr val="accent1"/>
-          </a:fillRef>
-          <a:effectRef idx="0">
-            <a:schemeClr val="accent1"/>
-          </a:effectRef>
-          <a:fontRef idx="minor">
-            <a:schemeClr val="lt1"/>
-          </a:fontRef>
-        </p:style>
-        <p:txBody>
-          <a:bodyPr lIns="91440" tIns="45720" rIns="91440" bIns="45720" rtlCol="0" anchor="ctr"/>
-          <a:lstStyle>
-            <a:defPPr>
-              <a:defRPr lang="en-US"/>
-            </a:defPPr>
-            <a:lvl1pPr marL="0" algn="l" defTabSz="914400" rtl="0" eaLnBrk="1" latinLnBrk="0" hangingPunct="1">
-              <a:defRPr sz="1800" kern="1200">
-                <a:solidFill>
-                  <a:schemeClr val="lt1"/>
-                </a:solidFill>
-                <a:latin typeface="+mn-lt"/>
-                <a:ea typeface="+mn-ea"/>
-                <a:cs typeface="+mn-cs"/>
-              </a:defRPr>
-            </a:lvl1pPr>
-            <a:lvl2pPr marL="457200" algn="l" defTabSz="914400" rtl="0" eaLnBrk="1" latinLnBrk="0" hangingPunct="1">
-              <a:defRPr sz="1800" kern="1200">
-                <a:solidFill>
-                  <a:schemeClr val="lt1"/>
-                </a:solidFill>
-                <a:latin typeface="+mn-lt"/>
-                <a:ea typeface="+mn-ea"/>
-                <a:cs typeface="+mn-cs"/>
-              </a:defRPr>
-            </a:lvl2pPr>
-            <a:lvl3pPr marL="914400" algn="l" defTabSz="914400" rtl="0" eaLnBrk="1" latinLnBrk="0" hangingPunct="1">
-              <a:defRPr sz="1800" kern="1200">
-                <a:solidFill>
-                  <a:schemeClr val="lt1"/>
-                </a:solidFill>
-                <a:latin typeface="+mn-lt"/>
-                <a:ea typeface="+mn-ea"/>
-                <a:cs typeface="+mn-cs"/>
-              </a:defRPr>
-            </a:lvl3pPr>
-            <a:lvl4pPr marL="1371600" algn="l" defTabSz="914400" rtl="0" eaLnBrk="1" latinLnBrk="0" hangingPunct="1">
-              <a:defRPr sz="1800" kern="1200">
-                <a:solidFill>
-                  <a:schemeClr val="lt1"/>
-                </a:solidFill>
-                <a:latin typeface="+mn-lt"/>
-                <a:ea typeface="+mn-ea"/>
-                <a:cs typeface="+mn-cs"/>
-              </a:defRPr>
-            </a:lvl4pPr>
-            <a:lvl5pPr marL="1828800" algn="l" defTabSz="914400" rtl="0" eaLnBrk="1" latinLnBrk="0" hangingPunct="1">
-              <a:defRPr sz="1800" kern="1200">
-                <a:solidFill>
-                  <a:schemeClr val="lt1"/>
-                </a:solidFill>
-                <a:latin typeface="+mn-lt"/>
-                <a:ea typeface="+mn-ea"/>
-                <a:cs typeface="+mn-cs"/>
-              </a:defRPr>
-            </a:lvl5pPr>
-            <a:lvl6pPr marL="2286000" algn="l" defTabSz="914400" rtl="0" eaLnBrk="1" latinLnBrk="0" hangingPunct="1">
-              <a:defRPr sz="1800" kern="1200">
-                <a:solidFill>
-                  <a:schemeClr val="lt1"/>
-                </a:solidFill>
-                <a:latin typeface="+mn-lt"/>
-                <a:ea typeface="+mn-ea"/>
-                <a:cs typeface="+mn-cs"/>
-              </a:defRPr>
-            </a:lvl6pPr>
-            <a:lvl7pPr marL="2743200" algn="l" defTabSz="914400" rtl="0" eaLnBrk="1" latinLnBrk="0" hangingPunct="1">
-              <a:defRPr sz="1800" kern="1200">
-                <a:solidFill>
-                  <a:schemeClr val="lt1"/>
-                </a:solidFill>
-                <a:latin typeface="+mn-lt"/>
-                <a:ea typeface="+mn-ea"/>
-                <a:cs typeface="+mn-cs"/>
-              </a:defRPr>
-            </a:lvl7pPr>
-            <a:lvl8pPr marL="3200400" algn="l" defTabSz="914400" rtl="0" eaLnBrk="1" latinLnBrk="0" hangingPunct="1">
-              <a:defRPr sz="1800" kern="1200">
-                <a:solidFill>
-                  <a:schemeClr val="lt1"/>
-                </a:solidFill>
-                <a:latin typeface="+mn-lt"/>
-                <a:ea typeface="+mn-ea"/>
-                <a:cs typeface="+mn-cs"/>
-              </a:defRPr>
-            </a:lvl8pPr>
-            <a:lvl9pPr marL="3657600" algn="l" defTabSz="914400" rtl="0" eaLnBrk="1" latinLnBrk="0" hangingPunct="1">
-              <a:defRPr sz="1800" kern="1200">
-                <a:solidFill>
-                  <a:schemeClr val="lt1"/>
-                </a:solidFill>
-                <a:latin typeface="+mn-lt"/>
-                <a:ea typeface="+mn-ea"/>
-                <a:cs typeface="+mn-cs"/>
-              </a:defRPr>
-            </a:lvl9pPr>
-          </a:lstStyle>
-          <a:p>
-            <a:pPr algn="ctr"/>
-            <a:r>
-              <a:rPr lang="en-US" sz="2400" b="1" dirty="0">
-                <a:cs typeface="Calibri"/>
-              </a:rPr>
-              <a:t>PROGRAM MEMORY</a:t>
-            </a:r>
-          </a:p>
-        </p:txBody>
-      </p:sp>
-      <p:sp>
-        <p:nvSpPr>
-          <p:cNvPr id="7" name="Arrow: Left 6">
-            <a:extLst>
-              <a:ext uri="{FF2B5EF4-FFF2-40B4-BE49-F238E27FC236}">
-                <a16:creationId xmlns:a16="http://schemas.microsoft.com/office/drawing/2014/main" id="{4F857FD2-3722-4E5A-AD96-48C7A154C5A7}"/>
-              </a:ext>
-            </a:extLst>
-          </p:cNvPr>
-          <p:cNvSpPr/>
-          <p:nvPr/>
-        </p:nvSpPr>
-        <p:spPr>
-          <a:xfrm>
-            <a:off x="2845445" y="2696955"/>
-            <a:ext cx="2170981" cy="632604"/>
-          </a:xfrm>
-          <a:prstGeom prst="leftArrow">
-            <a:avLst/>
-          </a:prstGeom>
-        </p:spPr>
-        <p:style>
-          <a:lnRef idx="2">
-            <a:schemeClr val="accent1">
-              <a:shade val="50000"/>
-            </a:schemeClr>
-          </a:lnRef>
-          <a:fillRef idx="1">
-            <a:schemeClr val="accent1"/>
-          </a:fillRef>
-          <a:effectRef idx="0">
-            <a:schemeClr val="accent1"/>
-          </a:effectRef>
-          <a:fontRef idx="minor">
-            <a:schemeClr val="lt1"/>
-          </a:fontRef>
-        </p:style>
-        <p:txBody>
-          <a:bodyPr rtlCol="0" anchor="ctr"/>
-          <a:lstStyle>
-            <a:defPPr>
-              <a:defRPr lang="en-US"/>
-            </a:defPPr>
-            <a:lvl1pPr marL="0" algn="l" defTabSz="914400" rtl="0" eaLnBrk="1" latinLnBrk="0" hangingPunct="1">
-              <a:defRPr sz="1800" kern="1200">
-                <a:solidFill>
-                  <a:schemeClr val="lt1"/>
-                </a:solidFill>
-                <a:latin typeface="+mn-lt"/>
-                <a:ea typeface="+mn-ea"/>
-                <a:cs typeface="+mn-cs"/>
-              </a:defRPr>
-            </a:lvl1pPr>
-            <a:lvl2pPr marL="457200" algn="l" defTabSz="914400" rtl="0" eaLnBrk="1" latinLnBrk="0" hangingPunct="1">
-              <a:defRPr sz="1800" kern="1200">
-                <a:solidFill>
-                  <a:schemeClr val="lt1"/>
-                </a:solidFill>
-                <a:latin typeface="+mn-lt"/>
-                <a:ea typeface="+mn-ea"/>
-                <a:cs typeface="+mn-cs"/>
-              </a:defRPr>
-            </a:lvl2pPr>
-            <a:lvl3pPr marL="914400" algn="l" defTabSz="914400" rtl="0" eaLnBrk="1" latinLnBrk="0" hangingPunct="1">
-              <a:defRPr sz="1800" kern="1200">
-                <a:solidFill>
-                  <a:schemeClr val="lt1"/>
-                </a:solidFill>
-                <a:latin typeface="+mn-lt"/>
-                <a:ea typeface="+mn-ea"/>
-                <a:cs typeface="+mn-cs"/>
-              </a:defRPr>
-            </a:lvl3pPr>
-            <a:lvl4pPr marL="1371600" algn="l" defTabSz="914400" rtl="0" eaLnBrk="1" latinLnBrk="0" hangingPunct="1">
-              <a:defRPr sz="1800" kern="1200">
-                <a:solidFill>
-                  <a:schemeClr val="lt1"/>
-                </a:solidFill>
-                <a:latin typeface="+mn-lt"/>
-                <a:ea typeface="+mn-ea"/>
-                <a:cs typeface="+mn-cs"/>
-              </a:defRPr>
-            </a:lvl4pPr>
-            <a:lvl5pPr marL="1828800" algn="l" defTabSz="914400" rtl="0" eaLnBrk="1" latinLnBrk="0" hangingPunct="1">
-              <a:defRPr sz="1800" kern="1200">
-                <a:solidFill>
-                  <a:schemeClr val="lt1"/>
-                </a:solidFill>
-                <a:latin typeface="+mn-lt"/>
-                <a:ea typeface="+mn-ea"/>
-                <a:cs typeface="+mn-cs"/>
-              </a:defRPr>
-            </a:lvl5pPr>
-            <a:lvl6pPr marL="2286000" algn="l" defTabSz="914400" rtl="0" eaLnBrk="1" latinLnBrk="0" hangingPunct="1">
-              <a:defRPr sz="1800" kern="1200">
-                <a:solidFill>
-                  <a:schemeClr val="lt1"/>
-                </a:solidFill>
-                <a:latin typeface="+mn-lt"/>
-                <a:ea typeface="+mn-ea"/>
-                <a:cs typeface="+mn-cs"/>
-              </a:defRPr>
-            </a:lvl6pPr>
-            <a:lvl7pPr marL="2743200" algn="l" defTabSz="914400" rtl="0" eaLnBrk="1" latinLnBrk="0" hangingPunct="1">
-              <a:defRPr sz="1800" kern="1200">
-                <a:solidFill>
-                  <a:schemeClr val="lt1"/>
-                </a:solidFill>
-                <a:latin typeface="+mn-lt"/>
-                <a:ea typeface="+mn-ea"/>
-                <a:cs typeface="+mn-cs"/>
-              </a:defRPr>
-            </a:lvl7pPr>
-            <a:lvl8pPr marL="3200400" algn="l" defTabSz="914400" rtl="0" eaLnBrk="1" latinLnBrk="0" hangingPunct="1">
-              <a:defRPr sz="1800" kern="1200">
-                <a:solidFill>
-                  <a:schemeClr val="lt1"/>
-                </a:solidFill>
-                <a:latin typeface="+mn-lt"/>
-                <a:ea typeface="+mn-ea"/>
-                <a:cs typeface="+mn-cs"/>
-              </a:defRPr>
-            </a:lvl8pPr>
-            <a:lvl9pPr marL="3657600" algn="l" defTabSz="914400" rtl="0" eaLnBrk="1" latinLnBrk="0" hangingPunct="1">
-              <a:defRPr sz="1800" kern="1200">
-                <a:solidFill>
-                  <a:schemeClr val="lt1"/>
-                </a:solidFill>
-                <a:latin typeface="+mn-lt"/>
-                <a:ea typeface="+mn-ea"/>
-                <a:cs typeface="+mn-cs"/>
-              </a:defRPr>
-            </a:lvl9pPr>
-          </a:lstStyle>
-          <a:p>
-            <a:pPr algn="ctr"/>
-            <a:r>
-              <a:rPr lang="en-US" sz="2000" b="1" dirty="0">
-                <a:cs typeface="Calibri"/>
-              </a:rPr>
-              <a:t>PM Address bus</a:t>
-            </a:r>
-            <a:endParaRPr lang="en-US" sz="2000" b="1" dirty="0"/>
-          </a:p>
-        </p:txBody>
-      </p:sp>
-      <p:sp>
-        <p:nvSpPr>
-          <p:cNvPr id="8" name="Arrow: Right 7">
-            <a:extLst>
-              <a:ext uri="{FF2B5EF4-FFF2-40B4-BE49-F238E27FC236}">
-                <a16:creationId xmlns:a16="http://schemas.microsoft.com/office/drawing/2014/main" id="{CE1DE7CC-43C4-43F4-A88A-839A2E2B04BD}"/>
-              </a:ext>
-            </a:extLst>
-          </p:cNvPr>
-          <p:cNvSpPr/>
-          <p:nvPr/>
-        </p:nvSpPr>
-        <p:spPr>
-          <a:xfrm>
-            <a:off x="7143376" y="2696057"/>
-            <a:ext cx="2271622" cy="632603"/>
-          </a:xfrm>
-          <a:prstGeom prst="rightArrow">
-            <a:avLst/>
-          </a:prstGeom>
-        </p:spPr>
-        <p:style>
-          <a:lnRef idx="2">
-            <a:schemeClr val="accent1">
-              <a:shade val="50000"/>
-            </a:schemeClr>
-          </a:lnRef>
-          <a:fillRef idx="1">
-            <a:schemeClr val="accent1"/>
-          </a:fillRef>
-          <a:effectRef idx="0">
-            <a:schemeClr val="accent1"/>
-          </a:effectRef>
-          <a:fontRef idx="minor">
-            <a:schemeClr val="lt1"/>
-          </a:fontRef>
-        </p:style>
-        <p:txBody>
-          <a:bodyPr rtlCol="0" anchor="ctr"/>
-          <a:lstStyle>
-            <a:defPPr>
-              <a:defRPr lang="en-US"/>
-            </a:defPPr>
-            <a:lvl1pPr marL="0" algn="l" defTabSz="914400" rtl="0" eaLnBrk="1" latinLnBrk="0" hangingPunct="1">
-              <a:defRPr sz="1800" kern="1200">
-                <a:solidFill>
-                  <a:schemeClr val="lt1"/>
-                </a:solidFill>
-                <a:latin typeface="+mn-lt"/>
-                <a:ea typeface="+mn-ea"/>
-                <a:cs typeface="+mn-cs"/>
-              </a:defRPr>
-            </a:lvl1pPr>
-            <a:lvl2pPr marL="457200" algn="l" defTabSz="914400" rtl="0" eaLnBrk="1" latinLnBrk="0" hangingPunct="1">
-              <a:defRPr sz="1800" kern="1200">
-                <a:solidFill>
-                  <a:schemeClr val="lt1"/>
-                </a:solidFill>
-                <a:latin typeface="+mn-lt"/>
-                <a:ea typeface="+mn-ea"/>
-                <a:cs typeface="+mn-cs"/>
-              </a:defRPr>
-            </a:lvl2pPr>
-            <a:lvl3pPr marL="914400" algn="l" defTabSz="914400" rtl="0" eaLnBrk="1" latinLnBrk="0" hangingPunct="1">
-              <a:defRPr sz="1800" kern="1200">
-                <a:solidFill>
-                  <a:schemeClr val="lt1"/>
-                </a:solidFill>
-                <a:latin typeface="+mn-lt"/>
-                <a:ea typeface="+mn-ea"/>
-                <a:cs typeface="+mn-cs"/>
-              </a:defRPr>
-            </a:lvl3pPr>
-            <a:lvl4pPr marL="1371600" algn="l" defTabSz="914400" rtl="0" eaLnBrk="1" latinLnBrk="0" hangingPunct="1">
-              <a:defRPr sz="1800" kern="1200">
-                <a:solidFill>
-                  <a:schemeClr val="lt1"/>
-                </a:solidFill>
-                <a:latin typeface="+mn-lt"/>
-                <a:ea typeface="+mn-ea"/>
-                <a:cs typeface="+mn-cs"/>
-              </a:defRPr>
-            </a:lvl4pPr>
-            <a:lvl5pPr marL="1828800" algn="l" defTabSz="914400" rtl="0" eaLnBrk="1" latinLnBrk="0" hangingPunct="1">
-              <a:defRPr sz="1800" kern="1200">
-                <a:solidFill>
-                  <a:schemeClr val="lt1"/>
-                </a:solidFill>
-                <a:latin typeface="+mn-lt"/>
-                <a:ea typeface="+mn-ea"/>
-                <a:cs typeface="+mn-cs"/>
-              </a:defRPr>
-            </a:lvl5pPr>
-            <a:lvl6pPr marL="2286000" algn="l" defTabSz="914400" rtl="0" eaLnBrk="1" latinLnBrk="0" hangingPunct="1">
-              <a:defRPr sz="1800" kern="1200">
-                <a:solidFill>
-                  <a:schemeClr val="lt1"/>
-                </a:solidFill>
-                <a:latin typeface="+mn-lt"/>
-                <a:ea typeface="+mn-ea"/>
-                <a:cs typeface="+mn-cs"/>
-              </a:defRPr>
-            </a:lvl6pPr>
-            <a:lvl7pPr marL="2743200" algn="l" defTabSz="914400" rtl="0" eaLnBrk="1" latinLnBrk="0" hangingPunct="1">
-              <a:defRPr sz="1800" kern="1200">
-                <a:solidFill>
-                  <a:schemeClr val="lt1"/>
-                </a:solidFill>
-                <a:latin typeface="+mn-lt"/>
-                <a:ea typeface="+mn-ea"/>
-                <a:cs typeface="+mn-cs"/>
-              </a:defRPr>
-            </a:lvl7pPr>
-            <a:lvl8pPr marL="3200400" algn="l" defTabSz="914400" rtl="0" eaLnBrk="1" latinLnBrk="0" hangingPunct="1">
-              <a:defRPr sz="1800" kern="1200">
-                <a:solidFill>
-                  <a:schemeClr val="lt1"/>
-                </a:solidFill>
-                <a:latin typeface="+mn-lt"/>
-                <a:ea typeface="+mn-ea"/>
-                <a:cs typeface="+mn-cs"/>
-              </a:defRPr>
-            </a:lvl8pPr>
-            <a:lvl9pPr marL="3657600" algn="l" defTabSz="914400" rtl="0" eaLnBrk="1" latinLnBrk="0" hangingPunct="1">
-              <a:defRPr sz="1800" kern="1200">
-                <a:solidFill>
-                  <a:schemeClr val="lt1"/>
-                </a:solidFill>
-                <a:latin typeface="+mn-lt"/>
-                <a:ea typeface="+mn-ea"/>
-                <a:cs typeface="+mn-cs"/>
-              </a:defRPr>
-            </a:lvl9pPr>
-          </a:lstStyle>
-          <a:p>
-            <a:pPr algn="ctr"/>
-            <a:r>
-              <a:rPr lang="en-US" sz="2000" b="1" dirty="0">
-                <a:cs typeface="Calibri"/>
-              </a:rPr>
-              <a:t>DM Address bus</a:t>
-            </a:r>
-            <a:endParaRPr lang="en-US" b="1" dirty="0">
-              <a:cs typeface="Calibri" panose="020F0502020204030204"/>
-            </a:endParaRPr>
-          </a:p>
-        </p:txBody>
-      </p:sp>
-      <p:sp>
-        <p:nvSpPr>
-          <p:cNvPr id="9" name="Arrow: Left-Right 8">
-            <a:extLst>
-              <a:ext uri="{FF2B5EF4-FFF2-40B4-BE49-F238E27FC236}">
-                <a16:creationId xmlns:a16="http://schemas.microsoft.com/office/drawing/2014/main" id="{FCEF11F2-F29D-495D-B7E6-216139B5CEF5}"/>
-              </a:ext>
-            </a:extLst>
-          </p:cNvPr>
-          <p:cNvSpPr/>
-          <p:nvPr/>
-        </p:nvSpPr>
-        <p:spPr>
-          <a:xfrm>
-            <a:off x="2839794" y="3845347"/>
-            <a:ext cx="2185358" cy="632603"/>
-          </a:xfrm>
-          <a:prstGeom prst="leftRightArrow">
-            <a:avLst/>
-          </a:prstGeom>
-        </p:spPr>
-        <p:style>
-          <a:lnRef idx="2">
-            <a:schemeClr val="accent1">
-              <a:shade val="50000"/>
-            </a:schemeClr>
-          </a:lnRef>
-          <a:fillRef idx="1">
-            <a:schemeClr val="accent1"/>
-          </a:fillRef>
-          <a:effectRef idx="0">
-            <a:schemeClr val="accent1"/>
-          </a:effectRef>
-          <a:fontRef idx="minor">
-            <a:schemeClr val="lt1"/>
-          </a:fontRef>
-        </p:style>
-        <p:txBody>
-          <a:bodyPr rtlCol="0" anchor="ctr"/>
-          <a:lstStyle>
-            <a:defPPr>
-              <a:defRPr lang="en-US"/>
-            </a:defPPr>
-            <a:lvl1pPr marL="0" algn="l" defTabSz="914400" rtl="0" eaLnBrk="1" latinLnBrk="0" hangingPunct="1">
-              <a:defRPr sz="1800" kern="1200">
-                <a:solidFill>
-                  <a:schemeClr val="lt1"/>
-                </a:solidFill>
-                <a:latin typeface="+mn-lt"/>
-                <a:ea typeface="+mn-ea"/>
-                <a:cs typeface="+mn-cs"/>
-              </a:defRPr>
-            </a:lvl1pPr>
-            <a:lvl2pPr marL="457200" algn="l" defTabSz="914400" rtl="0" eaLnBrk="1" latinLnBrk="0" hangingPunct="1">
-              <a:defRPr sz="1800" kern="1200">
-                <a:solidFill>
-                  <a:schemeClr val="lt1"/>
-                </a:solidFill>
-                <a:latin typeface="+mn-lt"/>
-                <a:ea typeface="+mn-ea"/>
-                <a:cs typeface="+mn-cs"/>
-              </a:defRPr>
-            </a:lvl2pPr>
-            <a:lvl3pPr marL="914400" algn="l" defTabSz="914400" rtl="0" eaLnBrk="1" latinLnBrk="0" hangingPunct="1">
-              <a:defRPr sz="1800" kern="1200">
-                <a:solidFill>
-                  <a:schemeClr val="lt1"/>
-                </a:solidFill>
-                <a:latin typeface="+mn-lt"/>
-                <a:ea typeface="+mn-ea"/>
-                <a:cs typeface="+mn-cs"/>
-              </a:defRPr>
-            </a:lvl3pPr>
-            <a:lvl4pPr marL="1371600" algn="l" defTabSz="914400" rtl="0" eaLnBrk="1" latinLnBrk="0" hangingPunct="1">
-              <a:defRPr sz="1800" kern="1200">
-                <a:solidFill>
-                  <a:schemeClr val="lt1"/>
-                </a:solidFill>
-                <a:latin typeface="+mn-lt"/>
-                <a:ea typeface="+mn-ea"/>
-                <a:cs typeface="+mn-cs"/>
-              </a:defRPr>
-            </a:lvl4pPr>
-            <a:lvl5pPr marL="1828800" algn="l" defTabSz="914400" rtl="0" eaLnBrk="1" latinLnBrk="0" hangingPunct="1">
-              <a:defRPr sz="1800" kern="1200">
-                <a:solidFill>
-                  <a:schemeClr val="lt1"/>
-                </a:solidFill>
-                <a:latin typeface="+mn-lt"/>
-                <a:ea typeface="+mn-ea"/>
-                <a:cs typeface="+mn-cs"/>
-              </a:defRPr>
-            </a:lvl5pPr>
-            <a:lvl6pPr marL="2286000" algn="l" defTabSz="914400" rtl="0" eaLnBrk="1" latinLnBrk="0" hangingPunct="1">
-              <a:defRPr sz="1800" kern="1200">
-                <a:solidFill>
-                  <a:schemeClr val="lt1"/>
-                </a:solidFill>
-                <a:latin typeface="+mn-lt"/>
-                <a:ea typeface="+mn-ea"/>
-                <a:cs typeface="+mn-cs"/>
-              </a:defRPr>
-            </a:lvl6pPr>
-            <a:lvl7pPr marL="2743200" algn="l" defTabSz="914400" rtl="0" eaLnBrk="1" latinLnBrk="0" hangingPunct="1">
-              <a:defRPr sz="1800" kern="1200">
-                <a:solidFill>
-                  <a:schemeClr val="lt1"/>
-                </a:solidFill>
-                <a:latin typeface="+mn-lt"/>
-                <a:ea typeface="+mn-ea"/>
-                <a:cs typeface="+mn-cs"/>
-              </a:defRPr>
-            </a:lvl7pPr>
-            <a:lvl8pPr marL="3200400" algn="l" defTabSz="914400" rtl="0" eaLnBrk="1" latinLnBrk="0" hangingPunct="1">
-              <a:defRPr sz="1800" kern="1200">
-                <a:solidFill>
-                  <a:schemeClr val="lt1"/>
-                </a:solidFill>
-                <a:latin typeface="+mn-lt"/>
-                <a:ea typeface="+mn-ea"/>
-                <a:cs typeface="+mn-cs"/>
-              </a:defRPr>
-            </a:lvl8pPr>
-            <a:lvl9pPr marL="3657600" algn="l" defTabSz="914400" rtl="0" eaLnBrk="1" latinLnBrk="0" hangingPunct="1">
-              <a:defRPr sz="1800" kern="1200">
-                <a:solidFill>
-                  <a:schemeClr val="lt1"/>
-                </a:solidFill>
-                <a:latin typeface="+mn-lt"/>
-                <a:ea typeface="+mn-ea"/>
-                <a:cs typeface="+mn-cs"/>
-              </a:defRPr>
-            </a:lvl9pPr>
-          </a:lstStyle>
-          <a:p>
-            <a:pPr algn="ctr"/>
-            <a:r>
-              <a:rPr lang="en-US" sz="2000" b="1" dirty="0">
-                <a:cs typeface="Calibri"/>
-              </a:rPr>
-              <a:t>PM Data bus</a:t>
-            </a:r>
-            <a:endParaRPr lang="en-US" sz="2000" b="1" dirty="0"/>
-          </a:p>
-        </p:txBody>
-      </p:sp>
-      <p:sp>
-        <p:nvSpPr>
-          <p:cNvPr id="10" name="Arrow: Left-Right 9">
-            <a:extLst>
-              <a:ext uri="{FF2B5EF4-FFF2-40B4-BE49-F238E27FC236}">
-                <a16:creationId xmlns:a16="http://schemas.microsoft.com/office/drawing/2014/main" id="{148CFDEB-B550-48BB-A10C-97488ABC0D6E}"/>
-              </a:ext>
-            </a:extLst>
-          </p:cNvPr>
-          <p:cNvSpPr/>
-          <p:nvPr/>
-        </p:nvSpPr>
-        <p:spPr>
-          <a:xfrm>
-            <a:off x="7196133" y="3802214"/>
-            <a:ext cx="2185358" cy="632603"/>
-          </a:xfrm>
-          <a:prstGeom prst="leftRightArrow">
-            <a:avLst/>
-          </a:prstGeom>
-        </p:spPr>
-        <p:style>
-          <a:lnRef idx="2">
-            <a:schemeClr val="accent1">
-              <a:shade val="50000"/>
-            </a:schemeClr>
-          </a:lnRef>
-          <a:fillRef idx="1">
-            <a:schemeClr val="accent1"/>
-          </a:fillRef>
-          <a:effectRef idx="0">
-            <a:schemeClr val="accent1"/>
-          </a:effectRef>
-          <a:fontRef idx="minor">
-            <a:schemeClr val="lt1"/>
-          </a:fontRef>
-        </p:style>
-        <p:txBody>
-          <a:bodyPr lIns="91440" tIns="45720" rIns="91440" bIns="45720" rtlCol="0" anchor="ctr"/>
-          <a:lstStyle>
-            <a:defPPr>
-              <a:defRPr lang="en-US"/>
-            </a:defPPr>
-            <a:lvl1pPr marL="0" algn="l" defTabSz="914400" rtl="0" eaLnBrk="1" latinLnBrk="0" hangingPunct="1">
-              <a:defRPr sz="1800" kern="1200">
-                <a:solidFill>
-                  <a:schemeClr val="lt1"/>
-                </a:solidFill>
-                <a:latin typeface="+mn-lt"/>
-                <a:ea typeface="+mn-ea"/>
-                <a:cs typeface="+mn-cs"/>
-              </a:defRPr>
-            </a:lvl1pPr>
-            <a:lvl2pPr marL="457200" algn="l" defTabSz="914400" rtl="0" eaLnBrk="1" latinLnBrk="0" hangingPunct="1">
-              <a:defRPr sz="1800" kern="1200">
-                <a:solidFill>
-                  <a:schemeClr val="lt1"/>
-                </a:solidFill>
-                <a:latin typeface="+mn-lt"/>
-                <a:ea typeface="+mn-ea"/>
-                <a:cs typeface="+mn-cs"/>
-              </a:defRPr>
-            </a:lvl2pPr>
-            <a:lvl3pPr marL="914400" algn="l" defTabSz="914400" rtl="0" eaLnBrk="1" latinLnBrk="0" hangingPunct="1">
-              <a:defRPr sz="1800" kern="1200">
-                <a:solidFill>
-                  <a:schemeClr val="lt1"/>
-                </a:solidFill>
-                <a:latin typeface="+mn-lt"/>
-                <a:ea typeface="+mn-ea"/>
-                <a:cs typeface="+mn-cs"/>
-              </a:defRPr>
-            </a:lvl3pPr>
-            <a:lvl4pPr marL="1371600" algn="l" defTabSz="914400" rtl="0" eaLnBrk="1" latinLnBrk="0" hangingPunct="1">
-              <a:defRPr sz="1800" kern="1200">
-                <a:solidFill>
-                  <a:schemeClr val="lt1"/>
-                </a:solidFill>
-                <a:latin typeface="+mn-lt"/>
-                <a:ea typeface="+mn-ea"/>
-                <a:cs typeface="+mn-cs"/>
-              </a:defRPr>
-            </a:lvl4pPr>
-            <a:lvl5pPr marL="1828800" algn="l" defTabSz="914400" rtl="0" eaLnBrk="1" latinLnBrk="0" hangingPunct="1">
-              <a:defRPr sz="1800" kern="1200">
-                <a:solidFill>
-                  <a:schemeClr val="lt1"/>
-                </a:solidFill>
-                <a:latin typeface="+mn-lt"/>
-                <a:ea typeface="+mn-ea"/>
-                <a:cs typeface="+mn-cs"/>
-              </a:defRPr>
-            </a:lvl5pPr>
-            <a:lvl6pPr marL="2286000" algn="l" defTabSz="914400" rtl="0" eaLnBrk="1" latinLnBrk="0" hangingPunct="1">
-              <a:defRPr sz="1800" kern="1200">
-                <a:solidFill>
-                  <a:schemeClr val="lt1"/>
-                </a:solidFill>
-                <a:latin typeface="+mn-lt"/>
-                <a:ea typeface="+mn-ea"/>
-                <a:cs typeface="+mn-cs"/>
-              </a:defRPr>
-            </a:lvl6pPr>
-            <a:lvl7pPr marL="2743200" algn="l" defTabSz="914400" rtl="0" eaLnBrk="1" latinLnBrk="0" hangingPunct="1">
-              <a:defRPr sz="1800" kern="1200">
-                <a:solidFill>
-                  <a:schemeClr val="lt1"/>
-                </a:solidFill>
-                <a:latin typeface="+mn-lt"/>
-                <a:ea typeface="+mn-ea"/>
-                <a:cs typeface="+mn-cs"/>
-              </a:defRPr>
-            </a:lvl7pPr>
-            <a:lvl8pPr marL="3200400" algn="l" defTabSz="914400" rtl="0" eaLnBrk="1" latinLnBrk="0" hangingPunct="1">
-              <a:defRPr sz="1800" kern="1200">
-                <a:solidFill>
-                  <a:schemeClr val="lt1"/>
-                </a:solidFill>
-                <a:latin typeface="+mn-lt"/>
-                <a:ea typeface="+mn-ea"/>
-                <a:cs typeface="+mn-cs"/>
-              </a:defRPr>
-            </a:lvl8pPr>
-            <a:lvl9pPr marL="3657600" algn="l" defTabSz="914400" rtl="0" eaLnBrk="1" latinLnBrk="0" hangingPunct="1">
-              <a:defRPr sz="1800" kern="1200">
-                <a:solidFill>
-                  <a:schemeClr val="lt1"/>
-                </a:solidFill>
-                <a:latin typeface="+mn-lt"/>
-                <a:ea typeface="+mn-ea"/>
-                <a:cs typeface="+mn-cs"/>
-              </a:defRPr>
-            </a:lvl9pPr>
-          </a:lstStyle>
-          <a:p>
-            <a:pPr algn="ctr"/>
-            <a:r>
-              <a:rPr lang="en-US" sz="2000" b="1" dirty="0">
-                <a:cs typeface="Calibri"/>
-              </a:rPr>
-              <a:t>DM Data bus</a:t>
-            </a:r>
-            <a:endParaRPr lang="en-US" sz="2000" b="1" dirty="0"/>
-          </a:p>
-        </p:txBody>
-      </p:sp>
+      </p:pic>
     </p:spTree>
     <p:extLst>
       <p:ext uri="{BB962C8B-B14F-4D97-AF65-F5344CB8AC3E}">
-        <p14:creationId xmlns:p14="http://schemas.microsoft.com/office/powerpoint/2010/main" val="1879048696"/>
+        <p14:creationId xmlns:p14="http://schemas.microsoft.com/office/powerpoint/2010/main" val="782883573"/>
       </p:ext>
     </p:extLst>
   </p:cSld>
@@ -5669,7 +5673,7 @@
           <p:cNvPr id="2" name="Title 1">
             <a:extLst>
               <a:ext uri="{FF2B5EF4-FFF2-40B4-BE49-F238E27FC236}">
-                <a16:creationId xmlns:a16="http://schemas.microsoft.com/office/drawing/2014/main" id="{64A7D1A7-D09D-46C4-96D5-D56A8FCF0795}"/>
+                <a16:creationId xmlns:a16="http://schemas.microsoft.com/office/drawing/2014/main" id="{67EBDB49-2642-42D8-9AA8-134BC528B154}"/>
               </a:ext>
             </a:extLst>
           </p:cNvPr>
@@ -5683,7 +5687,7 @@
         <p:spPr>
           <a:xfrm>
             <a:off x="838200" y="1401647"/>
-            <a:ext cx="10515600" cy="894243"/>
+            <a:ext cx="10515600" cy="807979"/>
           </a:xfrm>
         </p:spPr>
         <p:txBody>
@@ -5692,151 +5696,48 @@
           <a:p>
             <a:pPr algn="ctr"/>
             <a:r>
-              <a:rPr lang="en-US" b="1" dirty="0">
+              <a:rPr lang="en-US" b="1">
                 <a:cs typeface="Calibri Light"/>
               </a:rPr>
-              <a:t>Arduino Components</a:t>
-            </a:r>
-          </a:p>
-        </p:txBody>
-      </p:sp>
-      <p:sp>
-        <p:nvSpPr>
-          <p:cNvPr id="3" name="Content Placeholder 2">
+              <a:t>Arduino UNO parts description ….</a:t>
+            </a:r>
+          </a:p>
+        </p:txBody>
+      </p:sp>
+      <p:pic>
+        <p:nvPicPr>
+          <p:cNvPr id="5" name="Picture 5" descr="A picture containing text, electronics, circuit&#10;&#10;Description automatically generated">
             <a:extLst>
               <a:ext uri="{FF2B5EF4-FFF2-40B4-BE49-F238E27FC236}">
-                <a16:creationId xmlns:a16="http://schemas.microsoft.com/office/drawing/2014/main" id="{8B502495-6848-4FF2-BF28-3B54F55A30D6}"/>
+                <a16:creationId xmlns:a16="http://schemas.microsoft.com/office/drawing/2014/main" id="{30E2A7D0-507D-471C-89B2-1C46DC554689}"/>
               </a:ext>
             </a:extLst>
           </p:cNvPr>
-          <p:cNvSpPr>
-            <a:spLocks noGrp="1"/>
-          </p:cNvSpPr>
-          <p:nvPr>
-            <p:ph idx="1"/>
-          </p:nvPr>
-        </p:nvSpPr>
+          <p:cNvPicPr>
+            <a:picLocks noChangeAspect="1"/>
+          </p:cNvPicPr>
+          <p:nvPr/>
+        </p:nvPicPr>
+        <p:blipFill>
+          <a:blip r:embed="rId2"/>
+          <a:stretch>
+            <a:fillRect/>
+          </a:stretch>
+        </p:blipFill>
         <p:spPr>
           <a:xfrm>
-            <a:off x="838200" y="2180810"/>
-            <a:ext cx="10515600" cy="4427472"/>
+            <a:off x="2193986" y="2223150"/>
+            <a:ext cx="7315199" cy="4295132"/>
           </a:xfrm>
+          <a:prstGeom prst="rect">
+            <a:avLst/>
+          </a:prstGeom>
         </p:spPr>
-        <p:txBody>
-          <a:bodyPr vert="horz" lIns="91440" tIns="45720" rIns="91440" bIns="45720" rtlCol="0" anchor="t">
-            <a:normAutofit lnSpcReduction="10000"/>
-          </a:bodyPr>
-          <a:lstStyle/>
-          <a:p>
-            <a:r>
-              <a:rPr lang="en-US" dirty="0">
-                <a:cs typeface="Calibri"/>
-              </a:rPr>
-              <a:t>The major components of Arduino UNO board are as follows:</a:t>
-            </a:r>
-          </a:p>
-          <a:p>
-            <a:pPr marL="514350" indent="-514350">
-              <a:buAutoNum type="romanLcPeriod"/>
-            </a:pPr>
-            <a:r>
-              <a:rPr lang="en-US" dirty="0">
-                <a:cs typeface="Calibri"/>
-              </a:rPr>
-              <a:t>USB Connector</a:t>
-            </a:r>
-          </a:p>
-          <a:p>
-            <a:pPr marL="514350" indent="-514350">
-              <a:buAutoNum type="romanLcPeriod"/>
-            </a:pPr>
-            <a:r>
-              <a:rPr lang="en-US" dirty="0">
-                <a:cs typeface="Calibri"/>
-              </a:rPr>
-              <a:t>Power port</a:t>
-            </a:r>
-          </a:p>
-          <a:p>
-            <a:pPr marL="514350" indent="-514350">
-              <a:buAutoNum type="romanLcPeriod"/>
-            </a:pPr>
-            <a:r>
-              <a:rPr lang="en-US" dirty="0">
-                <a:cs typeface="Calibri"/>
-              </a:rPr>
-              <a:t>Microcontroller</a:t>
-            </a:r>
-          </a:p>
-          <a:p>
-            <a:pPr marL="514350" indent="-514350">
-              <a:buAutoNum type="romanLcPeriod"/>
-            </a:pPr>
-            <a:r>
-              <a:rPr lang="en-US" dirty="0">
-                <a:cs typeface="Calibri"/>
-              </a:rPr>
-              <a:t>Analog input and Digital pins</a:t>
-            </a:r>
-          </a:p>
-          <a:p>
-            <a:pPr marL="514350" indent="-514350">
-              <a:buAutoNum type="romanLcPeriod"/>
-            </a:pPr>
-            <a:r>
-              <a:rPr lang="en-US" dirty="0">
-                <a:cs typeface="Calibri"/>
-              </a:rPr>
-              <a:t>Reset switch</a:t>
-            </a:r>
-          </a:p>
-          <a:p>
-            <a:pPr marL="514350" indent="-514350">
-              <a:buAutoNum type="romanLcPeriod"/>
-            </a:pPr>
-            <a:r>
-              <a:rPr lang="en-US" dirty="0">
-                <a:cs typeface="Calibri"/>
-              </a:rPr>
-              <a:t>Crystal oscillator</a:t>
-            </a:r>
-          </a:p>
-          <a:p>
-            <a:pPr marL="514350" indent="-514350">
-              <a:buAutoNum type="romanLcPeriod"/>
-            </a:pPr>
-            <a:r>
-              <a:rPr lang="en-US" dirty="0">
-                <a:cs typeface="Calibri"/>
-              </a:rPr>
-              <a:t>USB interface chip</a:t>
-            </a:r>
-          </a:p>
-          <a:p>
-            <a:pPr marL="514350" indent="-514350">
-              <a:buAutoNum type="romanLcPeriod"/>
-            </a:pPr>
-            <a:r>
-              <a:rPr lang="en-US" dirty="0">
-                <a:cs typeface="Calibri"/>
-              </a:rPr>
-              <a:t>TX RX LEDs</a:t>
-            </a:r>
-          </a:p>
-          <a:p>
-            <a:pPr marL="514350" indent="-514350">
-              <a:buAutoNum type="romanLcPeriod"/>
-            </a:pPr>
-            <a:endParaRPr lang="en-US" dirty="0">
-              <a:cs typeface="Calibri"/>
-            </a:endParaRPr>
-          </a:p>
-        </p:txBody>
-      </p:sp>
+      </p:pic>
     </p:spTree>
     <p:extLst>
       <p:ext uri="{BB962C8B-B14F-4D97-AF65-F5344CB8AC3E}">
-        <p14:creationId xmlns:p14="http://schemas.microsoft.com/office/powerpoint/2010/main" val="3483218824"/>
+        <p14:creationId xmlns:p14="http://schemas.microsoft.com/office/powerpoint/2010/main" val="3378573415"/>
       </p:ext>
     </p:extLst>
   </p:cSld>
@@ -5880,7 +5781,7 @@
           <p:cNvPr id="2" name="Title 1">
             <a:extLst>
               <a:ext uri="{FF2B5EF4-FFF2-40B4-BE49-F238E27FC236}">
-                <a16:creationId xmlns:a16="http://schemas.microsoft.com/office/drawing/2014/main" id="{9FAB3E64-09AE-468F-8DAE-E32D1D77160A}"/>
+                <a16:creationId xmlns:a16="http://schemas.microsoft.com/office/drawing/2014/main" id="{66017C41-FB68-41B3-9319-E44E527F4C0B}"/>
               </a:ext>
             </a:extLst>
           </p:cNvPr>
@@ -5894,13 +5795,11 @@
         <p:spPr>
           <a:xfrm>
             <a:off x="838200" y="1401647"/>
-            <a:ext cx="10515600" cy="672421"/>
+            <a:ext cx="10515600" cy="937375"/>
           </a:xfrm>
         </p:spPr>
         <p:txBody>
-          <a:bodyPr>
-            <a:normAutofit fontScale="90000"/>
-          </a:bodyPr>
+          <a:bodyPr/>
           <a:lstStyle/>
           <a:p>
             <a:pPr algn="ctr"/>
@@ -5908,48 +5807,79 @@
               <a:rPr lang="en-US" b="1" dirty="0">
                 <a:cs typeface="Calibri Light"/>
               </a:rPr>
-              <a:t>Arduino Components</a:t>
-            </a:r>
-            <a:endParaRPr lang="en-US">
+              <a:t>Real-world Applications of Arduino</a:t>
+            </a:r>
+            <a:endParaRPr lang="en-US" dirty="0">
               <a:cs typeface="Calibri Light"/>
             </a:endParaRPr>
           </a:p>
         </p:txBody>
       </p:sp>
-      <p:pic>
-        <p:nvPicPr>
-          <p:cNvPr id="5" name="Picture 4" descr="A picture containing text, electronics, circuit&#10;&#10;Description automatically generated">
+      <p:sp>
+        <p:nvSpPr>
+          <p:cNvPr id="3" name="Content Placeholder 2">
             <a:extLst>
               <a:ext uri="{FF2B5EF4-FFF2-40B4-BE49-F238E27FC236}">
-                <a16:creationId xmlns:a16="http://schemas.microsoft.com/office/drawing/2014/main" id="{956DBD88-B644-4781-A7BC-406DEDE47509}"/>
+                <a16:creationId xmlns:a16="http://schemas.microsoft.com/office/drawing/2014/main" id="{3EA8C052-30A4-42B4-9F7F-41B2B8F70681}"/>
               </a:ext>
             </a:extLst>
           </p:cNvPr>
-          <p:cNvPicPr>
-            <a:picLocks noChangeAspect="1"/>
-          </p:cNvPicPr>
-          <p:nvPr/>
-        </p:nvPicPr>
-        <p:blipFill>
-          <a:blip r:embed="rId2"/>
-          <a:stretch>
-            <a:fillRect/>
-          </a:stretch>
-        </p:blipFill>
+          <p:cNvSpPr>
+            <a:spLocks noGrp="1"/>
+          </p:cNvSpPr>
+          <p:nvPr>
+            <p:ph idx="1"/>
+          </p:nvPr>
+        </p:nvSpPr>
         <p:spPr>
           <a:xfrm>
-            <a:off x="2237117" y="2219556"/>
-            <a:ext cx="7889523" cy="4497441"/>
+            <a:off x="838200" y="2353338"/>
+            <a:ext cx="10515600" cy="3823624"/>
           </a:xfrm>
-          <a:prstGeom prst="rect">
-            <a:avLst/>
-          </a:prstGeom>
         </p:spPr>
-      </p:pic>
+        <p:txBody>
+          <a:bodyPr vert="horz" lIns="91440" tIns="45720" rIns="91440" bIns="45720" rtlCol="0" anchor="t">
+            <a:normAutofit fontScale="92500"/>
+          </a:bodyPr>
+          <a:lstStyle/>
+          <a:p>
+            <a:r>
+              <a:rPr lang="en-US" dirty="0">
+                <a:cs typeface="Calibri"/>
+              </a:rPr>
+              <a:t>With the Arduino board we can control the Home, Office and Industrial activities with the control systems such as motion sensors, outlet control, temperature sensors, blower control, garage door control, air flow control and many others.</a:t>
+            </a:r>
+          </a:p>
+          <a:p>
+            <a:r>
+              <a:rPr lang="en-US" dirty="0">
+                <a:cs typeface="Calibri"/>
+              </a:rPr>
+              <a:t>Arduino can be used in many industrial control and automation systems.</a:t>
+            </a:r>
+          </a:p>
+          <a:p>
+            <a:r>
+              <a:rPr lang="en-US" dirty="0">
+                <a:cs typeface="Calibri"/>
+              </a:rPr>
+              <a:t>Using different top technologies like AI, ML, IoT and many others, we can interface an Arduino board to produce more and more intelligent devices and systems.</a:t>
+            </a:r>
+          </a:p>
+          <a:p>
+            <a:r>
+              <a:rPr lang="en-US" dirty="0">
+                <a:cs typeface="Calibri"/>
+              </a:rPr>
+              <a:t>Arduino is an open-source, it is just an electronics prototyping board.</a:t>
+            </a:r>
+          </a:p>
+        </p:txBody>
+      </p:sp>
     </p:spTree>
     <p:extLst>
       <p:ext uri="{BB962C8B-B14F-4D97-AF65-F5344CB8AC3E}">
-        <p14:creationId xmlns:p14="http://schemas.microsoft.com/office/powerpoint/2010/main" val="782883573"/>
+        <p14:creationId xmlns:p14="http://schemas.microsoft.com/office/powerpoint/2010/main" val="1219236234"/>
       </p:ext>
     </p:extLst>
   </p:cSld>

</xml_diff>